<commit_message>
docs(jaehoo1) : ppt 작성중
</commit_message>
<xml_diff>
--- a/10. 전역 변수의 문제점/presentation10/jaehoo1/전역 변수의 문제점.pptx
+++ b/10. 전역 변수의 문제점/presentation10/jaehoo1/전역 변수의 문제점.pptx
@@ -22,24 +22,25 @@
     <p:sldId id="293" r:id="rId16"/>
     <p:sldId id="296" r:id="rId17"/>
     <p:sldId id="297" r:id="rId18"/>
-    <p:sldId id="299" r:id="rId19"/>
-    <p:sldId id="265" r:id="rId20"/>
+    <p:sldId id="300" r:id="rId19"/>
+    <p:sldId id="299" r:id="rId20"/>
+    <p:sldId id="265" r:id="rId21"/>
   </p:sldIdLst>
   <p:sldSz cx="12192000" cy="6858000"/>
   <p:notesSz cx="6858000" cy="9144000"/>
   <p:embeddedFontLst>
     <p:embeddedFont>
       <p:font typeface="나눔스퀘어 Bold" panose="020B0600000101010101" pitchFamily="50" charset="-127"/>
-      <p:bold r:id="rId21"/>
+      <p:bold r:id="rId22"/>
     </p:embeddedFont>
     <p:embeddedFont>
       <p:font typeface="나눔스퀘어 ExtraBold" panose="020B0600000101010101" pitchFamily="50" charset="-127"/>
-      <p:bold r:id="rId22"/>
+      <p:bold r:id="rId23"/>
     </p:embeddedFont>
     <p:embeddedFont>
       <p:font typeface="맑은 고딕" panose="020B0503020000020004" pitchFamily="50" charset="-127"/>
-      <p:regular r:id="rId23"/>
-      <p:bold r:id="rId24"/>
+      <p:regular r:id="rId24"/>
+      <p:bold r:id="rId25"/>
     </p:embeddedFont>
   </p:embeddedFontLst>
   <p:defaultTextStyle>
@@ -298,7 +299,7 @@
           <a:p>
             <a:fld id="{BF6E7CB9-552A-40FD-8E25-6C9525410464}" type="datetimeFigureOut">
               <a:rPr lang="ko-KR" altLang="en-US" smtClean="0"/>
-              <a:t>2022-11-06</a:t>
+              <a:t>2022-11-07</a:t>
             </a:fld>
             <a:endParaRPr lang="ko-KR" altLang="en-US"/>
           </a:p>
@@ -496,7 +497,7 @@
           <a:p>
             <a:fld id="{BF6E7CB9-552A-40FD-8E25-6C9525410464}" type="datetimeFigureOut">
               <a:rPr lang="ko-KR" altLang="en-US" smtClean="0"/>
-              <a:t>2022-11-06</a:t>
+              <a:t>2022-11-07</a:t>
             </a:fld>
             <a:endParaRPr lang="ko-KR" altLang="en-US"/>
           </a:p>
@@ -704,7 +705,7 @@
           <a:p>
             <a:fld id="{BF6E7CB9-552A-40FD-8E25-6C9525410464}" type="datetimeFigureOut">
               <a:rPr lang="ko-KR" altLang="en-US" smtClean="0"/>
-              <a:t>2022-11-06</a:t>
+              <a:t>2022-11-07</a:t>
             </a:fld>
             <a:endParaRPr lang="ko-KR" altLang="en-US"/>
           </a:p>
@@ -902,7 +903,7 @@
           <a:p>
             <a:fld id="{BF6E7CB9-552A-40FD-8E25-6C9525410464}" type="datetimeFigureOut">
               <a:rPr lang="ko-KR" altLang="en-US" smtClean="0"/>
-              <a:t>2022-11-06</a:t>
+              <a:t>2022-11-07</a:t>
             </a:fld>
             <a:endParaRPr lang="ko-KR" altLang="en-US"/>
           </a:p>
@@ -1177,7 +1178,7 @@
           <a:p>
             <a:fld id="{BF6E7CB9-552A-40FD-8E25-6C9525410464}" type="datetimeFigureOut">
               <a:rPr lang="ko-KR" altLang="en-US" smtClean="0"/>
-              <a:t>2022-11-06</a:t>
+              <a:t>2022-11-07</a:t>
             </a:fld>
             <a:endParaRPr lang="ko-KR" altLang="en-US"/>
           </a:p>
@@ -1442,7 +1443,7 @@
           <a:p>
             <a:fld id="{BF6E7CB9-552A-40FD-8E25-6C9525410464}" type="datetimeFigureOut">
               <a:rPr lang="ko-KR" altLang="en-US" smtClean="0"/>
-              <a:t>2022-11-06</a:t>
+              <a:t>2022-11-07</a:t>
             </a:fld>
             <a:endParaRPr lang="ko-KR" altLang="en-US"/>
           </a:p>
@@ -1854,7 +1855,7 @@
           <a:p>
             <a:fld id="{BF6E7CB9-552A-40FD-8E25-6C9525410464}" type="datetimeFigureOut">
               <a:rPr lang="ko-KR" altLang="en-US" smtClean="0"/>
-              <a:t>2022-11-06</a:t>
+              <a:t>2022-11-07</a:t>
             </a:fld>
             <a:endParaRPr lang="ko-KR" altLang="en-US"/>
           </a:p>
@@ -1995,7 +1996,7 @@
           <a:p>
             <a:fld id="{BF6E7CB9-552A-40FD-8E25-6C9525410464}" type="datetimeFigureOut">
               <a:rPr lang="ko-KR" altLang="en-US" smtClean="0"/>
-              <a:t>2022-11-06</a:t>
+              <a:t>2022-11-07</a:t>
             </a:fld>
             <a:endParaRPr lang="ko-KR" altLang="en-US"/>
           </a:p>
@@ -2108,7 +2109,7 @@
           <a:p>
             <a:fld id="{BF6E7CB9-552A-40FD-8E25-6C9525410464}" type="datetimeFigureOut">
               <a:rPr lang="ko-KR" altLang="en-US" smtClean="0"/>
-              <a:t>2022-11-06</a:t>
+              <a:t>2022-11-07</a:t>
             </a:fld>
             <a:endParaRPr lang="ko-KR" altLang="en-US"/>
           </a:p>
@@ -2419,7 +2420,7 @@
           <a:p>
             <a:fld id="{BF6E7CB9-552A-40FD-8E25-6C9525410464}" type="datetimeFigureOut">
               <a:rPr lang="ko-KR" altLang="en-US" smtClean="0"/>
-              <a:t>2022-11-06</a:t>
+              <a:t>2022-11-07</a:t>
             </a:fld>
             <a:endParaRPr lang="ko-KR" altLang="en-US"/>
           </a:p>
@@ -2707,7 +2708,7 @@
           <a:p>
             <a:fld id="{BF6E7CB9-552A-40FD-8E25-6C9525410464}" type="datetimeFigureOut">
               <a:rPr lang="ko-KR" altLang="en-US" smtClean="0"/>
-              <a:t>2022-11-06</a:t>
+              <a:t>2022-11-07</a:t>
             </a:fld>
             <a:endParaRPr lang="ko-KR" altLang="en-US"/>
           </a:p>
@@ -2951,7 +2952,7 @@
           <a:p>
             <a:fld id="{BF6E7CB9-552A-40FD-8E25-6C9525410464}" type="datetimeFigureOut">
               <a:rPr lang="ko-KR" altLang="en-US" smtClean="0"/>
-              <a:t>2022-11-06</a:t>
+              <a:t>2022-11-07</a:t>
             </a:fld>
             <a:endParaRPr lang="ko-KR" altLang="en-US"/>
           </a:p>
@@ -4817,13 +4818,13 @@
   <p:clrMapOvr>
     <a:masterClrMapping/>
   </p:clrMapOvr>
-  <mc:AlternateContent xmlns:mc="http://schemas.openxmlformats.org/markup-compatibility/2006">
-    <mc:Choice xmlns:p159="http://schemas.microsoft.com/office/powerpoint/2015/09/main" Requires="p159">
+  <mc:AlternateContent xmlns:mc="http://schemas.openxmlformats.org/markup-compatibility/2006" xmlns:p159="http://schemas.microsoft.com/office/powerpoint/2015/09/main">
+    <mc:Choice Requires="p159">
       <p:transition xmlns:p14="http://schemas.microsoft.com/office/powerpoint/2010/main" spd="slow" p14:dur="2000">
         <p159:morph option="byObject"/>
       </p:transition>
     </mc:Choice>
-    <mc:Fallback>
+    <mc:Fallback xmlns="">
       <p:transition spd="slow">
         <p:fade/>
       </p:transition>
@@ -5530,13 +5531,13 @@
   <p:clrMapOvr>
     <a:masterClrMapping/>
   </p:clrMapOvr>
-  <mc:AlternateContent xmlns:mc="http://schemas.openxmlformats.org/markup-compatibility/2006">
-    <mc:Choice xmlns:p159="http://schemas.microsoft.com/office/powerpoint/2015/09/main" Requires="p159">
+  <mc:AlternateContent xmlns:mc="http://schemas.openxmlformats.org/markup-compatibility/2006" xmlns:p159="http://schemas.microsoft.com/office/powerpoint/2015/09/main">
+    <mc:Choice Requires="p159">
       <p:transition xmlns:p14="http://schemas.microsoft.com/office/powerpoint/2010/main" spd="slow" p14:dur="2000">
         <p159:morph option="byObject"/>
       </p:transition>
     </mc:Choice>
-    <mc:Fallback>
+    <mc:Fallback xmlns="">
       <p:transition spd="slow">
         <p:fade/>
       </p:transition>
@@ -6233,13 +6234,13 @@
   <p:clrMapOvr>
     <a:masterClrMapping/>
   </p:clrMapOvr>
-  <mc:AlternateContent xmlns:mc="http://schemas.openxmlformats.org/markup-compatibility/2006">
-    <mc:Choice xmlns:p159="http://schemas.microsoft.com/office/powerpoint/2015/09/main" Requires="p159">
+  <mc:AlternateContent xmlns:mc="http://schemas.openxmlformats.org/markup-compatibility/2006" xmlns:p159="http://schemas.microsoft.com/office/powerpoint/2015/09/main">
+    <mc:Choice Requires="p159">
       <p:transition xmlns:p14="http://schemas.microsoft.com/office/powerpoint/2010/main" spd="slow" p14:dur="2000">
         <p159:morph option="byObject"/>
       </p:transition>
     </mc:Choice>
-    <mc:Fallback>
+    <mc:Fallback xmlns="">
       <p:transition spd="slow">
         <p:fade/>
       </p:transition>
@@ -6848,13 +6849,13 @@
   <p:clrMapOvr>
     <a:masterClrMapping/>
   </p:clrMapOvr>
-  <mc:AlternateContent xmlns:mc="http://schemas.openxmlformats.org/markup-compatibility/2006">
-    <mc:Choice xmlns:p159="http://schemas.microsoft.com/office/powerpoint/2015/09/main" Requires="p159">
+  <mc:AlternateContent xmlns:mc="http://schemas.openxmlformats.org/markup-compatibility/2006" xmlns:p159="http://schemas.microsoft.com/office/powerpoint/2015/09/main">
+    <mc:Choice Requires="p159">
       <p:transition xmlns:p14="http://schemas.microsoft.com/office/powerpoint/2010/main" spd="slow" p14:dur="2000">
         <p159:morph option="byObject"/>
       </p:transition>
     </mc:Choice>
-    <mc:Fallback>
+    <mc:Fallback xmlns="">
       <p:transition spd="slow">
         <p:fade/>
       </p:transition>
@@ -7560,13 +7561,13 @@
   <p:clrMapOvr>
     <a:masterClrMapping/>
   </p:clrMapOvr>
-  <mc:AlternateContent xmlns:mc="http://schemas.openxmlformats.org/markup-compatibility/2006">
-    <mc:Choice xmlns:p159="http://schemas.microsoft.com/office/powerpoint/2015/09/main" Requires="p159">
+  <mc:AlternateContent xmlns:mc="http://schemas.openxmlformats.org/markup-compatibility/2006" xmlns:p159="http://schemas.microsoft.com/office/powerpoint/2015/09/main">
+    <mc:Choice Requires="p159">
       <p:transition xmlns:p14="http://schemas.microsoft.com/office/powerpoint/2010/main" spd="slow" p14:dur="2000">
         <p159:morph option="byObject"/>
       </p:transition>
     </mc:Choice>
-    <mc:Fallback>
+    <mc:Fallback xmlns="">
       <p:transition spd="slow">
         <p:fade/>
       </p:transition>
@@ -8182,13 +8183,13 @@
   <p:clrMapOvr>
     <a:masterClrMapping/>
   </p:clrMapOvr>
-  <mc:AlternateContent xmlns:mc="http://schemas.openxmlformats.org/markup-compatibility/2006">
-    <mc:Choice xmlns:p159="http://schemas.microsoft.com/office/powerpoint/2015/09/main" Requires="p159">
+  <mc:AlternateContent xmlns:mc="http://schemas.openxmlformats.org/markup-compatibility/2006" xmlns:p159="http://schemas.microsoft.com/office/powerpoint/2015/09/main">
+    <mc:Choice Requires="p159">
       <p:transition xmlns:p14="http://schemas.microsoft.com/office/powerpoint/2010/main" spd="slow" p14:dur="2000">
         <p159:morph option="byObject"/>
       </p:transition>
     </mc:Choice>
-    <mc:Fallback>
+    <mc:Fallback xmlns="">
       <p:transition spd="slow">
         <p:fade/>
       </p:transition>
@@ -8769,13 +8770,13 @@
   <p:clrMapOvr>
     <a:masterClrMapping/>
   </p:clrMapOvr>
-  <mc:AlternateContent xmlns:mc="http://schemas.openxmlformats.org/markup-compatibility/2006">
-    <mc:Choice xmlns:p159="http://schemas.microsoft.com/office/powerpoint/2015/09/main" Requires="p159">
+  <mc:AlternateContent xmlns:mc="http://schemas.openxmlformats.org/markup-compatibility/2006" xmlns:p159="http://schemas.microsoft.com/office/powerpoint/2015/09/main">
+    <mc:Choice Requires="p159">
       <p:transition xmlns:p14="http://schemas.microsoft.com/office/powerpoint/2010/main" spd="slow" p14:dur="2000">
         <p159:morph option="byObject"/>
       </p:transition>
     </mc:Choice>
-    <mc:Fallback>
+    <mc:Fallback xmlns="">
       <p:transition spd="slow">
         <p:fade/>
       </p:transition>
@@ -9171,7 +9172,7 @@
         </p:nvSpPr>
         <p:spPr>
           <a:xfrm>
-            <a:off x="762855" y="1760056"/>
+            <a:off x="762855" y="2187918"/>
             <a:ext cx="10680876" cy="461665"/>
           </a:xfrm>
           <a:prstGeom prst="rect">
@@ -9186,6 +9187,87 @@
           <a:lstStyle/>
           <a:p>
             <a:r>
+              <a:rPr lang="en-US" altLang="ko-KR" sz="2400" spc="100" dirty="0">
+                <a:solidFill>
+                  <a:srgbClr val="44546A"/>
+                </a:solidFill>
+                <a:latin typeface="나눔스퀘어 Bold" panose="020B0600000101010101" pitchFamily="50" charset="-127"/>
+                <a:ea typeface="나눔스퀘어 Bold" panose="020B0600000101010101" pitchFamily="50" charset="-127"/>
+              </a:rPr>
+              <a:t>ES6 </a:t>
+            </a:r>
+            <a:r>
+              <a:rPr lang="ko-KR" altLang="en-US" sz="2400" spc="100" dirty="0">
+                <a:solidFill>
+                  <a:srgbClr val="44546A"/>
+                </a:solidFill>
+                <a:latin typeface="나눔스퀘어 Bold" panose="020B0600000101010101" pitchFamily="50" charset="-127"/>
+                <a:ea typeface="나눔스퀘어 Bold" panose="020B0600000101010101" pitchFamily="50" charset="-127"/>
+              </a:rPr>
+              <a:t>모듈을 사용하면 더는 전역 변수를 사용할 수 없다</a:t>
+            </a:r>
+            <a:r>
+              <a:rPr lang="en-US" altLang="ko-KR" sz="2400" spc="100" dirty="0">
+                <a:solidFill>
+                  <a:srgbClr val="44546A"/>
+                </a:solidFill>
+                <a:latin typeface="나눔스퀘어 Bold" panose="020B0600000101010101" pitchFamily="50" charset="-127"/>
+                <a:ea typeface="나눔스퀘어 Bold" panose="020B0600000101010101" pitchFamily="50" charset="-127"/>
+              </a:rPr>
+              <a:t>.</a:t>
+            </a:r>
+          </a:p>
+        </p:txBody>
+      </p:sp>
+      <p:sp>
+        <p:nvSpPr>
+          <p:cNvPr id="11" name="TextBox 10">
+            <a:extLst>
+              <a:ext uri="{FF2B5EF4-FFF2-40B4-BE49-F238E27FC236}">
+                <a16:creationId xmlns:a16="http://schemas.microsoft.com/office/drawing/2014/main" id="{BE0E17C1-17CF-493E-872F-7377FE566AEB}"/>
+              </a:ext>
+            </a:extLst>
+          </p:cNvPr>
+          <p:cNvSpPr txBox="1"/>
+          <p:nvPr/>
+        </p:nvSpPr>
+        <p:spPr>
+          <a:xfrm>
+            <a:off x="762855" y="2649583"/>
+            <a:ext cx="10680876" cy="461665"/>
+          </a:xfrm>
+          <a:prstGeom prst="rect">
+            <a:avLst/>
+          </a:prstGeom>
+          <a:noFill/>
+        </p:spPr>
+        <p:txBody>
+          <a:bodyPr wrap="square" rtlCol="0">
+            <a:spAutoFit/>
+          </a:bodyPr>
+          <a:lstStyle/>
+          <a:p>
+            <a:r>
+              <a:rPr lang="en-US" altLang="ko-KR" sz="2400" spc="100" dirty="0">
+                <a:solidFill>
+                  <a:srgbClr val="44546A"/>
+                </a:solidFill>
+                <a:latin typeface="나눔스퀘어 Bold" panose="020B0600000101010101" pitchFamily="50" charset="-127"/>
+                <a:ea typeface="나눔스퀘어 Bold" panose="020B0600000101010101" pitchFamily="50" charset="-127"/>
+              </a:rPr>
+              <a:t>	</a:t>
+            </a:r>
+            <a:r>
+              <a:rPr lang="ko-KR" altLang="en-US" sz="2400" spc="100" dirty="0">
+                <a:solidFill>
+                  <a:srgbClr val="44546A"/>
+                </a:solidFill>
+                <a:latin typeface="나눔스퀘어 Bold" panose="020B0600000101010101" pitchFamily="50" charset="-127"/>
+                <a:ea typeface="나눔스퀘어 Bold" panose="020B0600000101010101" pitchFamily="50" charset="-127"/>
+              </a:rPr>
+              <a:t>대신 파일 자체의 독자적인 모듈 </a:t>
+            </a:r>
+            <a:r>
               <a:rPr lang="ko-KR" altLang="en-US" sz="2400" spc="100" dirty="0" err="1">
                 <a:solidFill>
                   <a:srgbClr val="44546A"/>
@@ -9193,7 +9275,377 @@
                 <a:latin typeface="나눔스퀘어 Bold" panose="020B0600000101010101" pitchFamily="50" charset="-127"/>
                 <a:ea typeface="나눔스퀘어 Bold" panose="020B0600000101010101" pitchFamily="50" charset="-127"/>
               </a:rPr>
-              <a:t>ㅁ</a:t>
+              <a:t>스코프를</a:t>
+            </a:r>
+            <a:r>
+              <a:rPr lang="ko-KR" altLang="en-US" sz="2400" spc="100" dirty="0">
+                <a:solidFill>
+                  <a:srgbClr val="44546A"/>
+                </a:solidFill>
+                <a:latin typeface="나눔스퀘어 Bold" panose="020B0600000101010101" pitchFamily="50" charset="-127"/>
+                <a:ea typeface="나눔스퀘어 Bold" panose="020B0600000101010101" pitchFamily="50" charset="-127"/>
+              </a:rPr>
+              <a:t> 제공</a:t>
+            </a:r>
+            <a:endParaRPr lang="en-US" altLang="ko-KR" sz="2400" spc="100" dirty="0">
+              <a:solidFill>
+                <a:srgbClr val="44546A"/>
+              </a:solidFill>
+              <a:latin typeface="나눔스퀘어 Bold" panose="020B0600000101010101" pitchFamily="50" charset="-127"/>
+              <a:ea typeface="나눔스퀘어 Bold" panose="020B0600000101010101" pitchFamily="50" charset="-127"/>
+            </a:endParaRPr>
+          </a:p>
+        </p:txBody>
+      </p:sp>
+      <p:sp>
+        <p:nvSpPr>
+          <p:cNvPr id="12" name="TextBox 11">
+            <a:extLst>
+              <a:ext uri="{FF2B5EF4-FFF2-40B4-BE49-F238E27FC236}">
+                <a16:creationId xmlns:a16="http://schemas.microsoft.com/office/drawing/2014/main" id="{E10FF337-8300-4427-8C22-A1C87FCF948D}"/>
+              </a:ext>
+            </a:extLst>
+          </p:cNvPr>
+          <p:cNvSpPr txBox="1"/>
+          <p:nvPr/>
+        </p:nvSpPr>
+        <p:spPr>
+          <a:xfrm>
+            <a:off x="762855" y="3111248"/>
+            <a:ext cx="10680876" cy="461665"/>
+          </a:xfrm>
+          <a:prstGeom prst="rect">
+            <a:avLst/>
+          </a:prstGeom>
+          <a:noFill/>
+        </p:spPr>
+        <p:txBody>
+          <a:bodyPr wrap="square" rtlCol="0">
+            <a:spAutoFit/>
+          </a:bodyPr>
+          <a:lstStyle/>
+          <a:p>
+            <a:r>
+              <a:rPr lang="en-US" altLang="ko-KR" sz="2400" spc="100" dirty="0">
+                <a:solidFill>
+                  <a:srgbClr val="44546A"/>
+                </a:solidFill>
+                <a:latin typeface="나눔스퀘어 Bold" panose="020B0600000101010101" pitchFamily="50" charset="-127"/>
+                <a:ea typeface="나눔스퀘어 Bold" panose="020B0600000101010101" pitchFamily="50" charset="-127"/>
+              </a:rPr>
+              <a:t>	var</a:t>
+            </a:r>
+            <a:r>
+              <a:rPr lang="ko-KR" altLang="en-US" sz="2400" spc="100" dirty="0">
+                <a:solidFill>
+                  <a:srgbClr val="44546A"/>
+                </a:solidFill>
+                <a:latin typeface="나눔스퀘어 Bold" panose="020B0600000101010101" pitchFamily="50" charset="-127"/>
+                <a:ea typeface="나눔스퀘어 Bold" panose="020B0600000101010101" pitchFamily="50" charset="-127"/>
+              </a:rPr>
+              <a:t> 키워드로 선언한 변수는 전역 변수가 아니며</a:t>
+            </a:r>
+            <a:endParaRPr lang="en-US" altLang="ko-KR" sz="2400" spc="100" dirty="0">
+              <a:solidFill>
+                <a:srgbClr val="44546A"/>
+              </a:solidFill>
+              <a:latin typeface="나눔스퀘어 Bold" panose="020B0600000101010101" pitchFamily="50" charset="-127"/>
+              <a:ea typeface="나눔스퀘어 Bold" panose="020B0600000101010101" pitchFamily="50" charset="-127"/>
+            </a:endParaRPr>
+          </a:p>
+        </p:txBody>
+      </p:sp>
+      <p:sp>
+        <p:nvSpPr>
+          <p:cNvPr id="13" name="TextBox 12">
+            <a:extLst>
+              <a:ext uri="{FF2B5EF4-FFF2-40B4-BE49-F238E27FC236}">
+                <a16:creationId xmlns:a16="http://schemas.microsoft.com/office/drawing/2014/main" id="{4A075A92-6A53-4616-8A36-51662E48998A}"/>
+              </a:ext>
+            </a:extLst>
+          </p:cNvPr>
+          <p:cNvSpPr txBox="1"/>
+          <p:nvPr/>
+        </p:nvSpPr>
+        <p:spPr>
+          <a:xfrm>
+            <a:off x="762855" y="3572913"/>
+            <a:ext cx="10680876" cy="461665"/>
+          </a:xfrm>
+          <a:prstGeom prst="rect">
+            <a:avLst/>
+          </a:prstGeom>
+          <a:noFill/>
+        </p:spPr>
+        <p:txBody>
+          <a:bodyPr wrap="square" rtlCol="0">
+            <a:spAutoFit/>
+          </a:bodyPr>
+          <a:lstStyle/>
+          <a:p>
+            <a:r>
+              <a:rPr lang="en-US" altLang="ko-KR" sz="2400" spc="100" dirty="0">
+                <a:solidFill>
+                  <a:srgbClr val="44546A"/>
+                </a:solidFill>
+                <a:latin typeface="나눔스퀘어 Bold" panose="020B0600000101010101" pitchFamily="50" charset="-127"/>
+                <a:ea typeface="나눔스퀘어 Bold" panose="020B0600000101010101" pitchFamily="50" charset="-127"/>
+              </a:rPr>
+              <a:t>	window </a:t>
+            </a:r>
+            <a:r>
+              <a:rPr lang="ko-KR" altLang="en-US" sz="2400" spc="100" dirty="0">
+                <a:solidFill>
+                  <a:srgbClr val="44546A"/>
+                </a:solidFill>
+                <a:latin typeface="나눔스퀘어 Bold" panose="020B0600000101010101" pitchFamily="50" charset="-127"/>
+                <a:ea typeface="나눔스퀘어 Bold" panose="020B0600000101010101" pitchFamily="50" charset="-127"/>
+              </a:rPr>
+              <a:t>객체의 프로퍼티도 아님</a:t>
+            </a:r>
+            <a:endParaRPr lang="en-US" altLang="ko-KR" sz="2400" spc="100" dirty="0">
+              <a:solidFill>
+                <a:srgbClr val="44546A"/>
+              </a:solidFill>
+              <a:latin typeface="나눔스퀘어 Bold" panose="020B0600000101010101" pitchFamily="50" charset="-127"/>
+              <a:ea typeface="나눔스퀘어 Bold" panose="020B0600000101010101" pitchFamily="50" charset="-127"/>
+            </a:endParaRPr>
+          </a:p>
+        </p:txBody>
+      </p:sp>
+      <p:sp>
+        <p:nvSpPr>
+          <p:cNvPr id="15" name="TextBox 14">
+            <a:extLst>
+              <a:ext uri="{FF2B5EF4-FFF2-40B4-BE49-F238E27FC236}">
+                <a16:creationId xmlns:a16="http://schemas.microsoft.com/office/drawing/2014/main" id="{999E5D1D-E899-4790-82A9-78FC838D749F}"/>
+              </a:ext>
+            </a:extLst>
+          </p:cNvPr>
+          <p:cNvSpPr txBox="1"/>
+          <p:nvPr/>
+        </p:nvSpPr>
+        <p:spPr>
+          <a:xfrm>
+            <a:off x="762855" y="4496243"/>
+            <a:ext cx="10680876" cy="461665"/>
+          </a:xfrm>
+          <a:prstGeom prst="rect">
+            <a:avLst/>
+          </a:prstGeom>
+          <a:noFill/>
+        </p:spPr>
+        <p:txBody>
+          <a:bodyPr wrap="square" rtlCol="0">
+            <a:spAutoFit/>
+          </a:bodyPr>
+          <a:lstStyle/>
+          <a:p>
+            <a:r>
+              <a:rPr lang="ko-KR" altLang="en-US" sz="2400" spc="100" dirty="0">
+                <a:solidFill>
+                  <a:srgbClr val="44546A"/>
+                </a:solidFill>
+                <a:latin typeface="나눔스퀘어 Bold" panose="020B0600000101010101" pitchFamily="50" charset="-127"/>
+                <a:ea typeface="나눔스퀘어 Bold" panose="020B0600000101010101" pitchFamily="50" charset="-127"/>
+              </a:rPr>
+              <a:t>모던 브라우저</a:t>
+            </a:r>
+            <a:r>
+              <a:rPr lang="en-US" altLang="ko-KR" sz="2400" spc="100" dirty="0">
+                <a:solidFill>
+                  <a:srgbClr val="44546A"/>
+                </a:solidFill>
+                <a:latin typeface="나눔스퀘어 Bold" panose="020B0600000101010101" pitchFamily="50" charset="-127"/>
+                <a:ea typeface="나눔스퀘어 Bold" panose="020B0600000101010101" pitchFamily="50" charset="-127"/>
+              </a:rPr>
+              <a:t>(Chrome, Firefox, Safari, Edge)</a:t>
+            </a:r>
+            <a:r>
+              <a:rPr lang="ko-KR" altLang="en-US" sz="2400" spc="100" dirty="0">
+                <a:solidFill>
+                  <a:srgbClr val="44546A"/>
+                </a:solidFill>
+                <a:latin typeface="나눔스퀘어 Bold" panose="020B0600000101010101" pitchFamily="50" charset="-127"/>
+                <a:ea typeface="나눔스퀘어 Bold" panose="020B0600000101010101" pitchFamily="50" charset="-127"/>
+              </a:rPr>
+              <a:t>에서 </a:t>
+            </a:r>
+            <a:r>
+              <a:rPr lang="en-US" altLang="ko-KR" sz="2400" spc="100" dirty="0">
+                <a:solidFill>
+                  <a:srgbClr val="44546A"/>
+                </a:solidFill>
+                <a:latin typeface="나눔스퀘어 Bold" panose="020B0600000101010101" pitchFamily="50" charset="-127"/>
+                <a:ea typeface="나눔스퀘어 Bold" panose="020B0600000101010101" pitchFamily="50" charset="-127"/>
+              </a:rPr>
+              <a:t>ES6 </a:t>
+            </a:r>
+            <a:r>
+              <a:rPr lang="ko-KR" altLang="en-US" sz="2400" spc="100" dirty="0">
+                <a:solidFill>
+                  <a:srgbClr val="44546A"/>
+                </a:solidFill>
+                <a:latin typeface="나눔스퀘어 Bold" panose="020B0600000101010101" pitchFamily="50" charset="-127"/>
+                <a:ea typeface="나눔스퀘어 Bold" panose="020B0600000101010101" pitchFamily="50" charset="-127"/>
+              </a:rPr>
+              <a:t>모듈 사용 가능</a:t>
+            </a:r>
+            <a:endParaRPr lang="en-US" altLang="ko-KR" sz="2400" spc="100" dirty="0">
+              <a:solidFill>
+                <a:srgbClr val="44546A"/>
+              </a:solidFill>
+              <a:latin typeface="나눔스퀘어 Bold" panose="020B0600000101010101" pitchFamily="50" charset="-127"/>
+              <a:ea typeface="나눔스퀘어 Bold" panose="020B0600000101010101" pitchFamily="50" charset="-127"/>
+            </a:endParaRPr>
+          </a:p>
+        </p:txBody>
+      </p:sp>
+      <p:sp>
+        <p:nvSpPr>
+          <p:cNvPr id="16" name="TextBox 15">
+            <a:extLst>
+              <a:ext uri="{FF2B5EF4-FFF2-40B4-BE49-F238E27FC236}">
+                <a16:creationId xmlns:a16="http://schemas.microsoft.com/office/drawing/2014/main" id="{AEF0B439-44D7-41CB-8857-0C472913727A}"/>
+              </a:ext>
+            </a:extLst>
+          </p:cNvPr>
+          <p:cNvSpPr txBox="1"/>
+          <p:nvPr/>
+        </p:nvSpPr>
+        <p:spPr>
+          <a:xfrm>
+            <a:off x="762855" y="5419573"/>
+            <a:ext cx="10680876" cy="461665"/>
+          </a:xfrm>
+          <a:prstGeom prst="rect">
+            <a:avLst/>
+          </a:prstGeom>
+          <a:noFill/>
+        </p:spPr>
+        <p:txBody>
+          <a:bodyPr wrap="square" rtlCol="0">
+            <a:spAutoFit/>
+          </a:bodyPr>
+          <a:lstStyle/>
+          <a:p>
+            <a:r>
+              <a:rPr lang="en-US" altLang="ko-KR" sz="2400" spc="100" dirty="0">
+                <a:solidFill>
+                  <a:srgbClr val="44546A"/>
+                </a:solidFill>
+                <a:latin typeface="나눔스퀘어 Bold" panose="020B0600000101010101" pitchFamily="50" charset="-127"/>
+                <a:ea typeface="나눔스퀘어 Bold" panose="020B0600000101010101" pitchFamily="50" charset="-127"/>
+              </a:rPr>
+              <a:t>	</a:t>
+            </a:r>
+            <a:r>
+              <a:rPr lang="ko-KR" altLang="en-US" sz="2400" spc="100" dirty="0">
+                <a:solidFill>
+                  <a:srgbClr val="44546A"/>
+                </a:solidFill>
+                <a:latin typeface="나눔스퀘어 Bold" panose="020B0600000101010101" pitchFamily="50" charset="-127"/>
+                <a:ea typeface="나눔스퀘어 Bold" panose="020B0600000101010101" pitchFamily="50" charset="-127"/>
+              </a:rPr>
+              <a:t>확장자는 </a:t>
+            </a:r>
+            <a:r>
+              <a:rPr lang="en-US" altLang="ko-KR" sz="2400" spc="100" dirty="0" err="1">
+                <a:solidFill>
+                  <a:srgbClr val="44546A"/>
+                </a:solidFill>
+                <a:latin typeface="나눔스퀘어 Bold" panose="020B0600000101010101" pitchFamily="50" charset="-127"/>
+                <a:ea typeface="나눔스퀘어 Bold" panose="020B0600000101010101" pitchFamily="50" charset="-127"/>
+              </a:rPr>
+              <a:t>mjs</a:t>
+            </a:r>
+            <a:r>
+              <a:rPr lang="ko-KR" altLang="en-US" sz="2400" spc="100" dirty="0">
+                <a:solidFill>
+                  <a:srgbClr val="44546A"/>
+                </a:solidFill>
+                <a:latin typeface="나눔스퀘어 Bold" panose="020B0600000101010101" pitchFamily="50" charset="-127"/>
+                <a:ea typeface="나눔스퀘어 Bold" panose="020B0600000101010101" pitchFamily="50" charset="-127"/>
+              </a:rPr>
+              <a:t>를 권장</a:t>
+            </a:r>
+            <a:endParaRPr lang="en-US" altLang="ko-KR" sz="2400" spc="100" dirty="0">
+              <a:solidFill>
+                <a:srgbClr val="44546A"/>
+              </a:solidFill>
+              <a:latin typeface="나눔스퀘어 Bold" panose="020B0600000101010101" pitchFamily="50" charset="-127"/>
+              <a:ea typeface="나눔스퀘어 Bold" panose="020B0600000101010101" pitchFamily="50" charset="-127"/>
+            </a:endParaRPr>
+          </a:p>
+        </p:txBody>
+      </p:sp>
+      <p:sp>
+        <p:nvSpPr>
+          <p:cNvPr id="19" name="TextBox 18">
+            <a:extLst>
+              <a:ext uri="{FF2B5EF4-FFF2-40B4-BE49-F238E27FC236}">
+                <a16:creationId xmlns:a16="http://schemas.microsoft.com/office/drawing/2014/main" id="{0FD73643-12C8-4E2A-8413-48910611A222}"/>
+              </a:ext>
+            </a:extLst>
+          </p:cNvPr>
+          <p:cNvSpPr txBox="1"/>
+          <p:nvPr/>
+        </p:nvSpPr>
+        <p:spPr>
+          <a:xfrm>
+            <a:off x="762855" y="4957908"/>
+            <a:ext cx="10680876" cy="461665"/>
+          </a:xfrm>
+          <a:prstGeom prst="rect">
+            <a:avLst/>
+          </a:prstGeom>
+          <a:noFill/>
+        </p:spPr>
+        <p:txBody>
+          <a:bodyPr wrap="square" rtlCol="0">
+            <a:spAutoFit/>
+          </a:bodyPr>
+          <a:lstStyle/>
+          <a:p>
+            <a:r>
+              <a:rPr lang="en-US" altLang="ko-KR" sz="2400" spc="100" dirty="0">
+                <a:solidFill>
+                  <a:srgbClr val="44546A"/>
+                </a:solidFill>
+                <a:latin typeface="나눔스퀘어 Bold" panose="020B0600000101010101" pitchFamily="50" charset="-127"/>
+                <a:ea typeface="나눔스퀘어 Bold" panose="020B0600000101010101" pitchFamily="50" charset="-127"/>
+              </a:rPr>
+              <a:t>	</a:t>
+            </a:r>
+            <a:r>
+              <a:rPr lang="ko-KR" altLang="en-US" sz="2400" spc="100" dirty="0">
+                <a:solidFill>
+                  <a:srgbClr val="44546A"/>
+                </a:solidFill>
+                <a:latin typeface="나눔스퀘어 Bold" panose="020B0600000101010101" pitchFamily="50" charset="-127"/>
+                <a:ea typeface="나눔스퀘어 Bold" panose="020B0600000101010101" pitchFamily="50" charset="-127"/>
+              </a:rPr>
+              <a:t>구형 브라우저</a:t>
+            </a:r>
+            <a:r>
+              <a:rPr lang="en-US" altLang="ko-KR" sz="2400" spc="100" dirty="0">
+                <a:solidFill>
+                  <a:srgbClr val="44546A"/>
+                </a:solidFill>
+                <a:latin typeface="나눔스퀘어 Bold" panose="020B0600000101010101" pitchFamily="50" charset="-127"/>
+                <a:ea typeface="나눔스퀘어 Bold" panose="020B0600000101010101" pitchFamily="50" charset="-127"/>
+              </a:rPr>
+              <a:t>(IE)</a:t>
+            </a:r>
+            <a:r>
+              <a:rPr lang="ko-KR" altLang="en-US" sz="2400" spc="100" dirty="0">
+                <a:solidFill>
+                  <a:srgbClr val="44546A"/>
+                </a:solidFill>
+                <a:latin typeface="나눔스퀘어 Bold" panose="020B0600000101010101" pitchFamily="50" charset="-127"/>
+                <a:ea typeface="나눔스퀘어 Bold" panose="020B0600000101010101" pitchFamily="50" charset="-127"/>
+              </a:rPr>
+              <a:t>에서는 동작 안함</a:t>
             </a:r>
             <a:endParaRPr lang="en-US" altLang="ko-KR" sz="2400" spc="100" dirty="0">
               <a:solidFill>
@@ -9215,13 +9667,13 @@
   <p:clrMapOvr>
     <a:masterClrMapping/>
   </p:clrMapOvr>
-  <mc:AlternateContent xmlns:mc="http://schemas.openxmlformats.org/markup-compatibility/2006">
-    <mc:Choice xmlns:p159="http://schemas.microsoft.com/office/powerpoint/2015/09/main" Requires="p159">
+  <mc:AlternateContent xmlns:mc="http://schemas.openxmlformats.org/markup-compatibility/2006" xmlns:p159="http://schemas.microsoft.com/office/powerpoint/2015/09/main">
+    <mc:Choice Requires="p159">
       <p:transition xmlns:p14="http://schemas.microsoft.com/office/powerpoint/2010/main" spd="slow" p14:dur="2000">
         <p159:morph option="byObject"/>
       </p:transition>
     </mc:Choice>
-    <mc:Fallback>
+    <mc:Fallback xmlns="">
       <p:transition spd="slow">
         <p:fade/>
       </p:transition>
@@ -9451,6 +9903,16 @@
           <a:lstStyle/>
           <a:p>
             <a:r>
+              <a:rPr lang="en-US" altLang="ko-KR" sz="2400" spc="100" dirty="0">
+                <a:solidFill>
+                  <a:srgbClr val="44546A"/>
+                </a:solidFill>
+                <a:latin typeface="나눔스퀘어 Bold" panose="020B0600000101010101" pitchFamily="50" charset="-127"/>
+                <a:ea typeface="나눔스퀘어 Bold" panose="020B0600000101010101" pitchFamily="50" charset="-127"/>
+              </a:rPr>
+              <a:t>ES6 </a:t>
+            </a:r>
+            <a:r>
               <a:rPr lang="ko-KR" altLang="en-US" sz="2400" spc="100" dirty="0">
                 <a:solidFill>
                   <a:srgbClr val="44546A"/>
@@ -9458,38 +9920,15 @@
                 <a:latin typeface="나눔스퀘어 Bold" panose="020B0600000101010101" pitchFamily="50" charset="-127"/>
                 <a:ea typeface="나눔스퀘어 Bold" panose="020B0600000101010101" pitchFamily="50" charset="-127"/>
               </a:rPr>
-              <a:t>문제</a:t>
-            </a:r>
-            <a:r>
-              <a:rPr lang="en-US" altLang="ko-KR" sz="2400" spc="100" dirty="0">
-                <a:solidFill>
-                  <a:srgbClr val="44546A"/>
-                </a:solidFill>
-                <a:latin typeface="나눔스퀘어 Bold" panose="020B0600000101010101" pitchFamily="50" charset="-127"/>
-                <a:ea typeface="나눔스퀘어 Bold" panose="020B0600000101010101" pitchFamily="50" charset="-127"/>
-              </a:rPr>
-              <a:t>, </a:t>
-            </a:r>
-            <a:r>
-              <a:rPr lang="ko-KR" altLang="en-US" sz="2400" spc="100" dirty="0">
-                <a:solidFill>
-                  <a:srgbClr val="44546A"/>
-                </a:solidFill>
-                <a:latin typeface="나눔스퀘어 Bold" panose="020B0600000101010101" pitchFamily="50" charset="-127"/>
-                <a:ea typeface="나눔스퀘어 Bold" panose="020B0600000101010101" pitchFamily="50" charset="-127"/>
-              </a:rPr>
-              <a:t>답지 </a:t>
-            </a:r>
-            <a:r>
-              <a:rPr lang="en-US" altLang="ko-KR" sz="2400" spc="100" dirty="0">
-                <a:solidFill>
-                  <a:srgbClr val="44546A"/>
-                </a:solidFill>
-                <a:latin typeface="나눔스퀘어 Bold" panose="020B0600000101010101" pitchFamily="50" charset="-127"/>
-                <a:ea typeface="나눔스퀘어 Bold" panose="020B0600000101010101" pitchFamily="50" charset="-127"/>
-              </a:rPr>
-              <a:t>ppt</a:t>
-            </a:r>
+              <a:t>모듈</a:t>
+            </a:r>
+            <a:endParaRPr lang="en-US" altLang="ko-KR" sz="2400" spc="100" dirty="0">
+              <a:solidFill>
+                <a:srgbClr val="44546A"/>
+              </a:solidFill>
+              <a:latin typeface="나눔스퀘어 Bold" panose="020B0600000101010101" pitchFamily="50" charset="-127"/>
+              <a:ea typeface="나눔스퀘어 Bold" panose="020B0600000101010101" pitchFamily="50" charset="-127"/>
+            </a:endParaRPr>
           </a:p>
         </p:txBody>
       </p:sp>
@@ -9542,14 +9981,14 @@
               <a:t> </a:t>
             </a:r>
             <a:r>
-              <a:rPr lang="en-US" altLang="ko-KR" sz="2400" spc="100" dirty="0">
+              <a:rPr lang="en-US" altLang="ko-KR" sz="2400" spc="100">
                 <a:solidFill>
                   <a:srgbClr val="000000"/>
                 </a:solidFill>
                 <a:latin typeface="나눔스퀘어 Bold" panose="020B0600000101010101" pitchFamily="50" charset="-127"/>
                 <a:ea typeface="나눔스퀘어 Bold" panose="020B0600000101010101" pitchFamily="50" charset="-127"/>
               </a:rPr>
-              <a:t>206</a:t>
+              <a:t>207</a:t>
             </a:r>
             <a:endParaRPr lang="ko-KR" altLang="en-US" sz="2400" spc="100" dirty="0">
               <a:solidFill>
@@ -9616,12 +10055,72 @@
           </a:p>
         </p:txBody>
       </p:sp>
-      <p:sp>
-        <p:nvSpPr>
-          <p:cNvPr id="10" name="TextBox 9">
-            <a:extLst>
-              <a:ext uri="{FF2B5EF4-FFF2-40B4-BE49-F238E27FC236}">
-                <a16:creationId xmlns:a16="http://schemas.microsoft.com/office/drawing/2014/main" id="{02AFF967-66B7-3EA3-20E6-621981EA5089}"/>
+      <p:pic>
+        <p:nvPicPr>
+          <p:cNvPr id="5" name="그림 4">
+            <a:extLst>
+              <a:ext uri="{FF2B5EF4-FFF2-40B4-BE49-F238E27FC236}">
+                <a16:creationId xmlns:a16="http://schemas.microsoft.com/office/drawing/2014/main" id="{FF45E417-15CF-45D8-B6DF-6A327495C1A1}"/>
+              </a:ext>
+            </a:extLst>
+          </p:cNvPr>
+          <p:cNvPicPr>
+            <a:picLocks noChangeAspect="1"/>
+          </p:cNvPicPr>
+          <p:nvPr/>
+        </p:nvPicPr>
+        <p:blipFill>
+          <a:blip r:embed="rId2"/>
+          <a:stretch>
+            <a:fillRect/>
+          </a:stretch>
+        </p:blipFill>
+        <p:spPr>
+          <a:xfrm>
+            <a:off x="762855" y="1757177"/>
+            <a:ext cx="7475174" cy="2072947"/>
+          </a:xfrm>
+          <a:prstGeom prst="rect">
+            <a:avLst/>
+          </a:prstGeom>
+        </p:spPr>
+      </p:pic>
+      <p:pic>
+        <p:nvPicPr>
+          <p:cNvPr id="14" name="그림 13">
+            <a:extLst>
+              <a:ext uri="{FF2B5EF4-FFF2-40B4-BE49-F238E27FC236}">
+                <a16:creationId xmlns:a16="http://schemas.microsoft.com/office/drawing/2014/main" id="{4EF0D6B3-EB9D-4798-8EDC-919AF9C4A4DF}"/>
+              </a:ext>
+            </a:extLst>
+          </p:cNvPr>
+          <p:cNvPicPr>
+            <a:picLocks noChangeAspect="1"/>
+          </p:cNvPicPr>
+          <p:nvPr/>
+        </p:nvPicPr>
+        <p:blipFill>
+          <a:blip r:embed="rId3"/>
+          <a:stretch>
+            <a:fillRect/>
+          </a:stretch>
+        </p:blipFill>
+        <p:spPr>
+          <a:xfrm>
+            <a:off x="762854" y="4083208"/>
+            <a:ext cx="7475173" cy="2214866"/>
+          </a:xfrm>
+          <a:prstGeom prst="rect">
+            <a:avLst/>
+          </a:prstGeom>
+        </p:spPr>
+      </p:pic>
+      <p:sp>
+        <p:nvSpPr>
+          <p:cNvPr id="16" name="TextBox 15">
+            <a:extLst>
+              <a:ext uri="{FF2B5EF4-FFF2-40B4-BE49-F238E27FC236}">
+                <a16:creationId xmlns:a16="http://schemas.microsoft.com/office/drawing/2014/main" id="{C0F3FF40-EDD0-41C1-9501-6F8A165719DE}"/>
               </a:ext>
             </a:extLst>
           </p:cNvPr>
@@ -9630,8 +10129,8 @@
         </p:nvSpPr>
         <p:spPr>
           <a:xfrm>
-            <a:off x="762855" y="1760056"/>
-            <a:ext cx="10680876" cy="830997"/>
+            <a:off x="8452883" y="1757177"/>
+            <a:ext cx="2990847" cy="461665"/>
           </a:xfrm>
           <a:prstGeom prst="rect">
             <a:avLst/>
@@ -9645,14 +10144,14 @@
           <a:lstStyle/>
           <a:p>
             <a:r>
-              <a:rPr lang="en-US" altLang="ko-KR" sz="2400" spc="100" dirty="0">
-                <a:solidFill>
-                  <a:srgbClr val="44546A"/>
-                </a:solidFill>
-                <a:latin typeface="나눔스퀘어 Bold" panose="020B0600000101010101" pitchFamily="50" charset="-127"/>
-                <a:ea typeface="나눔스퀘어 Bold" panose="020B0600000101010101" pitchFamily="50" charset="-127"/>
-              </a:rPr>
-              <a:t>	+</a:t>
+              <a:rPr lang="en-US" altLang="ko-KR" sz="2400" spc="100" dirty="0" err="1">
+                <a:solidFill>
+                  <a:srgbClr val="44546A"/>
+                </a:solidFill>
+                <a:latin typeface="나눔스퀘어 Bold" panose="020B0600000101010101" pitchFamily="50" charset="-127"/>
+                <a:ea typeface="나눔스퀘어 Bold" panose="020B0600000101010101" pitchFamily="50" charset="-127"/>
+              </a:rPr>
+              <a:t>iexplore</a:t>
             </a:r>
             <a:r>
               <a:rPr lang="ko-KR" altLang="en-US" sz="2400" spc="100" dirty="0">
@@ -9662,81 +10161,7 @@
                 <a:latin typeface="나눔스퀘어 Bold" panose="020B0600000101010101" pitchFamily="50" charset="-127"/>
                 <a:ea typeface="나눔스퀘어 Bold" panose="020B0600000101010101" pitchFamily="50" charset="-127"/>
               </a:rPr>
-              <a:t> </a:t>
-            </a:r>
-            <a:r>
-              <a:rPr lang="en-US" altLang="ko-KR" sz="2400" spc="100" dirty="0">
-                <a:solidFill>
-                  <a:srgbClr val="44546A"/>
-                </a:solidFill>
-                <a:latin typeface="나눔스퀘어 Bold" panose="020B0600000101010101" pitchFamily="50" charset="-127"/>
-                <a:ea typeface="나눔스퀘어 Bold" panose="020B0600000101010101" pitchFamily="50" charset="-127"/>
-              </a:rPr>
-              <a:t>#</a:t>
-            </a:r>
-            <a:r>
-              <a:rPr lang="ko-KR" altLang="en-US" sz="2400" spc="100" dirty="0">
-                <a:solidFill>
-                  <a:srgbClr val="44546A"/>
-                </a:solidFill>
-                <a:latin typeface="나눔스퀘어 Bold" panose="020B0600000101010101" pitchFamily="50" charset="-127"/>
-                <a:ea typeface="나눔스퀘어 Bold" panose="020B0600000101010101" pitchFamily="50" charset="-127"/>
-              </a:rPr>
-              <a:t> 키워드 </a:t>
-            </a:r>
-            <a:r>
-              <a:rPr lang="ko-KR" altLang="en-US" sz="2400" dirty="0">
-                <a:hlinkClick r:id="rId2"/>
-              </a:rPr>
-              <a:t>자바스크립트 디자인 패턴 </a:t>
-            </a:r>
-            <a:r>
-              <a:rPr lang="en-US" altLang="ko-KR" sz="2400" dirty="0">
-                <a:hlinkClick r:id="rId2"/>
-              </a:rPr>
-              <a:t>— </a:t>
-            </a:r>
-            <a:r>
-              <a:rPr lang="ko-KR" altLang="en-US" sz="2400" dirty="0">
-                <a:hlinkClick r:id="rId2"/>
-              </a:rPr>
-              <a:t>모듈 패턴</a:t>
-            </a:r>
-            <a:r>
-              <a:rPr lang="en-US" altLang="ko-KR" sz="2400" dirty="0">
-                <a:hlinkClick r:id="rId2"/>
-              </a:rPr>
-              <a:t>. </a:t>
-            </a:r>
-            <a:r>
-              <a:rPr lang="ko-KR" altLang="en-US" sz="2400" dirty="0" err="1">
-                <a:hlinkClick r:id="rId2"/>
-              </a:rPr>
-              <a:t>클로져를</a:t>
-            </a:r>
-            <a:r>
-              <a:rPr lang="ko-KR" altLang="en-US" sz="2400" dirty="0">
-                <a:hlinkClick r:id="rId2"/>
-              </a:rPr>
-              <a:t> 이용한 모듈 패턴을 알아본다 </a:t>
-            </a:r>
-            <a:r>
-              <a:rPr lang="en-US" altLang="ko-KR" sz="2400" dirty="0">
-                <a:hlinkClick r:id="rId2"/>
-              </a:rPr>
-              <a:t>| by Moon | </a:t>
-            </a:r>
-            <a:r>
-              <a:rPr lang="ko-KR" altLang="en-US" sz="2400" dirty="0">
-                <a:hlinkClick r:id="rId2"/>
-              </a:rPr>
-              <a:t>오늘의 프로그래밍 </a:t>
-            </a:r>
-            <a:r>
-              <a:rPr lang="en-US" altLang="ko-KR" sz="2400" dirty="0">
-                <a:hlinkClick r:id="rId2"/>
-              </a:rPr>
-              <a:t>| Medium</a:t>
+              <a:t>에서 동작</a:t>
             </a:r>
             <a:endParaRPr lang="en-US" altLang="ko-KR" sz="2400" spc="100" dirty="0">
               <a:solidFill>
@@ -9748,10 +10173,267 @@
           </a:p>
         </p:txBody>
       </p:sp>
+      <p:pic>
+        <p:nvPicPr>
+          <p:cNvPr id="1026" name="Picture 2" descr="Microsoft is finally retiring Internet Explorer in 2022 - The Verge">
+            <a:extLst>
+              <a:ext uri="{FF2B5EF4-FFF2-40B4-BE49-F238E27FC236}">
+                <a16:creationId xmlns:a16="http://schemas.microsoft.com/office/drawing/2014/main" id="{8712D37C-1E51-4CFE-AC9A-A24021457F60}"/>
+              </a:ext>
+            </a:extLst>
+          </p:cNvPr>
+          <p:cNvPicPr>
+            <a:picLocks noChangeAspect="1" noChangeArrowheads="1"/>
+          </p:cNvPicPr>
+          <p:nvPr/>
+        </p:nvPicPr>
+        <p:blipFill>
+          <a:blip r:embed="rId4">
+            <a:extLst>
+              <a:ext uri="{28A0092B-C50C-407E-A947-70E740481C1C}">
+                <a14:useLocalDpi xmlns:a14="http://schemas.microsoft.com/office/drawing/2010/main" val="0"/>
+              </a:ext>
+            </a:extLst>
+          </a:blip>
+          <a:srcRect/>
+          <a:stretch>
+            <a:fillRect/>
+          </a:stretch>
+        </p:blipFill>
+        <p:spPr bwMode="auto">
+          <a:xfrm>
+            <a:off x="8293743" y="2218842"/>
+            <a:ext cx="1547525" cy="1547525"/>
+          </a:xfrm>
+          <a:prstGeom prst="rect">
+            <a:avLst/>
+          </a:prstGeom>
+          <a:noFill/>
+          <a:extLst>
+            <a:ext uri="{909E8E84-426E-40DD-AFC4-6F175D3DCCD1}">
+              <a14:hiddenFill xmlns:a14="http://schemas.microsoft.com/office/drawing/2010/main">
+                <a:solidFill>
+                  <a:srgbClr val="FFFFFF"/>
+                </a:solidFill>
+              </a14:hiddenFill>
+            </a:ext>
+          </a:extLst>
+        </p:spPr>
+      </p:pic>
+      <p:sp>
+        <p:nvSpPr>
+          <p:cNvPr id="15" name="원형: 비어 있음 14">
+            <a:extLst>
+              <a:ext uri="{FF2B5EF4-FFF2-40B4-BE49-F238E27FC236}">
+                <a16:creationId xmlns:a16="http://schemas.microsoft.com/office/drawing/2014/main" id="{FCB0BB90-CAC8-4141-874C-EEE9CB4F4270}"/>
+              </a:ext>
+            </a:extLst>
+          </p:cNvPr>
+          <p:cNvSpPr/>
+          <p:nvPr/>
+        </p:nvSpPr>
+        <p:spPr>
+          <a:xfrm>
+            <a:off x="10130916" y="2670536"/>
+            <a:ext cx="635834" cy="635834"/>
+          </a:xfrm>
+          <a:prstGeom prst="donut">
+            <a:avLst/>
+          </a:prstGeom>
+        </p:spPr>
+        <p:style>
+          <a:lnRef idx="2">
+            <a:schemeClr val="accent1">
+              <a:shade val="50000"/>
+            </a:schemeClr>
+          </a:lnRef>
+          <a:fillRef idx="1">
+            <a:schemeClr val="accent1"/>
+          </a:fillRef>
+          <a:effectRef idx="0">
+            <a:schemeClr val="accent1"/>
+          </a:effectRef>
+          <a:fontRef idx="minor">
+            <a:schemeClr val="lt1"/>
+          </a:fontRef>
+        </p:style>
+        <p:txBody>
+          <a:bodyPr rtlCol="0" anchor="ctr"/>
+          <a:lstStyle/>
+          <a:p>
+            <a:pPr algn="ctr"/>
+            <a:endParaRPr lang="ko-KR" altLang="en-US">
+              <a:solidFill>
+                <a:schemeClr val="tx1"/>
+              </a:solidFill>
+            </a:endParaRPr>
+          </a:p>
+        </p:txBody>
+      </p:sp>
+      <p:sp>
+        <p:nvSpPr>
+          <p:cNvPr id="19" name="TextBox 18">
+            <a:extLst>
+              <a:ext uri="{FF2B5EF4-FFF2-40B4-BE49-F238E27FC236}">
+                <a16:creationId xmlns:a16="http://schemas.microsoft.com/office/drawing/2014/main" id="{839263F9-369E-4A4A-8D36-56646D195CAF}"/>
+              </a:ext>
+            </a:extLst>
+          </p:cNvPr>
+          <p:cNvSpPr txBox="1"/>
+          <p:nvPr/>
+        </p:nvSpPr>
+        <p:spPr>
+          <a:xfrm>
+            <a:off x="8452883" y="4151996"/>
+            <a:ext cx="2990847" cy="461665"/>
+          </a:xfrm>
+          <a:prstGeom prst="rect">
+            <a:avLst/>
+          </a:prstGeom>
+          <a:noFill/>
+        </p:spPr>
+        <p:txBody>
+          <a:bodyPr wrap="square" rtlCol="0">
+            <a:spAutoFit/>
+          </a:bodyPr>
+          <a:lstStyle/>
+          <a:p>
+            <a:r>
+              <a:rPr lang="en-US" altLang="ko-KR" sz="2400" spc="100" dirty="0" err="1">
+                <a:solidFill>
+                  <a:srgbClr val="44546A"/>
+                </a:solidFill>
+                <a:latin typeface="나눔스퀘어 Bold" panose="020B0600000101010101" pitchFamily="50" charset="-127"/>
+                <a:ea typeface="나눔스퀘어 Bold" panose="020B0600000101010101" pitchFamily="50" charset="-127"/>
+              </a:rPr>
+              <a:t>iexplore</a:t>
+            </a:r>
+            <a:r>
+              <a:rPr lang="ko-KR" altLang="en-US" sz="2400" spc="100" dirty="0">
+                <a:solidFill>
+                  <a:srgbClr val="44546A"/>
+                </a:solidFill>
+                <a:latin typeface="나눔스퀘어 Bold" panose="020B0600000101010101" pitchFamily="50" charset="-127"/>
+                <a:ea typeface="나눔스퀘어 Bold" panose="020B0600000101010101" pitchFamily="50" charset="-127"/>
+              </a:rPr>
+              <a:t>에서 동작 </a:t>
+            </a:r>
+            <a:r>
+              <a:rPr lang="en-US" altLang="ko-KR" sz="2400" spc="100" dirty="0">
+                <a:solidFill>
+                  <a:srgbClr val="44546A"/>
+                </a:solidFill>
+                <a:latin typeface="나눔스퀘어 Bold" panose="020B0600000101010101" pitchFamily="50" charset="-127"/>
+                <a:ea typeface="나눔스퀘어 Bold" panose="020B0600000101010101" pitchFamily="50" charset="-127"/>
+              </a:rPr>
+              <a:t>×</a:t>
+            </a:r>
+          </a:p>
+        </p:txBody>
+      </p:sp>
+      <p:pic>
+        <p:nvPicPr>
+          <p:cNvPr id="20" name="Picture 2" descr="Microsoft is finally retiring Internet Explorer in 2022 - The Verge">
+            <a:extLst>
+              <a:ext uri="{FF2B5EF4-FFF2-40B4-BE49-F238E27FC236}">
+                <a16:creationId xmlns:a16="http://schemas.microsoft.com/office/drawing/2014/main" id="{1C2D0781-D9D7-49D7-92B7-77422B3DDCDF}"/>
+              </a:ext>
+            </a:extLst>
+          </p:cNvPr>
+          <p:cNvPicPr>
+            <a:picLocks noChangeAspect="1" noChangeArrowheads="1"/>
+          </p:cNvPicPr>
+          <p:nvPr/>
+        </p:nvPicPr>
+        <p:blipFill>
+          <a:blip r:embed="rId4">
+            <a:extLst>
+              <a:ext uri="{28A0092B-C50C-407E-A947-70E740481C1C}">
+                <a14:useLocalDpi xmlns:a14="http://schemas.microsoft.com/office/drawing/2010/main" val="0"/>
+              </a:ext>
+            </a:extLst>
+          </a:blip>
+          <a:srcRect/>
+          <a:stretch>
+            <a:fillRect/>
+          </a:stretch>
+        </p:blipFill>
+        <p:spPr bwMode="auto">
+          <a:xfrm>
+            <a:off x="8293743" y="4613661"/>
+            <a:ext cx="1547525" cy="1547525"/>
+          </a:xfrm>
+          <a:prstGeom prst="rect">
+            <a:avLst/>
+          </a:prstGeom>
+          <a:noFill/>
+          <a:extLst>
+            <a:ext uri="{909E8E84-426E-40DD-AFC4-6F175D3DCCD1}">
+              <a14:hiddenFill xmlns:a14="http://schemas.microsoft.com/office/drawing/2010/main">
+                <a:solidFill>
+                  <a:srgbClr val="FFFFFF"/>
+                </a:solidFill>
+              </a14:hiddenFill>
+            </a:ext>
+          </a:extLst>
+        </p:spPr>
+      </p:pic>
+      <p:sp>
+        <p:nvSpPr>
+          <p:cNvPr id="18" name="곱하기 기호 17">
+            <a:extLst>
+              <a:ext uri="{FF2B5EF4-FFF2-40B4-BE49-F238E27FC236}">
+                <a16:creationId xmlns:a16="http://schemas.microsoft.com/office/drawing/2014/main" id="{16E12253-8E00-4F93-A360-EFB1CD19B9D4}"/>
+              </a:ext>
+            </a:extLst>
+          </p:cNvPr>
+          <p:cNvSpPr/>
+          <p:nvPr/>
+        </p:nvSpPr>
+        <p:spPr>
+          <a:xfrm>
+            <a:off x="10039479" y="4974786"/>
+            <a:ext cx="818707" cy="818707"/>
+          </a:xfrm>
+          <a:prstGeom prst="mathMultiply">
+            <a:avLst/>
+          </a:prstGeom>
+          <a:solidFill>
+            <a:schemeClr val="accent2"/>
+          </a:solidFill>
+          <a:ln>
+            <a:noFill/>
+          </a:ln>
+        </p:spPr>
+        <p:style>
+          <a:lnRef idx="2">
+            <a:schemeClr val="accent1">
+              <a:shade val="50000"/>
+            </a:schemeClr>
+          </a:lnRef>
+          <a:fillRef idx="1">
+            <a:schemeClr val="accent1"/>
+          </a:fillRef>
+          <a:effectRef idx="0">
+            <a:schemeClr val="accent1"/>
+          </a:effectRef>
+          <a:fontRef idx="minor">
+            <a:schemeClr val="lt1"/>
+          </a:fontRef>
+        </p:style>
+        <p:txBody>
+          <a:bodyPr rtlCol="0" anchor="ctr"/>
+          <a:lstStyle/>
+          <a:p>
+            <a:pPr algn="ctr"/>
+            <a:endParaRPr lang="ko-KR" altLang="en-US"/>
+          </a:p>
+        </p:txBody>
+      </p:sp>
     </p:spTree>
     <p:extLst>
       <p:ext uri="{BB962C8B-B14F-4D97-AF65-F5344CB8AC3E}">
-        <p14:creationId xmlns:p14="http://schemas.microsoft.com/office/powerpoint/2010/main" val="332052180"/>
+        <p14:creationId xmlns:p14="http://schemas.microsoft.com/office/powerpoint/2010/main" val="1020084646"/>
       </p:ext>
     </p:extLst>
   </p:cSld>
@@ -9799,18 +10481,20 @@
               </a:ext>
             </a:extLst>
           </p:cNvPr>
-          <p:cNvCxnSpPr/>
+          <p:cNvCxnSpPr>
+            <a:cxnSpLocks/>
+          </p:cNvCxnSpPr>
           <p:nvPr/>
         </p:nvCxnSpPr>
         <p:spPr>
           <a:xfrm>
-            <a:off x="3634154" y="2767892"/>
-            <a:ext cx="4923692" cy="0"/>
+            <a:off x="10337785" y="696814"/>
+            <a:ext cx="1577992" cy="0"/>
           </a:xfrm>
           <a:prstGeom prst="line">
             <a:avLst/>
           </a:prstGeom>
-          <a:ln w="63500">
+          <a:ln w="34925">
             <a:solidFill>
               <a:schemeClr val="tx2"/>
             </a:solidFill>
@@ -9831,27 +10515,118 @@
           </a:fontRef>
         </p:style>
       </p:cxnSp>
+      <p:sp>
+        <p:nvSpPr>
+          <p:cNvPr id="6" name="TextBox 5">
+            <a:extLst>
+              <a:ext uri="{FF2B5EF4-FFF2-40B4-BE49-F238E27FC236}">
+                <a16:creationId xmlns:a16="http://schemas.microsoft.com/office/drawing/2014/main" id="{C7B00371-8BBF-468F-BAB5-3B58CE59B669}"/>
+              </a:ext>
+            </a:extLst>
+          </p:cNvPr>
+          <p:cNvSpPr txBox="1"/>
+          <p:nvPr/>
+        </p:nvSpPr>
+        <p:spPr>
+          <a:xfrm>
+            <a:off x="10337785" y="310773"/>
+            <a:ext cx="1577991" cy="400110"/>
+          </a:xfrm>
+          <a:prstGeom prst="rect">
+            <a:avLst/>
+          </a:prstGeom>
+          <a:noFill/>
+        </p:spPr>
+        <p:txBody>
+          <a:bodyPr wrap="square" rtlCol="0">
+            <a:spAutoFit/>
+          </a:bodyPr>
+          <a:lstStyle/>
+          <a:p>
+            <a:pPr algn="ctr"/>
+            <a:r>
+              <a:rPr lang="ko-KR" altLang="en-US" sz="2000" dirty="0" err="1">
+                <a:solidFill>
+                  <a:schemeClr val="tx2">
+                    <a:lumMod val="50000"/>
+                  </a:schemeClr>
+                </a:solidFill>
+                <a:latin typeface="나눔스퀘어 ExtraBold" panose="020B0600000101010101" pitchFamily="50" charset="-127"/>
+                <a:ea typeface="나눔스퀘어 ExtraBold" panose="020B0600000101010101" pitchFamily="50" charset="-127"/>
+              </a:rPr>
+              <a:t>컴공특</a:t>
+            </a:r>
+            <a:r>
+              <a:rPr lang="ko-KR" altLang="en-US" sz="2000" dirty="0">
+                <a:solidFill>
+                  <a:schemeClr val="tx2">
+                    <a:lumMod val="50000"/>
+                  </a:schemeClr>
+                </a:solidFill>
+                <a:latin typeface="나눔스퀘어 ExtraBold" panose="020B0600000101010101" pitchFamily="50" charset="-127"/>
+                <a:ea typeface="나눔스퀘어 ExtraBold" panose="020B0600000101010101" pitchFamily="50" charset="-127"/>
+              </a:rPr>
+              <a:t> </a:t>
+            </a:r>
+            <a:r>
+              <a:rPr lang="en-US" altLang="ko-KR" sz="2000" dirty="0">
+                <a:solidFill>
+                  <a:schemeClr val="tx2">
+                    <a:lumMod val="50000"/>
+                  </a:schemeClr>
+                </a:solidFill>
+                <a:latin typeface="나눔스퀘어 ExtraBold" panose="020B0600000101010101" pitchFamily="50" charset="-127"/>
+                <a:ea typeface="나눔스퀘어 ExtraBold" panose="020B0600000101010101" pitchFamily="50" charset="-127"/>
+              </a:rPr>
+              <a:t>3</a:t>
+            </a:r>
+            <a:r>
+              <a:rPr lang="ko-KR" altLang="en-US" sz="2000" dirty="0">
+                <a:solidFill>
+                  <a:schemeClr val="tx2">
+                    <a:lumMod val="50000"/>
+                  </a:schemeClr>
+                </a:solidFill>
+                <a:latin typeface="나눔스퀘어 ExtraBold" panose="020B0600000101010101" pitchFamily="50" charset="-127"/>
+                <a:ea typeface="나눔스퀘어 ExtraBold" panose="020B0600000101010101" pitchFamily="50" charset="-127"/>
+              </a:rPr>
+              <a:t>팀</a:t>
+            </a:r>
+            <a:endParaRPr lang="en-US" altLang="ko-KR" sz="2000" dirty="0">
+              <a:solidFill>
+                <a:schemeClr val="tx2">
+                  <a:lumMod val="50000"/>
+                </a:schemeClr>
+              </a:solidFill>
+              <a:latin typeface="나눔스퀘어 ExtraBold" panose="020B0600000101010101" pitchFamily="50" charset="-127"/>
+              <a:ea typeface="나눔스퀘어 ExtraBold" panose="020B0600000101010101" pitchFamily="50" charset="-127"/>
+            </a:endParaRPr>
+          </a:p>
+        </p:txBody>
+      </p:sp>
       <p:cxnSp>
         <p:nvCxnSpPr>
-          <p:cNvPr id="5" name="직선 연결선 4">
-            <a:extLst>
-              <a:ext uri="{FF2B5EF4-FFF2-40B4-BE49-F238E27FC236}">
-                <a16:creationId xmlns:a16="http://schemas.microsoft.com/office/drawing/2014/main" id="{D3691A12-0DD2-46C8-AA88-68CCF5455840}"/>
-              </a:ext>
-            </a:extLst>
-          </p:cNvPr>
-          <p:cNvCxnSpPr/>
+          <p:cNvPr id="9" name="직선 연결선 8">
+            <a:extLst>
+              <a:ext uri="{FF2B5EF4-FFF2-40B4-BE49-F238E27FC236}">
+                <a16:creationId xmlns:a16="http://schemas.microsoft.com/office/drawing/2014/main" id="{5140239F-7841-40D4-B023-7486FD09274D}"/>
+              </a:ext>
+            </a:extLst>
+          </p:cNvPr>
+          <p:cNvCxnSpPr>
+            <a:cxnSpLocks/>
+          </p:cNvCxnSpPr>
           <p:nvPr/>
         </p:nvCxnSpPr>
         <p:spPr>
           <a:xfrm>
-            <a:off x="3634154" y="3953021"/>
-            <a:ext cx="4923692" cy="0"/>
+            <a:off x="10337785" y="267285"/>
+            <a:ext cx="1577992" cy="0"/>
           </a:xfrm>
           <a:prstGeom prst="line">
             <a:avLst/>
           </a:prstGeom>
-          <a:ln w="63500">
+          <a:ln w="34925">
             <a:solidFill>
               <a:schemeClr val="tx2"/>
             </a:solidFill>
@@ -9874,10 +10649,10 @@
       </p:cxnSp>
       <p:sp>
         <p:nvSpPr>
-          <p:cNvPr id="6" name="TextBox 5">
-            <a:extLst>
-              <a:ext uri="{FF2B5EF4-FFF2-40B4-BE49-F238E27FC236}">
-                <a16:creationId xmlns:a16="http://schemas.microsoft.com/office/drawing/2014/main" id="{C7B00371-8BBF-468F-BAB5-3B58CE59B669}"/>
+          <p:cNvPr id="17" name="TextBox 16">
+            <a:extLst>
+              <a:ext uri="{FF2B5EF4-FFF2-40B4-BE49-F238E27FC236}">
+                <a16:creationId xmlns:a16="http://schemas.microsoft.com/office/drawing/2014/main" id="{EF93F456-2C49-4A85-B01B-2D6BD46D6E98}"/>
               </a:ext>
             </a:extLst>
           </p:cNvPr>
@@ -9886,8 +10661,8 @@
         </p:nvSpPr>
         <p:spPr>
           <a:xfrm>
-            <a:off x="4732485" y="3105834"/>
-            <a:ext cx="2492285" cy="646331"/>
+            <a:off x="762855" y="1295512"/>
+            <a:ext cx="10680876" cy="461665"/>
           </a:xfrm>
           <a:prstGeom prst="rect">
             <a:avLst/>
@@ -9895,13 +10670,152 @@
           <a:noFill/>
         </p:spPr>
         <p:txBody>
-          <a:bodyPr wrap="none" rtlCol="0">
+          <a:bodyPr wrap="square" rtlCol="0">
             <a:spAutoFit/>
           </a:bodyPr>
           <a:lstStyle/>
           <a:p>
             <a:r>
-              <a:rPr lang="en-US" altLang="ko-KR" sz="3600" dirty="0">
+              <a:rPr lang="ko-KR" altLang="en-US" sz="2400" spc="100" dirty="0">
+                <a:solidFill>
+                  <a:srgbClr val="44546A"/>
+                </a:solidFill>
+                <a:latin typeface="나눔스퀘어 Bold" panose="020B0600000101010101" pitchFamily="50" charset="-127"/>
+                <a:ea typeface="나눔스퀘어 Bold" panose="020B0600000101010101" pitchFamily="50" charset="-127"/>
+              </a:rPr>
+              <a:t>문제</a:t>
+            </a:r>
+            <a:r>
+              <a:rPr lang="en-US" altLang="ko-KR" sz="2400" spc="100" dirty="0">
+                <a:solidFill>
+                  <a:srgbClr val="44546A"/>
+                </a:solidFill>
+                <a:latin typeface="나눔스퀘어 Bold" panose="020B0600000101010101" pitchFamily="50" charset="-127"/>
+                <a:ea typeface="나눔스퀘어 Bold" panose="020B0600000101010101" pitchFamily="50" charset="-127"/>
+              </a:rPr>
+              <a:t>, </a:t>
+            </a:r>
+            <a:r>
+              <a:rPr lang="ko-KR" altLang="en-US" sz="2400" spc="100" dirty="0">
+                <a:solidFill>
+                  <a:srgbClr val="44546A"/>
+                </a:solidFill>
+                <a:latin typeface="나눔스퀘어 Bold" panose="020B0600000101010101" pitchFamily="50" charset="-127"/>
+                <a:ea typeface="나눔스퀘어 Bold" panose="020B0600000101010101" pitchFamily="50" charset="-127"/>
+              </a:rPr>
+              <a:t>답지 </a:t>
+            </a:r>
+            <a:r>
+              <a:rPr lang="en-US" altLang="ko-KR" sz="2400" spc="100" dirty="0">
+                <a:solidFill>
+                  <a:srgbClr val="44546A"/>
+                </a:solidFill>
+                <a:latin typeface="나눔스퀘어 Bold" panose="020B0600000101010101" pitchFamily="50" charset="-127"/>
+                <a:ea typeface="나눔스퀘어 Bold" panose="020B0600000101010101" pitchFamily="50" charset="-127"/>
+              </a:rPr>
+              <a:t>ppt</a:t>
+            </a:r>
+          </a:p>
+        </p:txBody>
+      </p:sp>
+      <p:sp>
+        <p:nvSpPr>
+          <p:cNvPr id="2" name="TextBox 1">
+            <a:extLst>
+              <a:ext uri="{FF2B5EF4-FFF2-40B4-BE49-F238E27FC236}">
+                <a16:creationId xmlns:a16="http://schemas.microsoft.com/office/drawing/2014/main" id="{2EB84E09-966C-F46D-B211-890C52264C2E}"/>
+              </a:ext>
+            </a:extLst>
+          </p:cNvPr>
+          <p:cNvSpPr txBox="1"/>
+          <p:nvPr/>
+        </p:nvSpPr>
+        <p:spPr>
+          <a:xfrm>
+            <a:off x="8802448" y="267286"/>
+            <a:ext cx="1183644" cy="461665"/>
+          </a:xfrm>
+          <a:prstGeom prst="rect">
+            <a:avLst/>
+          </a:prstGeom>
+          <a:noFill/>
+        </p:spPr>
+        <p:txBody>
+          <a:bodyPr wrap="square" rtlCol="0">
+            <a:spAutoFit/>
+          </a:bodyPr>
+          <a:lstStyle/>
+          <a:p>
+            <a:r>
+              <a:rPr lang="en-US" altLang="ko-KR" sz="2400" spc="100" dirty="0">
+                <a:solidFill>
+                  <a:srgbClr val="000000"/>
+                </a:solidFill>
+                <a:latin typeface="나눔스퀘어 Bold" panose="020B0600000101010101" pitchFamily="50" charset="-127"/>
+                <a:ea typeface="나눔스퀘어 Bold" panose="020B0600000101010101" pitchFamily="50" charset="-127"/>
+              </a:rPr>
+              <a:t>p.</a:t>
+            </a:r>
+            <a:r>
+              <a:rPr lang="ko-KR" altLang="en-US" sz="2400" spc="100" dirty="0">
+                <a:solidFill>
+                  <a:srgbClr val="000000"/>
+                </a:solidFill>
+                <a:latin typeface="나눔스퀘어 Bold" panose="020B0600000101010101" pitchFamily="50" charset="-127"/>
+                <a:ea typeface="나눔스퀘어 Bold" panose="020B0600000101010101" pitchFamily="50" charset="-127"/>
+              </a:rPr>
+              <a:t> </a:t>
+            </a:r>
+            <a:r>
+              <a:rPr lang="en-US" altLang="ko-KR" sz="2400" spc="100" dirty="0">
+                <a:solidFill>
+                  <a:srgbClr val="000000"/>
+                </a:solidFill>
+                <a:latin typeface="나눔스퀘어 Bold" panose="020B0600000101010101" pitchFamily="50" charset="-127"/>
+                <a:ea typeface="나눔스퀘어 Bold" panose="020B0600000101010101" pitchFamily="50" charset="-127"/>
+              </a:rPr>
+              <a:t>206</a:t>
+            </a:r>
+            <a:endParaRPr lang="ko-KR" altLang="en-US" sz="2400" spc="100" dirty="0">
+              <a:solidFill>
+                <a:srgbClr val="000000"/>
+              </a:solidFill>
+              <a:latin typeface="나눔스퀘어 Bold" panose="020B0600000101010101" pitchFamily="50" charset="-127"/>
+              <a:ea typeface="나눔스퀘어 Bold" panose="020B0600000101010101" pitchFamily="50" charset="-127"/>
+            </a:endParaRPr>
+          </a:p>
+        </p:txBody>
+      </p:sp>
+      <p:sp>
+        <p:nvSpPr>
+          <p:cNvPr id="7" name="TextBox 6">
+            <a:extLst>
+              <a:ext uri="{FF2B5EF4-FFF2-40B4-BE49-F238E27FC236}">
+                <a16:creationId xmlns:a16="http://schemas.microsoft.com/office/drawing/2014/main" id="{4606FCED-B5C5-504C-8AC2-3FA7D42146AC}"/>
+              </a:ext>
+            </a:extLst>
+          </p:cNvPr>
+          <p:cNvSpPr txBox="1"/>
+          <p:nvPr/>
+        </p:nvSpPr>
+        <p:spPr>
+          <a:xfrm>
+            <a:off x="276223" y="310773"/>
+            <a:ext cx="6599706" cy="553998"/>
+          </a:xfrm>
+          <a:prstGeom prst="rect">
+            <a:avLst/>
+          </a:prstGeom>
+          <a:noFill/>
+        </p:spPr>
+        <p:txBody>
+          <a:bodyPr wrap="square" rtlCol="0">
+            <a:spAutoFit/>
+          </a:bodyPr>
+          <a:lstStyle/>
+          <a:p>
+            <a:r>
+              <a:rPr lang="en-US" altLang="ko-KR" sz="3000" spc="100" dirty="0">
                 <a:solidFill>
                   <a:schemeClr val="tx2">
                     <a:lumMod val="50000"/>
@@ -9910,15 +10824,183 @@
                 <a:latin typeface="나눔스퀘어 ExtraBold" panose="020B0600000101010101" pitchFamily="50" charset="-127"/>
                 <a:ea typeface="나눔스퀘어 ExtraBold" panose="020B0600000101010101" pitchFamily="50" charset="-127"/>
               </a:rPr>
-              <a:t>Thank you</a:t>
-            </a:r>
+              <a:t>3. </a:t>
+            </a:r>
+            <a:r>
+              <a:rPr lang="ko-KR" altLang="en-US" sz="3000" spc="100" dirty="0">
+                <a:solidFill>
+                  <a:schemeClr val="tx2">
+                    <a:lumMod val="50000"/>
+                  </a:schemeClr>
+                </a:solidFill>
+                <a:latin typeface="나눔스퀘어 ExtraBold" panose="020B0600000101010101" pitchFamily="50" charset="-127"/>
+                <a:ea typeface="나눔스퀘어 ExtraBold" panose="020B0600000101010101" pitchFamily="50" charset="-127"/>
+              </a:rPr>
+              <a:t>전역 변수의 사용을 억제하는 방법</a:t>
+            </a:r>
+          </a:p>
+        </p:txBody>
+      </p:sp>
+      <p:sp>
+        <p:nvSpPr>
+          <p:cNvPr id="10" name="TextBox 9">
+            <a:extLst>
+              <a:ext uri="{FF2B5EF4-FFF2-40B4-BE49-F238E27FC236}">
+                <a16:creationId xmlns:a16="http://schemas.microsoft.com/office/drawing/2014/main" id="{02AFF967-66B7-3EA3-20E6-621981EA5089}"/>
+              </a:ext>
+            </a:extLst>
+          </p:cNvPr>
+          <p:cNvSpPr txBox="1"/>
+          <p:nvPr/>
+        </p:nvSpPr>
+        <p:spPr>
+          <a:xfrm>
+            <a:off x="762855" y="1760056"/>
+            <a:ext cx="10680876" cy="1569660"/>
+          </a:xfrm>
+          <a:prstGeom prst="rect">
+            <a:avLst/>
+          </a:prstGeom>
+          <a:noFill/>
+        </p:spPr>
+        <p:txBody>
+          <a:bodyPr wrap="square" rtlCol="0">
+            <a:spAutoFit/>
+          </a:bodyPr>
+          <a:lstStyle/>
+          <a:p>
+            <a:r>
+              <a:rPr lang="en-US" altLang="ko-KR" sz="2400" spc="100" dirty="0">
+                <a:solidFill>
+                  <a:srgbClr val="44546A"/>
+                </a:solidFill>
+                <a:latin typeface="나눔스퀘어 Bold" panose="020B0600000101010101" pitchFamily="50" charset="-127"/>
+                <a:ea typeface="나눔스퀘어 Bold" panose="020B0600000101010101" pitchFamily="50" charset="-127"/>
+              </a:rPr>
+              <a:t>	+</a:t>
+            </a:r>
+            <a:r>
+              <a:rPr lang="ko-KR" altLang="en-US" sz="2400" spc="100" dirty="0">
+                <a:solidFill>
+                  <a:srgbClr val="44546A"/>
+                </a:solidFill>
+                <a:latin typeface="나눔스퀘어 Bold" panose="020B0600000101010101" pitchFamily="50" charset="-127"/>
+                <a:ea typeface="나눔스퀘어 Bold" panose="020B0600000101010101" pitchFamily="50" charset="-127"/>
+              </a:rPr>
+              <a:t> </a:t>
+            </a:r>
+            <a:r>
+              <a:rPr lang="en-US" altLang="ko-KR" sz="2400" spc="100" dirty="0">
+                <a:solidFill>
+                  <a:srgbClr val="44546A"/>
+                </a:solidFill>
+                <a:latin typeface="나눔스퀘어 Bold" panose="020B0600000101010101" pitchFamily="50" charset="-127"/>
+                <a:ea typeface="나눔스퀘어 Bold" panose="020B0600000101010101" pitchFamily="50" charset="-127"/>
+              </a:rPr>
+              <a:t>#</a:t>
+            </a:r>
+            <a:r>
+              <a:rPr lang="ko-KR" altLang="en-US" sz="2400" spc="100" dirty="0">
+                <a:solidFill>
+                  <a:srgbClr val="44546A"/>
+                </a:solidFill>
+                <a:latin typeface="나눔스퀘어 Bold" panose="020B0600000101010101" pitchFamily="50" charset="-127"/>
+                <a:ea typeface="나눔스퀘어 Bold" panose="020B0600000101010101" pitchFamily="50" charset="-127"/>
+              </a:rPr>
+              <a:t> 키워드 </a:t>
+            </a:r>
+            <a:r>
+              <a:rPr lang="ko-KR" altLang="en-US" sz="2400" dirty="0">
+                <a:hlinkClick r:id="rId2"/>
+              </a:rPr>
+              <a:t>자바스크립트 디자인 패턴 </a:t>
+            </a:r>
+            <a:r>
+              <a:rPr lang="en-US" altLang="ko-KR" sz="2400" dirty="0">
+                <a:hlinkClick r:id="rId2"/>
+              </a:rPr>
+              <a:t>— </a:t>
+            </a:r>
+            <a:r>
+              <a:rPr lang="ko-KR" altLang="en-US" sz="2400" dirty="0">
+                <a:hlinkClick r:id="rId2"/>
+              </a:rPr>
+              <a:t>모듈 패턴</a:t>
+            </a:r>
+            <a:r>
+              <a:rPr lang="en-US" altLang="ko-KR" sz="2400" dirty="0">
+                <a:hlinkClick r:id="rId2"/>
+              </a:rPr>
+              <a:t>. </a:t>
+            </a:r>
+            <a:r>
+              <a:rPr lang="ko-KR" altLang="en-US" sz="2400" dirty="0" err="1">
+                <a:hlinkClick r:id="rId2"/>
+              </a:rPr>
+              <a:t>클로져를</a:t>
+            </a:r>
+            <a:r>
+              <a:rPr lang="ko-KR" altLang="en-US" sz="2400" dirty="0">
+                <a:hlinkClick r:id="rId2"/>
+              </a:rPr>
+              <a:t> 이용한 모듈 패턴을 알아본다 </a:t>
+            </a:r>
+            <a:r>
+              <a:rPr lang="en-US" altLang="ko-KR" sz="2400" dirty="0">
+                <a:hlinkClick r:id="rId2"/>
+              </a:rPr>
+              <a:t>| by Moon | </a:t>
+            </a:r>
+            <a:r>
+              <a:rPr lang="ko-KR" altLang="en-US" sz="2400" dirty="0">
+                <a:hlinkClick r:id="rId2"/>
+              </a:rPr>
+              <a:t>오늘의 프로그래밍 </a:t>
+            </a:r>
+            <a:r>
+              <a:rPr lang="en-US" altLang="ko-KR" sz="2400" dirty="0">
+                <a:hlinkClick r:id="rId2"/>
+              </a:rPr>
+              <a:t>| Medium</a:t>
+            </a:r>
+            <a:endParaRPr lang="en-US" altLang="ko-KR" sz="2400" dirty="0"/>
+          </a:p>
+          <a:p>
+            <a:endParaRPr lang="en-US" altLang="ko-KR" sz="2400" spc="100" dirty="0">
+              <a:solidFill>
+                <a:srgbClr val="44546A"/>
+              </a:solidFill>
+              <a:latin typeface="나눔스퀘어 Bold" panose="020B0600000101010101" pitchFamily="50" charset="-127"/>
+              <a:ea typeface="나눔스퀘어 Bold" panose="020B0600000101010101" pitchFamily="50" charset="-127"/>
+            </a:endParaRPr>
+          </a:p>
+          <a:p>
+            <a:r>
+              <a:rPr lang="ko-KR" altLang="en-US" sz="2400" dirty="0">
+                <a:hlinkClick r:id="rId3"/>
+              </a:rPr>
+              <a:t>클래스와 기본 문법 </a:t>
+            </a:r>
+            <a:r>
+              <a:rPr lang="en-US" altLang="ko-KR" sz="2400">
+                <a:hlinkClick r:id="rId3"/>
+              </a:rPr>
+              <a:t>(javascript.info)</a:t>
+            </a:r>
+            <a:endParaRPr lang="en-US" altLang="ko-KR" sz="2400" spc="100" dirty="0">
+              <a:solidFill>
+                <a:srgbClr val="44546A"/>
+              </a:solidFill>
+              <a:latin typeface="나눔스퀘어 Bold" panose="020B0600000101010101" pitchFamily="50" charset="-127"/>
+              <a:ea typeface="나눔스퀘어 Bold" panose="020B0600000101010101" pitchFamily="50" charset="-127"/>
+            </a:endParaRPr>
           </a:p>
         </p:txBody>
       </p:sp>
     </p:spTree>
     <p:extLst>
       <p:ext uri="{BB962C8B-B14F-4D97-AF65-F5344CB8AC3E}">
-        <p14:creationId xmlns:p14="http://schemas.microsoft.com/office/powerpoint/2010/main" val="2543448400"/>
+        <p14:creationId xmlns:p14="http://schemas.microsoft.com/office/powerpoint/2010/main" val="332052180"/>
       </p:ext>
     </p:extLst>
   </p:cSld>
@@ -10246,6 +11328,173 @@
     <p:extLst>
       <p:ext uri="{BB962C8B-B14F-4D97-AF65-F5344CB8AC3E}">
         <p14:creationId xmlns:p14="http://schemas.microsoft.com/office/powerpoint/2010/main" val="4174658498"/>
+      </p:ext>
+    </p:extLst>
+  </p:cSld>
+  <p:clrMapOvr>
+    <a:masterClrMapping/>
+  </p:clrMapOvr>
+  <mc:AlternateContent xmlns:mc="http://schemas.openxmlformats.org/markup-compatibility/2006" xmlns:p159="http://schemas.microsoft.com/office/powerpoint/2015/09/main">
+    <mc:Choice Requires="p159">
+      <p:transition xmlns:p14="http://schemas.microsoft.com/office/powerpoint/2010/main" spd="slow" p14:dur="2000">
+        <p159:morph option="byObject"/>
+      </p:transition>
+    </mc:Choice>
+    <mc:Fallback xmlns="">
+      <p:transition spd="slow">
+        <p:fade/>
+      </p:transition>
+    </mc:Fallback>
+  </mc:AlternateContent>
+</p:sld>
+</file>
+
+<file path=ppt/slides/slide20.xml><?xml version="1.0" encoding="utf-8"?>
+<p:sld xmlns:a="http://schemas.openxmlformats.org/drawingml/2006/main" xmlns:r="http://schemas.openxmlformats.org/officeDocument/2006/relationships" xmlns:p="http://schemas.openxmlformats.org/presentationml/2006/main">
+  <p:cSld>
+    <p:spTree>
+      <p:nvGrpSpPr>
+        <p:cNvPr id="1" name=""/>
+        <p:cNvGrpSpPr/>
+        <p:nvPr/>
+      </p:nvGrpSpPr>
+      <p:grpSpPr>
+        <a:xfrm>
+          <a:off x="0" y="0"/>
+          <a:ext cx="0" cy="0"/>
+          <a:chOff x="0" y="0"/>
+          <a:chExt cx="0" cy="0"/>
+        </a:xfrm>
+      </p:grpSpPr>
+      <p:cxnSp>
+        <p:nvCxnSpPr>
+          <p:cNvPr id="3" name="직선 연결선 2">
+            <a:extLst>
+              <a:ext uri="{FF2B5EF4-FFF2-40B4-BE49-F238E27FC236}">
+                <a16:creationId xmlns:a16="http://schemas.microsoft.com/office/drawing/2014/main" id="{F55676F0-C433-4456-BB57-3E5832581EF6}"/>
+              </a:ext>
+            </a:extLst>
+          </p:cNvPr>
+          <p:cNvCxnSpPr/>
+          <p:nvPr/>
+        </p:nvCxnSpPr>
+        <p:spPr>
+          <a:xfrm>
+            <a:off x="3634154" y="2767892"/>
+            <a:ext cx="4923692" cy="0"/>
+          </a:xfrm>
+          <a:prstGeom prst="line">
+            <a:avLst/>
+          </a:prstGeom>
+          <a:ln w="63500">
+            <a:solidFill>
+              <a:schemeClr val="tx2"/>
+            </a:solidFill>
+          </a:ln>
+        </p:spPr>
+        <p:style>
+          <a:lnRef idx="1">
+            <a:schemeClr val="accent1"/>
+          </a:lnRef>
+          <a:fillRef idx="0">
+            <a:schemeClr val="accent1"/>
+          </a:fillRef>
+          <a:effectRef idx="0">
+            <a:schemeClr val="accent1"/>
+          </a:effectRef>
+          <a:fontRef idx="minor">
+            <a:schemeClr val="tx1"/>
+          </a:fontRef>
+        </p:style>
+      </p:cxnSp>
+      <p:cxnSp>
+        <p:nvCxnSpPr>
+          <p:cNvPr id="5" name="직선 연결선 4">
+            <a:extLst>
+              <a:ext uri="{FF2B5EF4-FFF2-40B4-BE49-F238E27FC236}">
+                <a16:creationId xmlns:a16="http://schemas.microsoft.com/office/drawing/2014/main" id="{D3691A12-0DD2-46C8-AA88-68CCF5455840}"/>
+              </a:ext>
+            </a:extLst>
+          </p:cNvPr>
+          <p:cNvCxnSpPr/>
+          <p:nvPr/>
+        </p:nvCxnSpPr>
+        <p:spPr>
+          <a:xfrm>
+            <a:off x="3634154" y="3953021"/>
+            <a:ext cx="4923692" cy="0"/>
+          </a:xfrm>
+          <a:prstGeom prst="line">
+            <a:avLst/>
+          </a:prstGeom>
+          <a:ln w="63500">
+            <a:solidFill>
+              <a:schemeClr val="tx2"/>
+            </a:solidFill>
+          </a:ln>
+        </p:spPr>
+        <p:style>
+          <a:lnRef idx="1">
+            <a:schemeClr val="accent1"/>
+          </a:lnRef>
+          <a:fillRef idx="0">
+            <a:schemeClr val="accent1"/>
+          </a:fillRef>
+          <a:effectRef idx="0">
+            <a:schemeClr val="accent1"/>
+          </a:effectRef>
+          <a:fontRef idx="minor">
+            <a:schemeClr val="tx1"/>
+          </a:fontRef>
+        </p:style>
+      </p:cxnSp>
+      <p:sp>
+        <p:nvSpPr>
+          <p:cNvPr id="6" name="TextBox 5">
+            <a:extLst>
+              <a:ext uri="{FF2B5EF4-FFF2-40B4-BE49-F238E27FC236}">
+                <a16:creationId xmlns:a16="http://schemas.microsoft.com/office/drawing/2014/main" id="{C7B00371-8BBF-468F-BAB5-3B58CE59B669}"/>
+              </a:ext>
+            </a:extLst>
+          </p:cNvPr>
+          <p:cNvSpPr txBox="1"/>
+          <p:nvPr/>
+        </p:nvSpPr>
+        <p:spPr>
+          <a:xfrm>
+            <a:off x="4732485" y="3105834"/>
+            <a:ext cx="2492285" cy="646331"/>
+          </a:xfrm>
+          <a:prstGeom prst="rect">
+            <a:avLst/>
+          </a:prstGeom>
+          <a:noFill/>
+        </p:spPr>
+        <p:txBody>
+          <a:bodyPr wrap="none" rtlCol="0">
+            <a:spAutoFit/>
+          </a:bodyPr>
+          <a:lstStyle/>
+          <a:p>
+            <a:r>
+              <a:rPr lang="en-US" altLang="ko-KR" sz="3600" dirty="0">
+                <a:solidFill>
+                  <a:schemeClr val="tx2">
+                    <a:lumMod val="50000"/>
+                  </a:schemeClr>
+                </a:solidFill>
+                <a:latin typeface="나눔스퀘어 ExtraBold" panose="020B0600000101010101" pitchFamily="50" charset="-127"/>
+                <a:ea typeface="나눔스퀘어 ExtraBold" panose="020B0600000101010101" pitchFamily="50" charset="-127"/>
+              </a:rPr>
+              <a:t>Thank you</a:t>
+            </a:r>
+          </a:p>
+        </p:txBody>
+      </p:sp>
+    </p:spTree>
+    <p:extLst>
+      <p:ext uri="{BB962C8B-B14F-4D97-AF65-F5344CB8AC3E}">
+        <p14:creationId xmlns:p14="http://schemas.microsoft.com/office/powerpoint/2010/main" val="2543448400"/>
       </p:ext>
     </p:extLst>
   </p:cSld>
@@ -12054,13 +13303,13 @@
   <p:clrMapOvr>
     <a:masterClrMapping/>
   </p:clrMapOvr>
-  <mc:AlternateContent xmlns:mc="http://schemas.openxmlformats.org/markup-compatibility/2006">
-    <mc:Choice xmlns:p159="http://schemas.microsoft.com/office/powerpoint/2015/09/main" Requires="p159">
+  <mc:AlternateContent xmlns:mc="http://schemas.openxmlformats.org/markup-compatibility/2006" xmlns:p159="http://schemas.microsoft.com/office/powerpoint/2015/09/main">
+    <mc:Choice Requires="p159">
       <p:transition xmlns:p14="http://schemas.microsoft.com/office/powerpoint/2010/main" spd="slow" p14:dur="2000">
         <p159:morph option="byObject"/>
       </p:transition>
     </mc:Choice>
-    <mc:Fallback>
+    <mc:Fallback xmlns="">
       <p:transition spd="slow">
         <p:fade/>
       </p:transition>
@@ -12601,13 +13850,13 @@
   <p:clrMapOvr>
     <a:masterClrMapping/>
   </p:clrMapOvr>
-  <mc:AlternateContent xmlns:mc="http://schemas.openxmlformats.org/markup-compatibility/2006">
-    <mc:Choice xmlns:p159="http://schemas.microsoft.com/office/powerpoint/2015/09/main" Requires="p159">
+  <mc:AlternateContent xmlns:mc="http://schemas.openxmlformats.org/markup-compatibility/2006" xmlns:p159="http://schemas.microsoft.com/office/powerpoint/2015/09/main">
+    <mc:Choice Requires="p159">
       <p:transition xmlns:p14="http://schemas.microsoft.com/office/powerpoint/2010/main" spd="slow" p14:dur="2000">
         <p159:morph option="byObject"/>
       </p:transition>
     </mc:Choice>
-    <mc:Fallback>
+    <mc:Fallback xmlns="">
       <p:transition spd="slow">
         <p:fade/>
       </p:transition>
@@ -13350,13 +14599,13 @@
   <p:clrMapOvr>
     <a:masterClrMapping/>
   </p:clrMapOvr>
-  <mc:AlternateContent xmlns:mc="http://schemas.openxmlformats.org/markup-compatibility/2006">
-    <mc:Choice xmlns:p159="http://schemas.microsoft.com/office/powerpoint/2015/09/main" Requires="p159">
+  <mc:AlternateContent xmlns:mc="http://schemas.openxmlformats.org/markup-compatibility/2006" xmlns:p159="http://schemas.microsoft.com/office/powerpoint/2015/09/main">
+    <mc:Choice Requires="p159">
       <p:transition xmlns:p14="http://schemas.microsoft.com/office/powerpoint/2010/main" spd="slow" p14:dur="2000">
         <p159:morph option="byObject"/>
       </p:transition>
     </mc:Choice>
-    <mc:Fallback>
+    <mc:Fallback xmlns="">
       <p:transition spd="slow">
         <p:fade/>
       </p:transition>
@@ -13882,13 +15131,13 @@
   <p:clrMapOvr>
     <a:masterClrMapping/>
   </p:clrMapOvr>
-  <mc:AlternateContent xmlns:mc="http://schemas.openxmlformats.org/markup-compatibility/2006">
-    <mc:Choice xmlns:p159="http://schemas.microsoft.com/office/powerpoint/2015/09/main" Requires="p159">
+  <mc:AlternateContent xmlns:mc="http://schemas.openxmlformats.org/markup-compatibility/2006" xmlns:p159="http://schemas.microsoft.com/office/powerpoint/2015/09/main">
+    <mc:Choice Requires="p159">
       <p:transition xmlns:p14="http://schemas.microsoft.com/office/powerpoint/2010/main" spd="slow" p14:dur="2000">
         <p159:morph option="byObject"/>
       </p:transition>
     </mc:Choice>
-    <mc:Fallback>
+    <mc:Fallback xmlns="">
       <p:transition spd="slow">
         <p:fade/>
       </p:transition>
@@ -14651,13 +15900,13 @@
   <p:clrMapOvr>
     <a:masterClrMapping/>
   </p:clrMapOvr>
-  <mc:AlternateContent xmlns:mc="http://schemas.openxmlformats.org/markup-compatibility/2006">
-    <mc:Choice xmlns:p159="http://schemas.microsoft.com/office/powerpoint/2015/09/main" Requires="p159">
+  <mc:AlternateContent xmlns:mc="http://schemas.openxmlformats.org/markup-compatibility/2006" xmlns:p159="http://schemas.microsoft.com/office/powerpoint/2015/09/main">
+    <mc:Choice Requires="p159">
       <p:transition xmlns:p14="http://schemas.microsoft.com/office/powerpoint/2010/main" spd="slow" p14:dur="2000">
         <p159:morph option="byObject"/>
       </p:transition>
     </mc:Choice>
-    <mc:Fallback>
+    <mc:Fallback xmlns="">
       <p:transition spd="slow">
         <p:fade/>
       </p:transition>

</xml_diff>

<commit_message>
docs(jaehoo1) : ppt 초안
</commit_message>
<xml_diff>
--- a/10. 전역 변수의 문제점/presentation10/jaehoo1/전역 변수의 문제점.pptx
+++ b/10. 전역 변수의 문제점/presentation10/jaehoo1/전역 변수의 문제점.pptx
@@ -21,9 +21,9 @@
     <p:sldId id="295" r:id="rId15"/>
     <p:sldId id="293" r:id="rId16"/>
     <p:sldId id="296" r:id="rId17"/>
-    <p:sldId id="297" r:id="rId18"/>
-    <p:sldId id="300" r:id="rId19"/>
-    <p:sldId id="299" r:id="rId20"/>
+    <p:sldId id="301" r:id="rId18"/>
+    <p:sldId id="297" r:id="rId19"/>
+    <p:sldId id="300" r:id="rId20"/>
     <p:sldId id="265" r:id="rId21"/>
   </p:sldIdLst>
   <p:sldSz cx="12192000" cy="6858000"/>
@@ -9006,16 +9006,6 @@
           <a:lstStyle/>
           <a:p>
             <a:r>
-              <a:rPr lang="en-US" altLang="ko-KR" sz="2400" spc="100" dirty="0">
-                <a:solidFill>
-                  <a:srgbClr val="44546A"/>
-                </a:solidFill>
-                <a:latin typeface="나눔스퀘어 Bold" panose="020B0600000101010101" pitchFamily="50" charset="-127"/>
-                <a:ea typeface="나눔스퀘어 Bold" panose="020B0600000101010101" pitchFamily="50" charset="-127"/>
-              </a:rPr>
-              <a:t>ES6 </a:t>
-            </a:r>
-            <a:r>
               <a:rPr lang="ko-KR" altLang="en-US" sz="2400" spc="100" dirty="0">
                 <a:solidFill>
                   <a:srgbClr val="44546A"/>
@@ -9023,7 +9013,7 @@
                 <a:latin typeface="나눔스퀘어 Bold" panose="020B0600000101010101" pitchFamily="50" charset="-127"/>
                 <a:ea typeface="나눔스퀘어 Bold" panose="020B0600000101010101" pitchFamily="50" charset="-127"/>
               </a:rPr>
-              <a:t>모듈</a:t>
+              <a:t>모듈 패턴</a:t>
             </a:r>
             <a:endParaRPr lang="en-US" altLang="ko-KR" sz="2400" spc="100" dirty="0">
               <a:solidFill>
@@ -9084,14 +9074,14 @@
               <a:t> </a:t>
             </a:r>
             <a:r>
-              <a:rPr lang="en-US" altLang="ko-KR" sz="2400" spc="100">
+              <a:rPr lang="en-US" altLang="ko-KR" sz="2400" spc="100" dirty="0">
                 <a:solidFill>
                   <a:srgbClr val="000000"/>
                 </a:solidFill>
                 <a:latin typeface="나눔스퀘어 Bold" panose="020B0600000101010101" pitchFamily="50" charset="-127"/>
                 <a:ea typeface="나눔스퀘어 Bold" panose="020B0600000101010101" pitchFamily="50" charset="-127"/>
               </a:rPr>
-              <a:t>207</a:t>
+              <a:t>206</a:t>
             </a:r>
             <a:endParaRPr lang="ko-KR" altLang="en-US" sz="2400" spc="100" dirty="0">
               <a:solidFill>
@@ -9172,7 +9162,7 @@
         </p:nvSpPr>
         <p:spPr>
           <a:xfrm>
-            <a:off x="762855" y="2187918"/>
+            <a:off x="762855" y="1760056"/>
             <a:ext cx="10680876" cy="461665"/>
           </a:xfrm>
           <a:prstGeom prst="rect">
@@ -9187,6 +9177,16 @@
           <a:lstStyle/>
           <a:p>
             <a:r>
+              <a:rPr lang="ko-KR" altLang="en-US" sz="2400" spc="100" dirty="0">
+                <a:solidFill>
+                  <a:srgbClr val="44546A"/>
+                </a:solidFill>
+                <a:latin typeface="나눔스퀘어 Bold" panose="020B0600000101010101" pitchFamily="50" charset="-127"/>
+                <a:ea typeface="나눔스퀘어 Bold" panose="020B0600000101010101" pitchFamily="50" charset="-127"/>
+              </a:rPr>
+              <a:t>번외로</a:t>
+            </a:r>
+            <a:r>
               <a:rPr lang="en-US" altLang="ko-KR" sz="2400" spc="100" dirty="0">
                 <a:solidFill>
                   <a:srgbClr val="44546A"/>
@@ -9194,7 +9194,7 @@
                 <a:latin typeface="나눔스퀘어 Bold" panose="020B0600000101010101" pitchFamily="50" charset="-127"/>
                 <a:ea typeface="나눔스퀘어 Bold" panose="020B0600000101010101" pitchFamily="50" charset="-127"/>
               </a:rPr>
-              <a:t>ES6 </a:t>
+              <a:t>, ES2020</a:t>
             </a:r>
             <a:r>
               <a:rPr lang="ko-KR" altLang="en-US" sz="2400" spc="100" dirty="0">
@@ -9204,7 +9204,7 @@
                 <a:latin typeface="나눔스퀘어 Bold" panose="020B0600000101010101" pitchFamily="50" charset="-127"/>
                 <a:ea typeface="나눔스퀘어 Bold" panose="020B0600000101010101" pitchFamily="50" charset="-127"/>
               </a:rPr>
-              <a:t>모듈을 사용하면 더는 전역 변수를 사용할 수 없다</a:t>
+              <a:t>에는 </a:t>
             </a:r>
             <a:r>
               <a:rPr lang="en-US" altLang="ko-KR" sz="2400" spc="100" dirty="0">
@@ -9214,39 +9214,18 @@
                 <a:latin typeface="나눔스퀘어 Bold" panose="020B0600000101010101" pitchFamily="50" charset="-127"/>
                 <a:ea typeface="나눔스퀘어 Bold" panose="020B0600000101010101" pitchFamily="50" charset="-127"/>
               </a:rPr>
-              <a:t>.</a:t>
-            </a:r>
-          </a:p>
-        </p:txBody>
-      </p:sp>
-      <p:sp>
-        <p:nvSpPr>
-          <p:cNvPr id="11" name="TextBox 10">
-            <a:extLst>
-              <a:ext uri="{FF2B5EF4-FFF2-40B4-BE49-F238E27FC236}">
-                <a16:creationId xmlns:a16="http://schemas.microsoft.com/office/drawing/2014/main" id="{BE0E17C1-17CF-493E-872F-7377FE566AEB}"/>
-              </a:ext>
-            </a:extLst>
-          </p:cNvPr>
-          <p:cNvSpPr txBox="1"/>
-          <p:nvPr/>
-        </p:nvSpPr>
-        <p:spPr>
-          <a:xfrm>
-            <a:off x="762855" y="2649583"/>
-            <a:ext cx="10680876" cy="461665"/>
-          </a:xfrm>
-          <a:prstGeom prst="rect">
-            <a:avLst/>
-          </a:prstGeom>
-          <a:noFill/>
-        </p:spPr>
-        <p:txBody>
-          <a:bodyPr wrap="square" rtlCol="0">
-            <a:spAutoFit/>
-          </a:bodyPr>
-          <a:lstStyle/>
-          <a:p>
+              <a:t>#</a:t>
+            </a:r>
+            <a:r>
+              <a:rPr lang="ko-KR" altLang="en-US" sz="2400" spc="100" dirty="0">
+                <a:solidFill>
+                  <a:srgbClr val="44546A"/>
+                </a:solidFill>
+                <a:latin typeface="나눔스퀘어 Bold" panose="020B0600000101010101" pitchFamily="50" charset="-127"/>
+                <a:ea typeface="나눔스퀘어 Bold" panose="020B0600000101010101" pitchFamily="50" charset="-127"/>
+              </a:rPr>
+              <a:t> 키워드를 이용해 </a:t>
+            </a:r>
             <a:r>
               <a:rPr lang="en-US" altLang="ko-KR" sz="2400" spc="100" dirty="0">
                 <a:solidFill>
@@ -9255,7 +9234,7 @@
                 <a:latin typeface="나눔스퀘어 Bold" panose="020B0600000101010101" pitchFamily="50" charset="-127"/>
                 <a:ea typeface="나눔스퀘어 Bold" panose="020B0600000101010101" pitchFamily="50" charset="-127"/>
               </a:rPr>
-              <a:t>	</a:t>
+              <a:t>class</a:t>
             </a:r>
             <a:r>
               <a:rPr lang="ko-KR" altLang="en-US" sz="2400" spc="100" dirty="0">
@@ -9265,17 +9244,17 @@
                 <a:latin typeface="나눔스퀘어 Bold" panose="020B0600000101010101" pitchFamily="50" charset="-127"/>
                 <a:ea typeface="나눔스퀘어 Bold" panose="020B0600000101010101" pitchFamily="50" charset="-127"/>
               </a:rPr>
-              <a:t>대신 파일 자체의 독자적인 모듈 </a:t>
-            </a:r>
-            <a:r>
-              <a:rPr lang="ko-KR" altLang="en-US" sz="2400" spc="100" dirty="0" err="1">
-                <a:solidFill>
-                  <a:srgbClr val="44546A"/>
-                </a:solidFill>
-                <a:latin typeface="나눔스퀘어 Bold" panose="020B0600000101010101" pitchFamily="50" charset="-127"/>
-                <a:ea typeface="나눔스퀘어 Bold" panose="020B0600000101010101" pitchFamily="50" charset="-127"/>
-              </a:rPr>
-              <a:t>스코프를</a:t>
+              <a:t>에서 </a:t>
+            </a:r>
+            <a:r>
+              <a:rPr lang="en-US" altLang="ko-KR" sz="2400" spc="100" dirty="0">
+                <a:solidFill>
+                  <a:srgbClr val="44546A"/>
+                </a:solidFill>
+                <a:latin typeface="나눔스퀘어 Bold" panose="020B0600000101010101" pitchFamily="50" charset="-127"/>
+                <a:ea typeface="나눔스퀘어 Bold" panose="020B0600000101010101" pitchFamily="50" charset="-127"/>
+              </a:rPr>
+              <a:t>private</a:t>
             </a:r>
             <a:r>
               <a:rPr lang="ko-KR" altLang="en-US" sz="2400" spc="100" dirty="0">
@@ -9285,7 +9264,7 @@
                 <a:latin typeface="나눔스퀘어 Bold" panose="020B0600000101010101" pitchFamily="50" charset="-127"/>
                 <a:ea typeface="나눔스퀘어 Bold" panose="020B0600000101010101" pitchFamily="50" charset="-127"/>
               </a:rPr>
-              <a:t> 제공</a:t>
+              <a:t>를 구현할 수 있음</a:t>
             </a:r>
             <a:endParaRPr lang="en-US" altLang="ko-KR" sz="2400" spc="100" dirty="0">
               <a:solidFill>
@@ -9299,10 +9278,10 @@
       </p:sp>
       <p:sp>
         <p:nvSpPr>
-          <p:cNvPr id="12" name="TextBox 11">
-            <a:extLst>
-              <a:ext uri="{FF2B5EF4-FFF2-40B4-BE49-F238E27FC236}">
-                <a16:creationId xmlns:a16="http://schemas.microsoft.com/office/drawing/2014/main" id="{E10FF337-8300-4427-8C22-A1C87FCF948D}"/>
+          <p:cNvPr id="4" name="TextBox 3">
+            <a:extLst>
+              <a:ext uri="{FF2B5EF4-FFF2-40B4-BE49-F238E27FC236}">
+                <a16:creationId xmlns:a16="http://schemas.microsoft.com/office/drawing/2014/main" id="{E5BB2E76-B4C2-4FA2-BA49-BBA04B5B47F3}"/>
               </a:ext>
             </a:extLst>
           </p:cNvPr>
@@ -9311,7 +9290,7 @@
         </p:nvSpPr>
         <p:spPr>
           <a:xfrm>
-            <a:off x="762855" y="3111248"/>
+            <a:off x="762855" y="2187918"/>
             <a:ext cx="10680876" cy="461665"/>
           </a:xfrm>
           <a:prstGeom prst="rect">
@@ -9333,7 +9312,7 @@
                 <a:latin typeface="나눔스퀘어 Bold" panose="020B0600000101010101" pitchFamily="50" charset="-127"/>
                 <a:ea typeface="나눔스퀘어 Bold" panose="020B0600000101010101" pitchFamily="50" charset="-127"/>
               </a:rPr>
-              <a:t>	var</a:t>
+              <a:t>	(class </a:t>
             </a:r>
             <a:r>
               <a:rPr lang="ko-KR" altLang="en-US" sz="2400" spc="100" dirty="0">
@@ -9343,7 +9322,158 @@
                 <a:latin typeface="나눔스퀘어 Bold" panose="020B0600000101010101" pitchFamily="50" charset="-127"/>
                 <a:ea typeface="나눔스퀘어 Bold" panose="020B0600000101010101" pitchFamily="50" charset="-127"/>
               </a:rPr>
-              <a:t> 키워드로 선언한 변수는 전역 변수가 아니며</a:t>
+              <a:t>키워드에 대해선 아직 배우지 않아</a:t>
+            </a:r>
+            <a:r>
+              <a:rPr lang="en-US" altLang="ko-KR" sz="2400" spc="100" dirty="0">
+                <a:solidFill>
+                  <a:srgbClr val="44546A"/>
+                </a:solidFill>
+                <a:latin typeface="나눔스퀘어 Bold" panose="020B0600000101010101" pitchFamily="50" charset="-127"/>
+                <a:ea typeface="나눔스퀘어 Bold" panose="020B0600000101010101" pitchFamily="50" charset="-127"/>
+              </a:rPr>
+              <a:t>, </a:t>
+            </a:r>
+            <a:r>
+              <a:rPr lang="ko-KR" altLang="en-US" sz="2400" spc="100" dirty="0">
+                <a:solidFill>
+                  <a:srgbClr val="44546A"/>
+                </a:solidFill>
+                <a:latin typeface="나눔스퀘어 Bold" panose="020B0600000101010101" pitchFamily="50" charset="-127"/>
+                <a:ea typeface="나눔스퀘어 Bold" panose="020B0600000101010101" pitchFamily="50" charset="-127"/>
+              </a:rPr>
+              <a:t>다루지 않습니다</a:t>
+            </a:r>
+            <a:r>
+              <a:rPr lang="en-US" altLang="ko-KR" sz="2400" spc="100" dirty="0">
+                <a:solidFill>
+                  <a:srgbClr val="44546A"/>
+                </a:solidFill>
+                <a:latin typeface="나눔스퀘어 Bold" panose="020B0600000101010101" pitchFamily="50" charset="-127"/>
+                <a:ea typeface="나눔스퀘어 Bold" panose="020B0600000101010101" pitchFamily="50" charset="-127"/>
+              </a:rPr>
+              <a:t>.)</a:t>
+            </a:r>
+          </a:p>
+        </p:txBody>
+      </p:sp>
+      <p:pic>
+        <p:nvPicPr>
+          <p:cNvPr id="12" name="그림 11">
+            <a:extLst>
+              <a:ext uri="{FF2B5EF4-FFF2-40B4-BE49-F238E27FC236}">
+                <a16:creationId xmlns:a16="http://schemas.microsoft.com/office/drawing/2014/main" id="{4CC11CEF-E667-C85A-1C6A-77FF5FD216F9}"/>
+              </a:ext>
+            </a:extLst>
+          </p:cNvPr>
+          <p:cNvPicPr>
+            <a:picLocks noChangeAspect="1"/>
+          </p:cNvPicPr>
+          <p:nvPr/>
+        </p:nvPicPr>
+        <p:blipFill>
+          <a:blip r:embed="rId2"/>
+          <a:stretch>
+            <a:fillRect/>
+          </a:stretch>
+        </p:blipFill>
+        <p:spPr>
+          <a:xfrm>
+            <a:off x="762856" y="2720333"/>
+            <a:ext cx="3321208" cy="2546259"/>
+          </a:xfrm>
+          <a:prstGeom prst="rect">
+            <a:avLst/>
+          </a:prstGeom>
+        </p:spPr>
+      </p:pic>
+      <p:pic>
+        <p:nvPicPr>
+          <p:cNvPr id="14" name="그림 13">
+            <a:extLst>
+              <a:ext uri="{FF2B5EF4-FFF2-40B4-BE49-F238E27FC236}">
+                <a16:creationId xmlns:a16="http://schemas.microsoft.com/office/drawing/2014/main" id="{3F923544-536F-625F-34BF-DF5BC72A47D8}"/>
+              </a:ext>
+            </a:extLst>
+          </p:cNvPr>
+          <p:cNvPicPr>
+            <a:picLocks noChangeAspect="1"/>
+          </p:cNvPicPr>
+          <p:nvPr/>
+        </p:nvPicPr>
+        <p:blipFill>
+          <a:blip r:embed="rId3"/>
+          <a:stretch>
+            <a:fillRect/>
+          </a:stretch>
+        </p:blipFill>
+        <p:spPr>
+          <a:xfrm>
+            <a:off x="4145610" y="2720332"/>
+            <a:ext cx="7414496" cy="2546260"/>
+          </a:xfrm>
+          <a:prstGeom prst="rect">
+            <a:avLst/>
+          </a:prstGeom>
+        </p:spPr>
+      </p:pic>
+      <p:sp>
+        <p:nvSpPr>
+          <p:cNvPr id="15" name="TextBox 14">
+            <a:extLst>
+              <a:ext uri="{FF2B5EF4-FFF2-40B4-BE49-F238E27FC236}">
+                <a16:creationId xmlns:a16="http://schemas.microsoft.com/office/drawing/2014/main" id="{7658E167-6A63-D6EB-BDFC-87AEE3379AAD}"/>
+              </a:ext>
+            </a:extLst>
+          </p:cNvPr>
+          <p:cNvSpPr txBox="1"/>
+          <p:nvPr/>
+        </p:nvSpPr>
+        <p:spPr>
+          <a:xfrm>
+            <a:off x="762855" y="5695604"/>
+            <a:ext cx="10680876" cy="461665"/>
+          </a:xfrm>
+          <a:prstGeom prst="rect">
+            <a:avLst/>
+          </a:prstGeom>
+          <a:noFill/>
+        </p:spPr>
+        <p:txBody>
+          <a:bodyPr wrap="square" rtlCol="0">
+            <a:spAutoFit/>
+          </a:bodyPr>
+          <a:lstStyle/>
+          <a:p>
+            <a:r>
+              <a:rPr lang="ko-KR" altLang="en-US" sz="2400" spc="100" dirty="0">
+                <a:solidFill>
+                  <a:srgbClr val="44546A"/>
+                </a:solidFill>
+                <a:latin typeface="나눔스퀘어 Bold" panose="020B0600000101010101" pitchFamily="50" charset="-127"/>
+                <a:ea typeface="나눔스퀘어 Bold" panose="020B0600000101010101" pitchFamily="50" charset="-127"/>
+              </a:rPr>
+              <a:t>나름 최신 기술이므로</a:t>
+            </a:r>
+            <a:r>
+              <a:rPr lang="en-US" altLang="ko-KR" sz="2400" spc="100" dirty="0">
+                <a:solidFill>
+                  <a:srgbClr val="44546A"/>
+                </a:solidFill>
+                <a:latin typeface="나눔스퀘어 Bold" panose="020B0600000101010101" pitchFamily="50" charset="-127"/>
+                <a:ea typeface="나눔스퀘어 Bold" panose="020B0600000101010101" pitchFamily="50" charset="-127"/>
+              </a:rPr>
+              <a:t>, </a:t>
+            </a:r>
+            <a:r>
+              <a:rPr lang="ko-KR" altLang="en-US" sz="2400" spc="100" dirty="0">
+                <a:solidFill>
+                  <a:srgbClr val="44546A"/>
+                </a:solidFill>
+                <a:latin typeface="나눔스퀘어 Bold" panose="020B0600000101010101" pitchFamily="50" charset="-127"/>
+                <a:ea typeface="나눔스퀘어 Bold" panose="020B0600000101010101" pitchFamily="50" charset="-127"/>
+              </a:rPr>
+              <a:t>브라우저와의 호환을 확인하고 사용해야 함</a:t>
             </a:r>
             <a:endParaRPr lang="en-US" altLang="ko-KR" sz="2400" spc="100" dirty="0">
               <a:solidFill>
@@ -9355,325 +9485,23 @@
           </a:p>
         </p:txBody>
       </p:sp>
-      <p:sp>
-        <p:nvSpPr>
-          <p:cNvPr id="13" name="TextBox 12">
-            <a:extLst>
-              <a:ext uri="{FF2B5EF4-FFF2-40B4-BE49-F238E27FC236}">
-                <a16:creationId xmlns:a16="http://schemas.microsoft.com/office/drawing/2014/main" id="{4A075A92-6A53-4616-8A36-51662E48998A}"/>
-              </a:ext>
-            </a:extLst>
-          </p:cNvPr>
-          <p:cNvSpPr txBox="1"/>
-          <p:nvPr/>
-        </p:nvSpPr>
-        <p:spPr>
-          <a:xfrm>
-            <a:off x="762855" y="3572913"/>
-            <a:ext cx="10680876" cy="461665"/>
-          </a:xfrm>
-          <a:prstGeom prst="rect">
-            <a:avLst/>
-          </a:prstGeom>
-          <a:noFill/>
-        </p:spPr>
-        <p:txBody>
-          <a:bodyPr wrap="square" rtlCol="0">
-            <a:spAutoFit/>
-          </a:bodyPr>
-          <a:lstStyle/>
-          <a:p>
-            <a:r>
-              <a:rPr lang="en-US" altLang="ko-KR" sz="2400" spc="100" dirty="0">
-                <a:solidFill>
-                  <a:srgbClr val="44546A"/>
-                </a:solidFill>
-                <a:latin typeface="나눔스퀘어 Bold" panose="020B0600000101010101" pitchFamily="50" charset="-127"/>
-                <a:ea typeface="나눔스퀘어 Bold" panose="020B0600000101010101" pitchFamily="50" charset="-127"/>
-              </a:rPr>
-              <a:t>	window </a:t>
-            </a:r>
-            <a:r>
-              <a:rPr lang="ko-KR" altLang="en-US" sz="2400" spc="100" dirty="0">
-                <a:solidFill>
-                  <a:srgbClr val="44546A"/>
-                </a:solidFill>
-                <a:latin typeface="나눔스퀘어 Bold" panose="020B0600000101010101" pitchFamily="50" charset="-127"/>
-                <a:ea typeface="나눔스퀘어 Bold" panose="020B0600000101010101" pitchFamily="50" charset="-127"/>
-              </a:rPr>
-              <a:t>객체의 프로퍼티도 아님</a:t>
-            </a:r>
-            <a:endParaRPr lang="en-US" altLang="ko-KR" sz="2400" spc="100" dirty="0">
-              <a:solidFill>
-                <a:srgbClr val="44546A"/>
-              </a:solidFill>
-              <a:latin typeface="나눔스퀘어 Bold" panose="020B0600000101010101" pitchFamily="50" charset="-127"/>
-              <a:ea typeface="나눔스퀘어 Bold" panose="020B0600000101010101" pitchFamily="50" charset="-127"/>
-            </a:endParaRPr>
-          </a:p>
-        </p:txBody>
-      </p:sp>
-      <p:sp>
-        <p:nvSpPr>
-          <p:cNvPr id="15" name="TextBox 14">
-            <a:extLst>
-              <a:ext uri="{FF2B5EF4-FFF2-40B4-BE49-F238E27FC236}">
-                <a16:creationId xmlns:a16="http://schemas.microsoft.com/office/drawing/2014/main" id="{999E5D1D-E899-4790-82A9-78FC838D749F}"/>
-              </a:ext>
-            </a:extLst>
-          </p:cNvPr>
-          <p:cNvSpPr txBox="1"/>
-          <p:nvPr/>
-        </p:nvSpPr>
-        <p:spPr>
-          <a:xfrm>
-            <a:off x="762855" y="4496243"/>
-            <a:ext cx="10680876" cy="461665"/>
-          </a:xfrm>
-          <a:prstGeom prst="rect">
-            <a:avLst/>
-          </a:prstGeom>
-          <a:noFill/>
-        </p:spPr>
-        <p:txBody>
-          <a:bodyPr wrap="square" rtlCol="0">
-            <a:spAutoFit/>
-          </a:bodyPr>
-          <a:lstStyle/>
-          <a:p>
-            <a:r>
-              <a:rPr lang="ko-KR" altLang="en-US" sz="2400" spc="100" dirty="0">
-                <a:solidFill>
-                  <a:srgbClr val="44546A"/>
-                </a:solidFill>
-                <a:latin typeface="나눔스퀘어 Bold" panose="020B0600000101010101" pitchFamily="50" charset="-127"/>
-                <a:ea typeface="나눔스퀘어 Bold" panose="020B0600000101010101" pitchFamily="50" charset="-127"/>
-              </a:rPr>
-              <a:t>모던 브라우저</a:t>
-            </a:r>
-            <a:r>
-              <a:rPr lang="en-US" altLang="ko-KR" sz="2400" spc="100" dirty="0">
-                <a:solidFill>
-                  <a:srgbClr val="44546A"/>
-                </a:solidFill>
-                <a:latin typeface="나눔스퀘어 Bold" panose="020B0600000101010101" pitchFamily="50" charset="-127"/>
-                <a:ea typeface="나눔스퀘어 Bold" panose="020B0600000101010101" pitchFamily="50" charset="-127"/>
-              </a:rPr>
-              <a:t>(Chrome, Firefox, Safari, Edge)</a:t>
-            </a:r>
-            <a:r>
-              <a:rPr lang="ko-KR" altLang="en-US" sz="2400" spc="100" dirty="0">
-                <a:solidFill>
-                  <a:srgbClr val="44546A"/>
-                </a:solidFill>
-                <a:latin typeface="나눔스퀘어 Bold" panose="020B0600000101010101" pitchFamily="50" charset="-127"/>
-                <a:ea typeface="나눔스퀘어 Bold" panose="020B0600000101010101" pitchFamily="50" charset="-127"/>
-              </a:rPr>
-              <a:t>에서 </a:t>
-            </a:r>
-            <a:r>
-              <a:rPr lang="en-US" altLang="ko-KR" sz="2400" spc="100" dirty="0">
-                <a:solidFill>
-                  <a:srgbClr val="44546A"/>
-                </a:solidFill>
-                <a:latin typeface="나눔스퀘어 Bold" panose="020B0600000101010101" pitchFamily="50" charset="-127"/>
-                <a:ea typeface="나눔스퀘어 Bold" panose="020B0600000101010101" pitchFamily="50" charset="-127"/>
-              </a:rPr>
-              <a:t>ES6 </a:t>
-            </a:r>
-            <a:r>
-              <a:rPr lang="ko-KR" altLang="en-US" sz="2400" spc="100" dirty="0">
-                <a:solidFill>
-                  <a:srgbClr val="44546A"/>
-                </a:solidFill>
-                <a:latin typeface="나눔스퀘어 Bold" panose="020B0600000101010101" pitchFamily="50" charset="-127"/>
-                <a:ea typeface="나눔스퀘어 Bold" panose="020B0600000101010101" pitchFamily="50" charset="-127"/>
-              </a:rPr>
-              <a:t>모듈 사용 가능</a:t>
-            </a:r>
-            <a:endParaRPr lang="en-US" altLang="ko-KR" sz="2400" spc="100" dirty="0">
-              <a:solidFill>
-                <a:srgbClr val="44546A"/>
-              </a:solidFill>
-              <a:latin typeface="나눔스퀘어 Bold" panose="020B0600000101010101" pitchFamily="50" charset="-127"/>
-              <a:ea typeface="나눔스퀘어 Bold" panose="020B0600000101010101" pitchFamily="50" charset="-127"/>
-            </a:endParaRPr>
-          </a:p>
-        </p:txBody>
-      </p:sp>
-      <p:sp>
-        <p:nvSpPr>
-          <p:cNvPr id="16" name="TextBox 15">
-            <a:extLst>
-              <a:ext uri="{FF2B5EF4-FFF2-40B4-BE49-F238E27FC236}">
-                <a16:creationId xmlns:a16="http://schemas.microsoft.com/office/drawing/2014/main" id="{AEF0B439-44D7-41CB-8857-0C472913727A}"/>
-              </a:ext>
-            </a:extLst>
-          </p:cNvPr>
-          <p:cNvSpPr txBox="1"/>
-          <p:nvPr/>
-        </p:nvSpPr>
-        <p:spPr>
-          <a:xfrm>
-            <a:off x="762855" y="5419573"/>
-            <a:ext cx="10680876" cy="461665"/>
-          </a:xfrm>
-          <a:prstGeom prst="rect">
-            <a:avLst/>
-          </a:prstGeom>
-          <a:noFill/>
-        </p:spPr>
-        <p:txBody>
-          <a:bodyPr wrap="square" rtlCol="0">
-            <a:spAutoFit/>
-          </a:bodyPr>
-          <a:lstStyle/>
-          <a:p>
-            <a:r>
-              <a:rPr lang="en-US" altLang="ko-KR" sz="2400" spc="100" dirty="0">
-                <a:solidFill>
-                  <a:srgbClr val="44546A"/>
-                </a:solidFill>
-                <a:latin typeface="나눔스퀘어 Bold" panose="020B0600000101010101" pitchFamily="50" charset="-127"/>
-                <a:ea typeface="나눔스퀘어 Bold" panose="020B0600000101010101" pitchFamily="50" charset="-127"/>
-              </a:rPr>
-              <a:t>	</a:t>
-            </a:r>
-            <a:r>
-              <a:rPr lang="ko-KR" altLang="en-US" sz="2400" spc="100" dirty="0">
-                <a:solidFill>
-                  <a:srgbClr val="44546A"/>
-                </a:solidFill>
-                <a:latin typeface="나눔스퀘어 Bold" panose="020B0600000101010101" pitchFamily="50" charset="-127"/>
-                <a:ea typeface="나눔스퀘어 Bold" panose="020B0600000101010101" pitchFamily="50" charset="-127"/>
-              </a:rPr>
-              <a:t>확장자는 </a:t>
-            </a:r>
-            <a:r>
-              <a:rPr lang="en-US" altLang="ko-KR" sz="2400" spc="100" dirty="0" err="1">
-                <a:solidFill>
-                  <a:srgbClr val="44546A"/>
-                </a:solidFill>
-                <a:latin typeface="나눔스퀘어 Bold" panose="020B0600000101010101" pitchFamily="50" charset="-127"/>
-                <a:ea typeface="나눔스퀘어 Bold" panose="020B0600000101010101" pitchFamily="50" charset="-127"/>
-              </a:rPr>
-              <a:t>mjs</a:t>
-            </a:r>
-            <a:r>
-              <a:rPr lang="ko-KR" altLang="en-US" sz="2400" spc="100" dirty="0">
-                <a:solidFill>
-                  <a:srgbClr val="44546A"/>
-                </a:solidFill>
-                <a:latin typeface="나눔스퀘어 Bold" panose="020B0600000101010101" pitchFamily="50" charset="-127"/>
-                <a:ea typeface="나눔스퀘어 Bold" panose="020B0600000101010101" pitchFamily="50" charset="-127"/>
-              </a:rPr>
-              <a:t>를 권장</a:t>
-            </a:r>
-            <a:endParaRPr lang="en-US" altLang="ko-KR" sz="2400" spc="100" dirty="0">
-              <a:solidFill>
-                <a:srgbClr val="44546A"/>
-              </a:solidFill>
-              <a:latin typeface="나눔스퀘어 Bold" panose="020B0600000101010101" pitchFamily="50" charset="-127"/>
-              <a:ea typeface="나눔스퀘어 Bold" panose="020B0600000101010101" pitchFamily="50" charset="-127"/>
-            </a:endParaRPr>
-          </a:p>
-        </p:txBody>
-      </p:sp>
-      <p:sp>
-        <p:nvSpPr>
-          <p:cNvPr id="19" name="TextBox 18">
-            <a:extLst>
-              <a:ext uri="{FF2B5EF4-FFF2-40B4-BE49-F238E27FC236}">
-                <a16:creationId xmlns:a16="http://schemas.microsoft.com/office/drawing/2014/main" id="{0FD73643-12C8-4E2A-8413-48910611A222}"/>
-              </a:ext>
-            </a:extLst>
-          </p:cNvPr>
-          <p:cNvSpPr txBox="1"/>
-          <p:nvPr/>
-        </p:nvSpPr>
-        <p:spPr>
-          <a:xfrm>
-            <a:off x="762855" y="4957908"/>
-            <a:ext cx="10680876" cy="461665"/>
-          </a:xfrm>
-          <a:prstGeom prst="rect">
-            <a:avLst/>
-          </a:prstGeom>
-          <a:noFill/>
-        </p:spPr>
-        <p:txBody>
-          <a:bodyPr wrap="square" rtlCol="0">
-            <a:spAutoFit/>
-          </a:bodyPr>
-          <a:lstStyle/>
-          <a:p>
-            <a:r>
-              <a:rPr lang="en-US" altLang="ko-KR" sz="2400" spc="100" dirty="0">
-                <a:solidFill>
-                  <a:srgbClr val="44546A"/>
-                </a:solidFill>
-                <a:latin typeface="나눔스퀘어 Bold" panose="020B0600000101010101" pitchFamily="50" charset="-127"/>
-                <a:ea typeface="나눔스퀘어 Bold" panose="020B0600000101010101" pitchFamily="50" charset="-127"/>
-              </a:rPr>
-              <a:t>	</a:t>
-            </a:r>
-            <a:r>
-              <a:rPr lang="ko-KR" altLang="en-US" sz="2400" spc="100" dirty="0">
-                <a:solidFill>
-                  <a:srgbClr val="44546A"/>
-                </a:solidFill>
-                <a:latin typeface="나눔스퀘어 Bold" panose="020B0600000101010101" pitchFamily="50" charset="-127"/>
-                <a:ea typeface="나눔스퀘어 Bold" panose="020B0600000101010101" pitchFamily="50" charset="-127"/>
-              </a:rPr>
-              <a:t>구형 브라우저</a:t>
-            </a:r>
-            <a:r>
-              <a:rPr lang="en-US" altLang="ko-KR" sz="2400" spc="100" dirty="0">
-                <a:solidFill>
-                  <a:srgbClr val="44546A"/>
-                </a:solidFill>
-                <a:latin typeface="나눔스퀘어 Bold" panose="020B0600000101010101" pitchFamily="50" charset="-127"/>
-                <a:ea typeface="나눔스퀘어 Bold" panose="020B0600000101010101" pitchFamily="50" charset="-127"/>
-              </a:rPr>
-              <a:t>(IE)</a:t>
-            </a:r>
-            <a:r>
-              <a:rPr lang="ko-KR" altLang="en-US" sz="2400" spc="100" dirty="0">
-                <a:solidFill>
-                  <a:srgbClr val="44546A"/>
-                </a:solidFill>
-                <a:latin typeface="나눔스퀘어 Bold" panose="020B0600000101010101" pitchFamily="50" charset="-127"/>
-                <a:ea typeface="나눔스퀘어 Bold" panose="020B0600000101010101" pitchFamily="50" charset="-127"/>
-              </a:rPr>
-              <a:t>에서는 동작 안함</a:t>
-            </a:r>
-            <a:endParaRPr lang="en-US" altLang="ko-KR" sz="2400" spc="100" dirty="0">
-              <a:solidFill>
-                <a:srgbClr val="44546A"/>
-              </a:solidFill>
-              <a:latin typeface="나눔스퀘어 Bold" panose="020B0600000101010101" pitchFamily="50" charset="-127"/>
-              <a:ea typeface="나눔스퀘어 Bold" panose="020B0600000101010101" pitchFamily="50" charset="-127"/>
-            </a:endParaRPr>
-          </a:p>
-        </p:txBody>
-      </p:sp>
     </p:spTree>
     <p:extLst>
       <p:ext uri="{BB962C8B-B14F-4D97-AF65-F5344CB8AC3E}">
-        <p14:creationId xmlns:p14="http://schemas.microsoft.com/office/powerpoint/2010/main" val="3004854744"/>
+        <p14:creationId xmlns:p14="http://schemas.microsoft.com/office/powerpoint/2010/main" val="477877533"/>
       </p:ext>
     </p:extLst>
   </p:cSld>
   <p:clrMapOvr>
     <a:masterClrMapping/>
   </p:clrMapOvr>
-  <mc:AlternateContent xmlns:mc="http://schemas.openxmlformats.org/markup-compatibility/2006" xmlns:p159="http://schemas.microsoft.com/office/powerpoint/2015/09/main">
-    <mc:Choice Requires="p159">
+  <mc:AlternateContent xmlns:mc="http://schemas.openxmlformats.org/markup-compatibility/2006">
+    <mc:Choice xmlns:p159="http://schemas.microsoft.com/office/powerpoint/2015/09/main" Requires="p159">
       <p:transition xmlns:p14="http://schemas.microsoft.com/office/powerpoint/2010/main" spd="slow" p14:dur="2000">
         <p159:morph option="byObject"/>
       </p:transition>
     </mc:Choice>
-    <mc:Fallback xmlns="">
+    <mc:Fallback>
       <p:transition spd="slow">
         <p:fade/>
       </p:transition>
@@ -10055,72 +9883,12 @@
           </a:p>
         </p:txBody>
       </p:sp>
-      <p:pic>
-        <p:nvPicPr>
-          <p:cNvPr id="5" name="그림 4">
-            <a:extLst>
-              <a:ext uri="{FF2B5EF4-FFF2-40B4-BE49-F238E27FC236}">
-                <a16:creationId xmlns:a16="http://schemas.microsoft.com/office/drawing/2014/main" id="{FF45E417-15CF-45D8-B6DF-6A327495C1A1}"/>
-              </a:ext>
-            </a:extLst>
-          </p:cNvPr>
-          <p:cNvPicPr>
-            <a:picLocks noChangeAspect="1"/>
-          </p:cNvPicPr>
-          <p:nvPr/>
-        </p:nvPicPr>
-        <p:blipFill>
-          <a:blip r:embed="rId2"/>
-          <a:stretch>
-            <a:fillRect/>
-          </a:stretch>
-        </p:blipFill>
-        <p:spPr>
-          <a:xfrm>
-            <a:off x="762855" y="1757177"/>
-            <a:ext cx="7475174" cy="2072947"/>
-          </a:xfrm>
-          <a:prstGeom prst="rect">
-            <a:avLst/>
-          </a:prstGeom>
-        </p:spPr>
-      </p:pic>
-      <p:pic>
-        <p:nvPicPr>
-          <p:cNvPr id="14" name="그림 13">
-            <a:extLst>
-              <a:ext uri="{FF2B5EF4-FFF2-40B4-BE49-F238E27FC236}">
-                <a16:creationId xmlns:a16="http://schemas.microsoft.com/office/drawing/2014/main" id="{4EF0D6B3-EB9D-4798-8EDC-919AF9C4A4DF}"/>
-              </a:ext>
-            </a:extLst>
-          </p:cNvPr>
-          <p:cNvPicPr>
-            <a:picLocks noChangeAspect="1"/>
-          </p:cNvPicPr>
-          <p:nvPr/>
-        </p:nvPicPr>
-        <p:blipFill>
-          <a:blip r:embed="rId3"/>
-          <a:stretch>
-            <a:fillRect/>
-          </a:stretch>
-        </p:blipFill>
-        <p:spPr>
-          <a:xfrm>
-            <a:off x="762854" y="4083208"/>
-            <a:ext cx="7475173" cy="2214866"/>
-          </a:xfrm>
-          <a:prstGeom prst="rect">
-            <a:avLst/>
-          </a:prstGeom>
-        </p:spPr>
-      </p:pic>
-      <p:sp>
-        <p:nvSpPr>
-          <p:cNvPr id="16" name="TextBox 15">
-            <a:extLst>
-              <a:ext uri="{FF2B5EF4-FFF2-40B4-BE49-F238E27FC236}">
-                <a16:creationId xmlns:a16="http://schemas.microsoft.com/office/drawing/2014/main" id="{C0F3FF40-EDD0-41C1-9501-6F8A165719DE}"/>
+      <p:sp>
+        <p:nvSpPr>
+          <p:cNvPr id="10" name="TextBox 9">
+            <a:extLst>
+              <a:ext uri="{FF2B5EF4-FFF2-40B4-BE49-F238E27FC236}">
+                <a16:creationId xmlns:a16="http://schemas.microsoft.com/office/drawing/2014/main" id="{02AFF967-66B7-3EA3-20E6-621981EA5089}"/>
               </a:ext>
             </a:extLst>
           </p:cNvPr>
@@ -10129,8 +9897,8 @@
         </p:nvSpPr>
         <p:spPr>
           <a:xfrm>
-            <a:off x="8452883" y="1757177"/>
-            <a:ext cx="2990847" cy="461665"/>
+            <a:off x="762855" y="2187918"/>
+            <a:ext cx="10680876" cy="461665"/>
           </a:xfrm>
           <a:prstGeom prst="rect">
             <a:avLst/>
@@ -10144,14 +9912,14 @@
           <a:lstStyle/>
           <a:p>
             <a:r>
-              <a:rPr lang="en-US" altLang="ko-KR" sz="2400" spc="100" dirty="0" err="1">
-                <a:solidFill>
-                  <a:srgbClr val="44546A"/>
-                </a:solidFill>
-                <a:latin typeface="나눔스퀘어 Bold" panose="020B0600000101010101" pitchFamily="50" charset="-127"/>
-                <a:ea typeface="나눔스퀘어 Bold" panose="020B0600000101010101" pitchFamily="50" charset="-127"/>
-              </a:rPr>
-              <a:t>iexplore</a:t>
+              <a:rPr lang="en-US" altLang="ko-KR" sz="2400" spc="100" dirty="0">
+                <a:solidFill>
+                  <a:srgbClr val="44546A"/>
+                </a:solidFill>
+                <a:latin typeface="나눔스퀘어 Bold" panose="020B0600000101010101" pitchFamily="50" charset="-127"/>
+                <a:ea typeface="나눔스퀘어 Bold" panose="020B0600000101010101" pitchFamily="50" charset="-127"/>
+              </a:rPr>
+              <a:t>ES6 </a:t>
             </a:r>
             <a:r>
               <a:rPr lang="ko-KR" altLang="en-US" sz="2400" spc="100" dirty="0">
@@ -10161,7 +9929,88 @@
                 <a:latin typeface="나눔스퀘어 Bold" panose="020B0600000101010101" pitchFamily="50" charset="-127"/>
                 <a:ea typeface="나눔스퀘어 Bold" panose="020B0600000101010101" pitchFamily="50" charset="-127"/>
               </a:rPr>
-              <a:t>에서 동작</a:t>
+              <a:t>모듈을 사용하면 더는 전역 변수를 사용할 수 없다</a:t>
+            </a:r>
+            <a:r>
+              <a:rPr lang="en-US" altLang="ko-KR" sz="2400" spc="100" dirty="0">
+                <a:solidFill>
+                  <a:srgbClr val="44546A"/>
+                </a:solidFill>
+                <a:latin typeface="나눔스퀘어 Bold" panose="020B0600000101010101" pitchFamily="50" charset="-127"/>
+                <a:ea typeface="나눔스퀘어 Bold" panose="020B0600000101010101" pitchFamily="50" charset="-127"/>
+              </a:rPr>
+              <a:t>.</a:t>
+            </a:r>
+          </a:p>
+        </p:txBody>
+      </p:sp>
+      <p:sp>
+        <p:nvSpPr>
+          <p:cNvPr id="11" name="TextBox 10">
+            <a:extLst>
+              <a:ext uri="{FF2B5EF4-FFF2-40B4-BE49-F238E27FC236}">
+                <a16:creationId xmlns:a16="http://schemas.microsoft.com/office/drawing/2014/main" id="{BE0E17C1-17CF-493E-872F-7377FE566AEB}"/>
+              </a:ext>
+            </a:extLst>
+          </p:cNvPr>
+          <p:cNvSpPr txBox="1"/>
+          <p:nvPr/>
+        </p:nvSpPr>
+        <p:spPr>
+          <a:xfrm>
+            <a:off x="762855" y="2649583"/>
+            <a:ext cx="10680876" cy="461665"/>
+          </a:xfrm>
+          <a:prstGeom prst="rect">
+            <a:avLst/>
+          </a:prstGeom>
+          <a:noFill/>
+        </p:spPr>
+        <p:txBody>
+          <a:bodyPr wrap="square" rtlCol="0">
+            <a:spAutoFit/>
+          </a:bodyPr>
+          <a:lstStyle/>
+          <a:p>
+            <a:r>
+              <a:rPr lang="en-US" altLang="ko-KR" sz="2400" spc="100" dirty="0">
+                <a:solidFill>
+                  <a:srgbClr val="44546A"/>
+                </a:solidFill>
+                <a:latin typeface="나눔스퀘어 Bold" panose="020B0600000101010101" pitchFamily="50" charset="-127"/>
+                <a:ea typeface="나눔스퀘어 Bold" panose="020B0600000101010101" pitchFamily="50" charset="-127"/>
+              </a:rPr>
+              <a:t>	</a:t>
+            </a:r>
+            <a:r>
+              <a:rPr lang="ko-KR" altLang="en-US" sz="2400" spc="100" dirty="0">
+                <a:solidFill>
+                  <a:srgbClr val="44546A"/>
+                </a:solidFill>
+                <a:latin typeface="나눔스퀘어 Bold" panose="020B0600000101010101" pitchFamily="50" charset="-127"/>
+                <a:ea typeface="나눔스퀘어 Bold" panose="020B0600000101010101" pitchFamily="50" charset="-127"/>
+              </a:rPr>
+              <a:t>대신 파일 자체의 독자적인 모듈 </a:t>
+            </a:r>
+            <a:r>
+              <a:rPr lang="ko-KR" altLang="en-US" sz="2400" spc="100" dirty="0" err="1">
+                <a:solidFill>
+                  <a:srgbClr val="44546A"/>
+                </a:solidFill>
+                <a:latin typeface="나눔스퀘어 Bold" panose="020B0600000101010101" pitchFamily="50" charset="-127"/>
+                <a:ea typeface="나눔스퀘어 Bold" panose="020B0600000101010101" pitchFamily="50" charset="-127"/>
+              </a:rPr>
+              <a:t>스코프를</a:t>
+            </a:r>
+            <a:r>
+              <a:rPr lang="ko-KR" altLang="en-US" sz="2400" spc="100" dirty="0">
+                <a:solidFill>
+                  <a:srgbClr val="44546A"/>
+                </a:solidFill>
+                <a:latin typeface="나눔스퀘어 Bold" panose="020B0600000101010101" pitchFamily="50" charset="-127"/>
+                <a:ea typeface="나눔스퀘어 Bold" panose="020B0600000101010101" pitchFamily="50" charset="-127"/>
+              </a:rPr>
+              <a:t> 제공</a:t>
             </a:r>
             <a:endParaRPr lang="en-US" altLang="ko-KR" sz="2400" spc="100" dirty="0">
               <a:solidFill>
@@ -10173,109 +10022,12 @@
           </a:p>
         </p:txBody>
       </p:sp>
-      <p:pic>
-        <p:nvPicPr>
-          <p:cNvPr id="1026" name="Picture 2" descr="Microsoft is finally retiring Internet Explorer in 2022 - The Verge">
-            <a:extLst>
-              <a:ext uri="{FF2B5EF4-FFF2-40B4-BE49-F238E27FC236}">
-                <a16:creationId xmlns:a16="http://schemas.microsoft.com/office/drawing/2014/main" id="{8712D37C-1E51-4CFE-AC9A-A24021457F60}"/>
-              </a:ext>
-            </a:extLst>
-          </p:cNvPr>
-          <p:cNvPicPr>
-            <a:picLocks noChangeAspect="1" noChangeArrowheads="1"/>
-          </p:cNvPicPr>
-          <p:nvPr/>
-        </p:nvPicPr>
-        <p:blipFill>
-          <a:blip r:embed="rId4">
-            <a:extLst>
-              <a:ext uri="{28A0092B-C50C-407E-A947-70E740481C1C}">
-                <a14:useLocalDpi xmlns:a14="http://schemas.microsoft.com/office/drawing/2010/main" val="0"/>
-              </a:ext>
-            </a:extLst>
-          </a:blip>
-          <a:srcRect/>
-          <a:stretch>
-            <a:fillRect/>
-          </a:stretch>
-        </p:blipFill>
-        <p:spPr bwMode="auto">
-          <a:xfrm>
-            <a:off x="8293743" y="2218842"/>
-            <a:ext cx="1547525" cy="1547525"/>
-          </a:xfrm>
-          <a:prstGeom prst="rect">
-            <a:avLst/>
-          </a:prstGeom>
-          <a:noFill/>
-          <a:extLst>
-            <a:ext uri="{909E8E84-426E-40DD-AFC4-6F175D3DCCD1}">
-              <a14:hiddenFill xmlns:a14="http://schemas.microsoft.com/office/drawing/2010/main">
-                <a:solidFill>
-                  <a:srgbClr val="FFFFFF"/>
-                </a:solidFill>
-              </a14:hiddenFill>
-            </a:ext>
-          </a:extLst>
-        </p:spPr>
-      </p:pic>
-      <p:sp>
-        <p:nvSpPr>
-          <p:cNvPr id="15" name="원형: 비어 있음 14">
-            <a:extLst>
-              <a:ext uri="{FF2B5EF4-FFF2-40B4-BE49-F238E27FC236}">
-                <a16:creationId xmlns:a16="http://schemas.microsoft.com/office/drawing/2014/main" id="{FCB0BB90-CAC8-4141-874C-EEE9CB4F4270}"/>
-              </a:ext>
-            </a:extLst>
-          </p:cNvPr>
-          <p:cNvSpPr/>
-          <p:nvPr/>
-        </p:nvSpPr>
-        <p:spPr>
-          <a:xfrm>
-            <a:off x="10130916" y="2670536"/>
-            <a:ext cx="635834" cy="635834"/>
-          </a:xfrm>
-          <a:prstGeom prst="donut">
-            <a:avLst/>
-          </a:prstGeom>
-        </p:spPr>
-        <p:style>
-          <a:lnRef idx="2">
-            <a:schemeClr val="accent1">
-              <a:shade val="50000"/>
-            </a:schemeClr>
-          </a:lnRef>
-          <a:fillRef idx="1">
-            <a:schemeClr val="accent1"/>
-          </a:fillRef>
-          <a:effectRef idx="0">
-            <a:schemeClr val="accent1"/>
-          </a:effectRef>
-          <a:fontRef idx="minor">
-            <a:schemeClr val="lt1"/>
-          </a:fontRef>
-        </p:style>
-        <p:txBody>
-          <a:bodyPr rtlCol="0" anchor="ctr"/>
-          <a:lstStyle/>
-          <a:p>
-            <a:pPr algn="ctr"/>
-            <a:endParaRPr lang="ko-KR" altLang="en-US">
-              <a:solidFill>
-                <a:schemeClr val="tx1"/>
-              </a:solidFill>
-            </a:endParaRPr>
-          </a:p>
-        </p:txBody>
-      </p:sp>
-      <p:sp>
-        <p:nvSpPr>
-          <p:cNvPr id="19" name="TextBox 18">
-            <a:extLst>
-              <a:ext uri="{FF2B5EF4-FFF2-40B4-BE49-F238E27FC236}">
-                <a16:creationId xmlns:a16="http://schemas.microsoft.com/office/drawing/2014/main" id="{839263F9-369E-4A4A-8D36-56646D195CAF}"/>
+      <p:sp>
+        <p:nvSpPr>
+          <p:cNvPr id="12" name="TextBox 11">
+            <a:extLst>
+              <a:ext uri="{FF2B5EF4-FFF2-40B4-BE49-F238E27FC236}">
+                <a16:creationId xmlns:a16="http://schemas.microsoft.com/office/drawing/2014/main" id="{E10FF337-8300-4427-8C22-A1C87FCF948D}"/>
               </a:ext>
             </a:extLst>
           </p:cNvPr>
@@ -10284,8 +10036,8 @@
         </p:nvSpPr>
         <p:spPr>
           <a:xfrm>
-            <a:off x="8452883" y="4151996"/>
-            <a:ext cx="2990847" cy="461665"/>
+            <a:off x="762855" y="3111248"/>
+            <a:ext cx="10680876" cy="461665"/>
           </a:xfrm>
           <a:prstGeom prst="rect">
             <a:avLst/>
@@ -10299,6 +10051,230 @@
           <a:lstStyle/>
           <a:p>
             <a:r>
+              <a:rPr lang="en-US" altLang="ko-KR" sz="2400" spc="100" dirty="0">
+                <a:solidFill>
+                  <a:srgbClr val="44546A"/>
+                </a:solidFill>
+                <a:latin typeface="나눔스퀘어 Bold" panose="020B0600000101010101" pitchFamily="50" charset="-127"/>
+                <a:ea typeface="나눔스퀘어 Bold" panose="020B0600000101010101" pitchFamily="50" charset="-127"/>
+              </a:rPr>
+              <a:t>	var</a:t>
+            </a:r>
+            <a:r>
+              <a:rPr lang="ko-KR" altLang="en-US" sz="2400" spc="100" dirty="0">
+                <a:solidFill>
+                  <a:srgbClr val="44546A"/>
+                </a:solidFill>
+                <a:latin typeface="나눔스퀘어 Bold" panose="020B0600000101010101" pitchFamily="50" charset="-127"/>
+                <a:ea typeface="나눔스퀘어 Bold" panose="020B0600000101010101" pitchFamily="50" charset="-127"/>
+              </a:rPr>
+              <a:t> 키워드로 선언한 변수는 전역 변수가 아니며</a:t>
+            </a:r>
+            <a:endParaRPr lang="en-US" altLang="ko-KR" sz="2400" spc="100" dirty="0">
+              <a:solidFill>
+                <a:srgbClr val="44546A"/>
+              </a:solidFill>
+              <a:latin typeface="나눔스퀘어 Bold" panose="020B0600000101010101" pitchFamily="50" charset="-127"/>
+              <a:ea typeface="나눔스퀘어 Bold" panose="020B0600000101010101" pitchFamily="50" charset="-127"/>
+            </a:endParaRPr>
+          </a:p>
+        </p:txBody>
+      </p:sp>
+      <p:sp>
+        <p:nvSpPr>
+          <p:cNvPr id="13" name="TextBox 12">
+            <a:extLst>
+              <a:ext uri="{FF2B5EF4-FFF2-40B4-BE49-F238E27FC236}">
+                <a16:creationId xmlns:a16="http://schemas.microsoft.com/office/drawing/2014/main" id="{4A075A92-6A53-4616-8A36-51662E48998A}"/>
+              </a:ext>
+            </a:extLst>
+          </p:cNvPr>
+          <p:cNvSpPr txBox="1"/>
+          <p:nvPr/>
+        </p:nvSpPr>
+        <p:spPr>
+          <a:xfrm>
+            <a:off x="762855" y="3572913"/>
+            <a:ext cx="10680876" cy="461665"/>
+          </a:xfrm>
+          <a:prstGeom prst="rect">
+            <a:avLst/>
+          </a:prstGeom>
+          <a:noFill/>
+        </p:spPr>
+        <p:txBody>
+          <a:bodyPr wrap="square" rtlCol="0">
+            <a:spAutoFit/>
+          </a:bodyPr>
+          <a:lstStyle/>
+          <a:p>
+            <a:r>
+              <a:rPr lang="en-US" altLang="ko-KR" sz="2400" spc="100" dirty="0">
+                <a:solidFill>
+                  <a:srgbClr val="44546A"/>
+                </a:solidFill>
+                <a:latin typeface="나눔스퀘어 Bold" panose="020B0600000101010101" pitchFamily="50" charset="-127"/>
+                <a:ea typeface="나눔스퀘어 Bold" panose="020B0600000101010101" pitchFamily="50" charset="-127"/>
+              </a:rPr>
+              <a:t>	window </a:t>
+            </a:r>
+            <a:r>
+              <a:rPr lang="ko-KR" altLang="en-US" sz="2400" spc="100" dirty="0">
+                <a:solidFill>
+                  <a:srgbClr val="44546A"/>
+                </a:solidFill>
+                <a:latin typeface="나눔스퀘어 Bold" panose="020B0600000101010101" pitchFamily="50" charset="-127"/>
+                <a:ea typeface="나눔스퀘어 Bold" panose="020B0600000101010101" pitchFamily="50" charset="-127"/>
+              </a:rPr>
+              <a:t>객체의 프로퍼티도 아님</a:t>
+            </a:r>
+            <a:endParaRPr lang="en-US" altLang="ko-KR" sz="2400" spc="100" dirty="0">
+              <a:solidFill>
+                <a:srgbClr val="44546A"/>
+              </a:solidFill>
+              <a:latin typeface="나눔스퀘어 Bold" panose="020B0600000101010101" pitchFamily="50" charset="-127"/>
+              <a:ea typeface="나눔스퀘어 Bold" panose="020B0600000101010101" pitchFamily="50" charset="-127"/>
+            </a:endParaRPr>
+          </a:p>
+        </p:txBody>
+      </p:sp>
+      <p:sp>
+        <p:nvSpPr>
+          <p:cNvPr id="15" name="TextBox 14">
+            <a:extLst>
+              <a:ext uri="{FF2B5EF4-FFF2-40B4-BE49-F238E27FC236}">
+                <a16:creationId xmlns:a16="http://schemas.microsoft.com/office/drawing/2014/main" id="{999E5D1D-E899-4790-82A9-78FC838D749F}"/>
+              </a:ext>
+            </a:extLst>
+          </p:cNvPr>
+          <p:cNvSpPr txBox="1"/>
+          <p:nvPr/>
+        </p:nvSpPr>
+        <p:spPr>
+          <a:xfrm>
+            <a:off x="762855" y="4496243"/>
+            <a:ext cx="10680876" cy="461665"/>
+          </a:xfrm>
+          <a:prstGeom prst="rect">
+            <a:avLst/>
+          </a:prstGeom>
+          <a:noFill/>
+        </p:spPr>
+        <p:txBody>
+          <a:bodyPr wrap="square" rtlCol="0">
+            <a:spAutoFit/>
+          </a:bodyPr>
+          <a:lstStyle/>
+          <a:p>
+            <a:r>
+              <a:rPr lang="ko-KR" altLang="en-US" sz="2400" spc="100" dirty="0">
+                <a:solidFill>
+                  <a:srgbClr val="44546A"/>
+                </a:solidFill>
+                <a:latin typeface="나눔스퀘어 Bold" panose="020B0600000101010101" pitchFamily="50" charset="-127"/>
+                <a:ea typeface="나눔스퀘어 Bold" panose="020B0600000101010101" pitchFamily="50" charset="-127"/>
+              </a:rPr>
+              <a:t>모던 브라우저</a:t>
+            </a:r>
+            <a:r>
+              <a:rPr lang="en-US" altLang="ko-KR" sz="2400" spc="100" dirty="0">
+                <a:solidFill>
+                  <a:srgbClr val="44546A"/>
+                </a:solidFill>
+                <a:latin typeface="나눔스퀘어 Bold" panose="020B0600000101010101" pitchFamily="50" charset="-127"/>
+                <a:ea typeface="나눔스퀘어 Bold" panose="020B0600000101010101" pitchFamily="50" charset="-127"/>
+              </a:rPr>
+              <a:t>(Chrome, Firefox, Safari, Edge)</a:t>
+            </a:r>
+            <a:r>
+              <a:rPr lang="ko-KR" altLang="en-US" sz="2400" spc="100" dirty="0">
+                <a:solidFill>
+                  <a:srgbClr val="44546A"/>
+                </a:solidFill>
+                <a:latin typeface="나눔스퀘어 Bold" panose="020B0600000101010101" pitchFamily="50" charset="-127"/>
+                <a:ea typeface="나눔스퀘어 Bold" panose="020B0600000101010101" pitchFamily="50" charset="-127"/>
+              </a:rPr>
+              <a:t>에서 </a:t>
+            </a:r>
+            <a:r>
+              <a:rPr lang="en-US" altLang="ko-KR" sz="2400" spc="100" dirty="0">
+                <a:solidFill>
+                  <a:srgbClr val="44546A"/>
+                </a:solidFill>
+                <a:latin typeface="나눔스퀘어 Bold" panose="020B0600000101010101" pitchFamily="50" charset="-127"/>
+                <a:ea typeface="나눔스퀘어 Bold" panose="020B0600000101010101" pitchFamily="50" charset="-127"/>
+              </a:rPr>
+              <a:t>ES6 </a:t>
+            </a:r>
+            <a:r>
+              <a:rPr lang="ko-KR" altLang="en-US" sz="2400" spc="100" dirty="0">
+                <a:solidFill>
+                  <a:srgbClr val="44546A"/>
+                </a:solidFill>
+                <a:latin typeface="나눔스퀘어 Bold" panose="020B0600000101010101" pitchFamily="50" charset="-127"/>
+                <a:ea typeface="나눔스퀘어 Bold" panose="020B0600000101010101" pitchFamily="50" charset="-127"/>
+              </a:rPr>
+              <a:t>모듈 사용 가능</a:t>
+            </a:r>
+            <a:endParaRPr lang="en-US" altLang="ko-KR" sz="2400" spc="100" dirty="0">
+              <a:solidFill>
+                <a:srgbClr val="44546A"/>
+              </a:solidFill>
+              <a:latin typeface="나눔스퀘어 Bold" panose="020B0600000101010101" pitchFamily="50" charset="-127"/>
+              <a:ea typeface="나눔스퀘어 Bold" panose="020B0600000101010101" pitchFamily="50" charset="-127"/>
+            </a:endParaRPr>
+          </a:p>
+        </p:txBody>
+      </p:sp>
+      <p:sp>
+        <p:nvSpPr>
+          <p:cNvPr id="16" name="TextBox 15">
+            <a:extLst>
+              <a:ext uri="{FF2B5EF4-FFF2-40B4-BE49-F238E27FC236}">
+                <a16:creationId xmlns:a16="http://schemas.microsoft.com/office/drawing/2014/main" id="{AEF0B439-44D7-41CB-8857-0C472913727A}"/>
+              </a:ext>
+            </a:extLst>
+          </p:cNvPr>
+          <p:cNvSpPr txBox="1"/>
+          <p:nvPr/>
+        </p:nvSpPr>
+        <p:spPr>
+          <a:xfrm>
+            <a:off x="762855" y="5419573"/>
+            <a:ext cx="10680876" cy="461665"/>
+          </a:xfrm>
+          <a:prstGeom prst="rect">
+            <a:avLst/>
+          </a:prstGeom>
+          <a:noFill/>
+        </p:spPr>
+        <p:txBody>
+          <a:bodyPr wrap="square" rtlCol="0">
+            <a:spAutoFit/>
+          </a:bodyPr>
+          <a:lstStyle/>
+          <a:p>
+            <a:r>
+              <a:rPr lang="en-US" altLang="ko-KR" sz="2400" spc="100" dirty="0">
+                <a:solidFill>
+                  <a:srgbClr val="44546A"/>
+                </a:solidFill>
+                <a:latin typeface="나눔스퀘어 Bold" panose="020B0600000101010101" pitchFamily="50" charset="-127"/>
+                <a:ea typeface="나눔스퀘어 Bold" panose="020B0600000101010101" pitchFamily="50" charset="-127"/>
+              </a:rPr>
+              <a:t>	</a:t>
+            </a:r>
+            <a:r>
+              <a:rPr lang="ko-KR" altLang="en-US" sz="2400" spc="100" dirty="0">
+                <a:solidFill>
+                  <a:srgbClr val="44546A"/>
+                </a:solidFill>
+                <a:latin typeface="나눔스퀘어 Bold" panose="020B0600000101010101" pitchFamily="50" charset="-127"/>
+                <a:ea typeface="나눔스퀘어 Bold" panose="020B0600000101010101" pitchFamily="50" charset="-127"/>
+              </a:rPr>
+              <a:t>확장자는 </a:t>
+            </a:r>
+            <a:r>
               <a:rPr lang="en-US" altLang="ko-KR" sz="2400" spc="100" dirty="0" err="1">
                 <a:solidFill>
                   <a:srgbClr val="44546A"/>
@@ -10306,7 +10282,7 @@
                 <a:latin typeface="나눔스퀘어 Bold" panose="020B0600000101010101" pitchFamily="50" charset="-127"/>
                 <a:ea typeface="나눔스퀘어 Bold" panose="020B0600000101010101" pitchFamily="50" charset="-127"/>
               </a:rPr>
-              <a:t>iexplore</a:t>
+              <a:t>mjs</a:t>
             </a:r>
             <a:r>
               <a:rPr lang="ko-KR" altLang="en-US" sz="2400" spc="100" dirty="0">
@@ -10316,8 +10292,46 @@
                 <a:latin typeface="나눔스퀘어 Bold" panose="020B0600000101010101" pitchFamily="50" charset="-127"/>
                 <a:ea typeface="나눔스퀘어 Bold" panose="020B0600000101010101" pitchFamily="50" charset="-127"/>
               </a:rPr>
-              <a:t>에서 동작 </a:t>
-            </a:r>
+              <a:t>를 권장</a:t>
+            </a:r>
+            <a:endParaRPr lang="en-US" altLang="ko-KR" sz="2400" spc="100" dirty="0">
+              <a:solidFill>
+                <a:srgbClr val="44546A"/>
+              </a:solidFill>
+              <a:latin typeface="나눔스퀘어 Bold" panose="020B0600000101010101" pitchFamily="50" charset="-127"/>
+              <a:ea typeface="나눔스퀘어 Bold" panose="020B0600000101010101" pitchFamily="50" charset="-127"/>
+            </a:endParaRPr>
+          </a:p>
+        </p:txBody>
+      </p:sp>
+      <p:sp>
+        <p:nvSpPr>
+          <p:cNvPr id="19" name="TextBox 18">
+            <a:extLst>
+              <a:ext uri="{FF2B5EF4-FFF2-40B4-BE49-F238E27FC236}">
+                <a16:creationId xmlns:a16="http://schemas.microsoft.com/office/drawing/2014/main" id="{0FD73643-12C8-4E2A-8413-48910611A222}"/>
+              </a:ext>
+            </a:extLst>
+          </p:cNvPr>
+          <p:cNvSpPr txBox="1"/>
+          <p:nvPr/>
+        </p:nvSpPr>
+        <p:spPr>
+          <a:xfrm>
+            <a:off x="762855" y="4957908"/>
+            <a:ext cx="10680876" cy="461665"/>
+          </a:xfrm>
+          <a:prstGeom prst="rect">
+            <a:avLst/>
+          </a:prstGeom>
+          <a:noFill/>
+        </p:spPr>
+        <p:txBody>
+          <a:bodyPr wrap="square" rtlCol="0">
+            <a:spAutoFit/>
+          </a:bodyPr>
+          <a:lstStyle/>
+          <a:p>
             <a:r>
               <a:rPr lang="en-US" altLang="ko-KR" sz="2400" spc="100" dirty="0">
                 <a:solidFill>
@@ -10326,127 +10340,65 @@
                 <a:latin typeface="나눔스퀘어 Bold" panose="020B0600000101010101" pitchFamily="50" charset="-127"/>
                 <a:ea typeface="나눔스퀘어 Bold" panose="020B0600000101010101" pitchFamily="50" charset="-127"/>
               </a:rPr>
-              <a:t>×</a:t>
-            </a:r>
-          </a:p>
-        </p:txBody>
-      </p:sp>
-      <p:pic>
-        <p:nvPicPr>
-          <p:cNvPr id="20" name="Picture 2" descr="Microsoft is finally retiring Internet Explorer in 2022 - The Verge">
-            <a:extLst>
-              <a:ext uri="{FF2B5EF4-FFF2-40B4-BE49-F238E27FC236}">
-                <a16:creationId xmlns:a16="http://schemas.microsoft.com/office/drawing/2014/main" id="{1C2D0781-D9D7-49D7-92B7-77422B3DDCDF}"/>
-              </a:ext>
-            </a:extLst>
-          </p:cNvPr>
-          <p:cNvPicPr>
-            <a:picLocks noChangeAspect="1" noChangeArrowheads="1"/>
-          </p:cNvPicPr>
-          <p:nvPr/>
-        </p:nvPicPr>
-        <p:blipFill>
-          <a:blip r:embed="rId4">
-            <a:extLst>
-              <a:ext uri="{28A0092B-C50C-407E-A947-70E740481C1C}">
-                <a14:useLocalDpi xmlns:a14="http://schemas.microsoft.com/office/drawing/2010/main" val="0"/>
-              </a:ext>
-            </a:extLst>
-          </a:blip>
-          <a:srcRect/>
-          <a:stretch>
-            <a:fillRect/>
-          </a:stretch>
-        </p:blipFill>
-        <p:spPr bwMode="auto">
-          <a:xfrm>
-            <a:off x="8293743" y="4613661"/>
-            <a:ext cx="1547525" cy="1547525"/>
-          </a:xfrm>
-          <a:prstGeom prst="rect">
-            <a:avLst/>
-          </a:prstGeom>
-          <a:noFill/>
-          <a:extLst>
-            <a:ext uri="{909E8E84-426E-40DD-AFC4-6F175D3DCCD1}">
-              <a14:hiddenFill xmlns:a14="http://schemas.microsoft.com/office/drawing/2010/main">
-                <a:solidFill>
-                  <a:srgbClr val="FFFFFF"/>
-                </a:solidFill>
-              </a14:hiddenFill>
-            </a:ext>
-          </a:extLst>
-        </p:spPr>
-      </p:pic>
-      <p:sp>
-        <p:nvSpPr>
-          <p:cNvPr id="18" name="곱하기 기호 17">
-            <a:extLst>
-              <a:ext uri="{FF2B5EF4-FFF2-40B4-BE49-F238E27FC236}">
-                <a16:creationId xmlns:a16="http://schemas.microsoft.com/office/drawing/2014/main" id="{16E12253-8E00-4F93-A360-EFB1CD19B9D4}"/>
-              </a:ext>
-            </a:extLst>
-          </p:cNvPr>
-          <p:cNvSpPr/>
-          <p:nvPr/>
-        </p:nvSpPr>
-        <p:spPr>
-          <a:xfrm>
-            <a:off x="10039479" y="4974786"/>
-            <a:ext cx="818707" cy="818707"/>
-          </a:xfrm>
-          <a:prstGeom prst="mathMultiply">
-            <a:avLst/>
-          </a:prstGeom>
-          <a:solidFill>
-            <a:schemeClr val="accent2"/>
-          </a:solidFill>
-          <a:ln>
-            <a:noFill/>
-          </a:ln>
-        </p:spPr>
-        <p:style>
-          <a:lnRef idx="2">
-            <a:schemeClr val="accent1">
-              <a:shade val="50000"/>
-            </a:schemeClr>
-          </a:lnRef>
-          <a:fillRef idx="1">
-            <a:schemeClr val="accent1"/>
-          </a:fillRef>
-          <a:effectRef idx="0">
-            <a:schemeClr val="accent1"/>
-          </a:effectRef>
-          <a:fontRef idx="minor">
-            <a:schemeClr val="lt1"/>
-          </a:fontRef>
-        </p:style>
-        <p:txBody>
-          <a:bodyPr rtlCol="0" anchor="ctr"/>
-          <a:lstStyle/>
-          <a:p>
-            <a:pPr algn="ctr"/>
-            <a:endParaRPr lang="ko-KR" altLang="en-US"/>
+              <a:t>	</a:t>
+            </a:r>
+            <a:r>
+              <a:rPr lang="ko-KR" altLang="en-US" sz="2400" spc="100" dirty="0">
+                <a:solidFill>
+                  <a:srgbClr val="44546A"/>
+                </a:solidFill>
+                <a:latin typeface="나눔스퀘어 Bold" panose="020B0600000101010101" pitchFamily="50" charset="-127"/>
+                <a:ea typeface="나눔스퀘어 Bold" panose="020B0600000101010101" pitchFamily="50" charset="-127"/>
+              </a:rPr>
+              <a:t>구형 브라우저</a:t>
+            </a:r>
+            <a:r>
+              <a:rPr lang="en-US" altLang="ko-KR" sz="2400" spc="100" dirty="0">
+                <a:solidFill>
+                  <a:srgbClr val="44546A"/>
+                </a:solidFill>
+                <a:latin typeface="나눔스퀘어 Bold" panose="020B0600000101010101" pitchFamily="50" charset="-127"/>
+                <a:ea typeface="나눔스퀘어 Bold" panose="020B0600000101010101" pitchFamily="50" charset="-127"/>
+              </a:rPr>
+              <a:t>(IE)</a:t>
+            </a:r>
+            <a:r>
+              <a:rPr lang="ko-KR" altLang="en-US" sz="2400" spc="100" dirty="0">
+                <a:solidFill>
+                  <a:srgbClr val="44546A"/>
+                </a:solidFill>
+                <a:latin typeface="나눔스퀘어 Bold" panose="020B0600000101010101" pitchFamily="50" charset="-127"/>
+                <a:ea typeface="나눔스퀘어 Bold" panose="020B0600000101010101" pitchFamily="50" charset="-127"/>
+              </a:rPr>
+              <a:t>에서는 동작 안함</a:t>
+            </a:r>
+            <a:endParaRPr lang="en-US" altLang="ko-KR" sz="2400" spc="100" dirty="0">
+              <a:solidFill>
+                <a:srgbClr val="44546A"/>
+              </a:solidFill>
+              <a:latin typeface="나눔스퀘어 Bold" panose="020B0600000101010101" pitchFamily="50" charset="-127"/>
+              <a:ea typeface="나눔스퀘어 Bold" panose="020B0600000101010101" pitchFamily="50" charset="-127"/>
+            </a:endParaRPr>
           </a:p>
         </p:txBody>
       </p:sp>
     </p:spTree>
     <p:extLst>
       <p:ext uri="{BB962C8B-B14F-4D97-AF65-F5344CB8AC3E}">
-        <p14:creationId xmlns:p14="http://schemas.microsoft.com/office/powerpoint/2010/main" val="1020084646"/>
+        <p14:creationId xmlns:p14="http://schemas.microsoft.com/office/powerpoint/2010/main" val="3004854744"/>
       </p:ext>
     </p:extLst>
   </p:cSld>
   <p:clrMapOvr>
     <a:masterClrMapping/>
   </p:clrMapOvr>
-  <mc:AlternateContent xmlns:mc="http://schemas.openxmlformats.org/markup-compatibility/2006">
-    <mc:Choice xmlns:p159="http://schemas.microsoft.com/office/powerpoint/2015/09/main" Requires="p159">
+  <mc:AlternateContent xmlns:mc="http://schemas.openxmlformats.org/markup-compatibility/2006" xmlns:p159="http://schemas.microsoft.com/office/powerpoint/2015/09/main">
+    <mc:Choice Requires="p159">
       <p:transition xmlns:p14="http://schemas.microsoft.com/office/powerpoint/2010/main" spd="slow" p14:dur="2000">
         <p159:morph option="byObject"/>
       </p:transition>
     </mc:Choice>
-    <mc:Fallback>
+    <mc:Fallback xmlns="">
       <p:transition spd="slow">
         <p:fade/>
       </p:transition>
@@ -10676,6 +10628,16 @@
           <a:lstStyle/>
           <a:p>
             <a:r>
+              <a:rPr lang="en-US" altLang="ko-KR" sz="2400" spc="100" dirty="0">
+                <a:solidFill>
+                  <a:srgbClr val="44546A"/>
+                </a:solidFill>
+                <a:latin typeface="나눔스퀘어 Bold" panose="020B0600000101010101" pitchFamily="50" charset="-127"/>
+                <a:ea typeface="나눔스퀘어 Bold" panose="020B0600000101010101" pitchFamily="50" charset="-127"/>
+              </a:rPr>
+              <a:t>ES6 </a:t>
+            </a:r>
+            <a:r>
               <a:rPr lang="ko-KR" altLang="en-US" sz="2400" spc="100" dirty="0">
                 <a:solidFill>
                   <a:srgbClr val="44546A"/>
@@ -10683,38 +10645,15 @@
                 <a:latin typeface="나눔스퀘어 Bold" panose="020B0600000101010101" pitchFamily="50" charset="-127"/>
                 <a:ea typeface="나눔스퀘어 Bold" panose="020B0600000101010101" pitchFamily="50" charset="-127"/>
               </a:rPr>
-              <a:t>문제</a:t>
-            </a:r>
-            <a:r>
-              <a:rPr lang="en-US" altLang="ko-KR" sz="2400" spc="100" dirty="0">
-                <a:solidFill>
-                  <a:srgbClr val="44546A"/>
-                </a:solidFill>
-                <a:latin typeface="나눔스퀘어 Bold" panose="020B0600000101010101" pitchFamily="50" charset="-127"/>
-                <a:ea typeface="나눔스퀘어 Bold" panose="020B0600000101010101" pitchFamily="50" charset="-127"/>
-              </a:rPr>
-              <a:t>, </a:t>
-            </a:r>
-            <a:r>
-              <a:rPr lang="ko-KR" altLang="en-US" sz="2400" spc="100" dirty="0">
-                <a:solidFill>
-                  <a:srgbClr val="44546A"/>
-                </a:solidFill>
-                <a:latin typeface="나눔스퀘어 Bold" panose="020B0600000101010101" pitchFamily="50" charset="-127"/>
-                <a:ea typeface="나눔스퀘어 Bold" panose="020B0600000101010101" pitchFamily="50" charset="-127"/>
-              </a:rPr>
-              <a:t>답지 </a:t>
-            </a:r>
-            <a:r>
-              <a:rPr lang="en-US" altLang="ko-KR" sz="2400" spc="100" dirty="0">
-                <a:solidFill>
-                  <a:srgbClr val="44546A"/>
-                </a:solidFill>
-                <a:latin typeface="나눔스퀘어 Bold" panose="020B0600000101010101" pitchFamily="50" charset="-127"/>
-                <a:ea typeface="나눔스퀘어 Bold" panose="020B0600000101010101" pitchFamily="50" charset="-127"/>
-              </a:rPr>
-              <a:t>ppt</a:t>
-            </a:r>
+              <a:t>모듈</a:t>
+            </a:r>
+            <a:endParaRPr lang="en-US" altLang="ko-KR" sz="2400" spc="100" dirty="0">
+              <a:solidFill>
+                <a:srgbClr val="44546A"/>
+              </a:solidFill>
+              <a:latin typeface="나눔스퀘어 Bold" panose="020B0600000101010101" pitchFamily="50" charset="-127"/>
+              <a:ea typeface="나눔스퀘어 Bold" panose="020B0600000101010101" pitchFamily="50" charset="-127"/>
+            </a:endParaRPr>
           </a:p>
         </p:txBody>
       </p:sp>
@@ -10767,14 +10706,14 @@
               <a:t> </a:t>
             </a:r>
             <a:r>
-              <a:rPr lang="en-US" altLang="ko-KR" sz="2400" spc="100" dirty="0">
+              <a:rPr lang="en-US" altLang="ko-KR" sz="2400" spc="100">
                 <a:solidFill>
                   <a:srgbClr val="000000"/>
                 </a:solidFill>
                 <a:latin typeface="나눔스퀘어 Bold" panose="020B0600000101010101" pitchFamily="50" charset="-127"/>
                 <a:ea typeface="나눔스퀘어 Bold" panose="020B0600000101010101" pitchFamily="50" charset="-127"/>
               </a:rPr>
-              <a:t>206</a:t>
+              <a:t>207</a:t>
             </a:r>
             <a:endParaRPr lang="ko-KR" altLang="en-US" sz="2400" spc="100" dirty="0">
               <a:solidFill>
@@ -10841,12 +10780,72 @@
           </a:p>
         </p:txBody>
       </p:sp>
-      <p:sp>
-        <p:nvSpPr>
-          <p:cNvPr id="10" name="TextBox 9">
-            <a:extLst>
-              <a:ext uri="{FF2B5EF4-FFF2-40B4-BE49-F238E27FC236}">
-                <a16:creationId xmlns:a16="http://schemas.microsoft.com/office/drawing/2014/main" id="{02AFF967-66B7-3EA3-20E6-621981EA5089}"/>
+      <p:pic>
+        <p:nvPicPr>
+          <p:cNvPr id="5" name="그림 4">
+            <a:extLst>
+              <a:ext uri="{FF2B5EF4-FFF2-40B4-BE49-F238E27FC236}">
+                <a16:creationId xmlns:a16="http://schemas.microsoft.com/office/drawing/2014/main" id="{FF45E417-15CF-45D8-B6DF-6A327495C1A1}"/>
+              </a:ext>
+            </a:extLst>
+          </p:cNvPr>
+          <p:cNvPicPr>
+            <a:picLocks noChangeAspect="1"/>
+          </p:cNvPicPr>
+          <p:nvPr/>
+        </p:nvPicPr>
+        <p:blipFill>
+          <a:blip r:embed="rId2"/>
+          <a:stretch>
+            <a:fillRect/>
+          </a:stretch>
+        </p:blipFill>
+        <p:spPr>
+          <a:xfrm>
+            <a:off x="762855" y="1757177"/>
+            <a:ext cx="7475174" cy="2072947"/>
+          </a:xfrm>
+          <a:prstGeom prst="rect">
+            <a:avLst/>
+          </a:prstGeom>
+        </p:spPr>
+      </p:pic>
+      <p:pic>
+        <p:nvPicPr>
+          <p:cNvPr id="14" name="그림 13">
+            <a:extLst>
+              <a:ext uri="{FF2B5EF4-FFF2-40B4-BE49-F238E27FC236}">
+                <a16:creationId xmlns:a16="http://schemas.microsoft.com/office/drawing/2014/main" id="{4EF0D6B3-EB9D-4798-8EDC-919AF9C4A4DF}"/>
+              </a:ext>
+            </a:extLst>
+          </p:cNvPr>
+          <p:cNvPicPr>
+            <a:picLocks noChangeAspect="1"/>
+          </p:cNvPicPr>
+          <p:nvPr/>
+        </p:nvPicPr>
+        <p:blipFill>
+          <a:blip r:embed="rId3"/>
+          <a:stretch>
+            <a:fillRect/>
+          </a:stretch>
+        </p:blipFill>
+        <p:spPr>
+          <a:xfrm>
+            <a:off x="762854" y="4083208"/>
+            <a:ext cx="7475173" cy="2214866"/>
+          </a:xfrm>
+          <a:prstGeom prst="rect">
+            <a:avLst/>
+          </a:prstGeom>
+        </p:spPr>
+      </p:pic>
+      <p:sp>
+        <p:nvSpPr>
+          <p:cNvPr id="16" name="TextBox 15">
+            <a:extLst>
+              <a:ext uri="{FF2B5EF4-FFF2-40B4-BE49-F238E27FC236}">
+                <a16:creationId xmlns:a16="http://schemas.microsoft.com/office/drawing/2014/main" id="{C0F3FF40-EDD0-41C1-9501-6F8A165719DE}"/>
               </a:ext>
             </a:extLst>
           </p:cNvPr>
@@ -10855,8 +10854,8 @@
         </p:nvSpPr>
         <p:spPr>
           <a:xfrm>
-            <a:off x="762855" y="1760056"/>
-            <a:ext cx="10680876" cy="1569660"/>
+            <a:off x="8452883" y="1757177"/>
+            <a:ext cx="2990847" cy="461665"/>
           </a:xfrm>
           <a:prstGeom prst="rect">
             <a:avLst/>
@@ -10870,14 +10869,14 @@
           <a:lstStyle/>
           <a:p>
             <a:r>
-              <a:rPr lang="en-US" altLang="ko-KR" sz="2400" spc="100" dirty="0">
-                <a:solidFill>
-                  <a:srgbClr val="44546A"/>
-                </a:solidFill>
-                <a:latin typeface="나눔스퀘어 Bold" panose="020B0600000101010101" pitchFamily="50" charset="-127"/>
-                <a:ea typeface="나눔스퀘어 Bold" panose="020B0600000101010101" pitchFamily="50" charset="-127"/>
-              </a:rPr>
-              <a:t>	+</a:t>
+              <a:rPr lang="en-US" altLang="ko-KR" sz="2400" spc="100" dirty="0" err="1">
+                <a:solidFill>
+                  <a:srgbClr val="44546A"/>
+                </a:solidFill>
+                <a:latin typeface="나눔스퀘어 Bold" panose="020B0600000101010101" pitchFamily="50" charset="-127"/>
+                <a:ea typeface="나눔스퀘어 Bold" panose="020B0600000101010101" pitchFamily="50" charset="-127"/>
+              </a:rPr>
+              <a:t>iexplore</a:t>
             </a:r>
             <a:r>
               <a:rPr lang="ko-KR" altLang="en-US" sz="2400" spc="100" dirty="0">
@@ -10887,85 +10886,8 @@
                 <a:latin typeface="나눔스퀘어 Bold" panose="020B0600000101010101" pitchFamily="50" charset="-127"/>
                 <a:ea typeface="나눔스퀘어 Bold" panose="020B0600000101010101" pitchFamily="50" charset="-127"/>
               </a:rPr>
-              <a:t> </a:t>
-            </a:r>
-            <a:r>
-              <a:rPr lang="en-US" altLang="ko-KR" sz="2400" spc="100" dirty="0">
-                <a:solidFill>
-                  <a:srgbClr val="44546A"/>
-                </a:solidFill>
-                <a:latin typeface="나눔스퀘어 Bold" panose="020B0600000101010101" pitchFamily="50" charset="-127"/>
-                <a:ea typeface="나눔스퀘어 Bold" panose="020B0600000101010101" pitchFamily="50" charset="-127"/>
-              </a:rPr>
-              <a:t>#</a:t>
-            </a:r>
-            <a:r>
-              <a:rPr lang="ko-KR" altLang="en-US" sz="2400" spc="100" dirty="0">
-                <a:solidFill>
-                  <a:srgbClr val="44546A"/>
-                </a:solidFill>
-                <a:latin typeface="나눔스퀘어 Bold" panose="020B0600000101010101" pitchFamily="50" charset="-127"/>
-                <a:ea typeface="나눔스퀘어 Bold" panose="020B0600000101010101" pitchFamily="50" charset="-127"/>
-              </a:rPr>
-              <a:t> 키워드 </a:t>
-            </a:r>
-            <a:r>
-              <a:rPr lang="ko-KR" altLang="en-US" sz="2400" dirty="0">
-                <a:hlinkClick r:id="rId2"/>
-              </a:rPr>
-              <a:t>자바스크립트 디자인 패턴 </a:t>
-            </a:r>
-            <a:r>
-              <a:rPr lang="en-US" altLang="ko-KR" sz="2400" dirty="0">
-                <a:hlinkClick r:id="rId2"/>
-              </a:rPr>
-              <a:t>— </a:t>
-            </a:r>
-            <a:r>
-              <a:rPr lang="ko-KR" altLang="en-US" sz="2400" dirty="0">
-                <a:hlinkClick r:id="rId2"/>
-              </a:rPr>
-              <a:t>모듈 패턴</a:t>
-            </a:r>
-            <a:r>
-              <a:rPr lang="en-US" altLang="ko-KR" sz="2400" dirty="0">
-                <a:hlinkClick r:id="rId2"/>
-              </a:rPr>
-              <a:t>. </a:t>
-            </a:r>
-            <a:r>
-              <a:rPr lang="ko-KR" altLang="en-US" sz="2400" dirty="0" err="1">
-                <a:hlinkClick r:id="rId2"/>
-              </a:rPr>
-              <a:t>클로져를</a:t>
-            </a:r>
-            <a:r>
-              <a:rPr lang="ko-KR" altLang="en-US" sz="2400" dirty="0">
-                <a:hlinkClick r:id="rId2"/>
-              </a:rPr>
-              <a:t> 이용한 모듈 패턴을 알아본다 </a:t>
-            </a:r>
-            <a:r>
-              <a:rPr lang="en-US" altLang="ko-KR" sz="2400" dirty="0">
-                <a:hlinkClick r:id="rId2"/>
-              </a:rPr>
-              <a:t>| by Moon | </a:t>
-            </a:r>
-            <a:r>
-              <a:rPr lang="ko-KR" altLang="en-US" sz="2400" dirty="0">
-                <a:hlinkClick r:id="rId2"/>
-              </a:rPr>
-              <a:t>오늘의 프로그래밍 </a:t>
-            </a:r>
-            <a:r>
-              <a:rPr lang="en-US" altLang="ko-KR" sz="2400" dirty="0">
-                <a:hlinkClick r:id="rId2"/>
-              </a:rPr>
-              <a:t>| Medium</a:t>
-            </a:r>
-            <a:endParaRPr lang="en-US" altLang="ko-KR" sz="2400" dirty="0"/>
-          </a:p>
-          <a:p>
+              <a:t>에서 동작</a:t>
+            </a:r>
             <a:endParaRPr lang="en-US" altLang="ko-KR" sz="2400" spc="100" dirty="0">
               <a:solidFill>
                 <a:srgbClr val="44546A"/>
@@ -10974,33 +10896,310 @@
               <a:ea typeface="나눔스퀘어 Bold" panose="020B0600000101010101" pitchFamily="50" charset="-127"/>
             </a:endParaRPr>
           </a:p>
-          <a:p>
-            <a:r>
-              <a:rPr lang="ko-KR" altLang="en-US" sz="2400" dirty="0">
-                <a:hlinkClick r:id="rId3"/>
-              </a:rPr>
-              <a:t>클래스와 기본 문법 </a:t>
-            </a:r>
-            <a:r>
-              <a:rPr lang="en-US" altLang="ko-KR" sz="2400">
-                <a:hlinkClick r:id="rId3"/>
-              </a:rPr>
-              <a:t>(javascript.info)</a:t>
-            </a:r>
-            <a:endParaRPr lang="en-US" altLang="ko-KR" sz="2400" spc="100" dirty="0">
+        </p:txBody>
+      </p:sp>
+      <p:pic>
+        <p:nvPicPr>
+          <p:cNvPr id="1026" name="Picture 2" descr="Microsoft is finally retiring Internet Explorer in 2022 - The Verge">
+            <a:extLst>
+              <a:ext uri="{FF2B5EF4-FFF2-40B4-BE49-F238E27FC236}">
+                <a16:creationId xmlns:a16="http://schemas.microsoft.com/office/drawing/2014/main" id="{8712D37C-1E51-4CFE-AC9A-A24021457F60}"/>
+              </a:ext>
+            </a:extLst>
+          </p:cNvPr>
+          <p:cNvPicPr>
+            <a:picLocks noChangeAspect="1" noChangeArrowheads="1"/>
+          </p:cNvPicPr>
+          <p:nvPr/>
+        </p:nvPicPr>
+        <p:blipFill>
+          <a:blip r:embed="rId4">
+            <a:extLst>
+              <a:ext uri="{28A0092B-C50C-407E-A947-70E740481C1C}">
+                <a14:useLocalDpi xmlns:a14="http://schemas.microsoft.com/office/drawing/2010/main" val="0"/>
+              </a:ext>
+            </a:extLst>
+          </a:blip>
+          <a:srcRect/>
+          <a:stretch>
+            <a:fillRect/>
+          </a:stretch>
+        </p:blipFill>
+        <p:spPr bwMode="auto">
+          <a:xfrm>
+            <a:off x="8293743" y="2218842"/>
+            <a:ext cx="1547525" cy="1547525"/>
+          </a:xfrm>
+          <a:prstGeom prst="rect">
+            <a:avLst/>
+          </a:prstGeom>
+          <a:noFill/>
+          <a:extLst>
+            <a:ext uri="{909E8E84-426E-40DD-AFC4-6F175D3DCCD1}">
+              <a14:hiddenFill xmlns:a14="http://schemas.microsoft.com/office/drawing/2010/main">
+                <a:solidFill>
+                  <a:srgbClr val="FFFFFF"/>
+                </a:solidFill>
+              </a14:hiddenFill>
+            </a:ext>
+          </a:extLst>
+        </p:spPr>
+      </p:pic>
+      <p:sp>
+        <p:nvSpPr>
+          <p:cNvPr id="15" name="원형: 비어 있음 14">
+            <a:extLst>
+              <a:ext uri="{FF2B5EF4-FFF2-40B4-BE49-F238E27FC236}">
+                <a16:creationId xmlns:a16="http://schemas.microsoft.com/office/drawing/2014/main" id="{FCB0BB90-CAC8-4141-874C-EEE9CB4F4270}"/>
+              </a:ext>
+            </a:extLst>
+          </p:cNvPr>
+          <p:cNvSpPr/>
+          <p:nvPr/>
+        </p:nvSpPr>
+        <p:spPr>
+          <a:xfrm>
+            <a:off x="10130916" y="2670536"/>
+            <a:ext cx="635834" cy="635834"/>
+          </a:xfrm>
+          <a:prstGeom prst="donut">
+            <a:avLst/>
+          </a:prstGeom>
+        </p:spPr>
+        <p:style>
+          <a:lnRef idx="2">
+            <a:schemeClr val="accent1">
+              <a:shade val="50000"/>
+            </a:schemeClr>
+          </a:lnRef>
+          <a:fillRef idx="1">
+            <a:schemeClr val="accent1"/>
+          </a:fillRef>
+          <a:effectRef idx="0">
+            <a:schemeClr val="accent1"/>
+          </a:effectRef>
+          <a:fontRef idx="minor">
+            <a:schemeClr val="lt1"/>
+          </a:fontRef>
+        </p:style>
+        <p:txBody>
+          <a:bodyPr rtlCol="0" anchor="ctr"/>
+          <a:lstStyle/>
+          <a:p>
+            <a:pPr algn="ctr"/>
+            <a:endParaRPr lang="ko-KR" altLang="en-US">
               <a:solidFill>
-                <a:srgbClr val="44546A"/>
+                <a:schemeClr val="tx1"/>
               </a:solidFill>
-              <a:latin typeface="나눔스퀘어 Bold" panose="020B0600000101010101" pitchFamily="50" charset="-127"/>
-              <a:ea typeface="나눔스퀘어 Bold" panose="020B0600000101010101" pitchFamily="50" charset="-127"/>
             </a:endParaRPr>
           </a:p>
         </p:txBody>
       </p:sp>
+      <p:sp>
+        <p:nvSpPr>
+          <p:cNvPr id="19" name="TextBox 18">
+            <a:extLst>
+              <a:ext uri="{FF2B5EF4-FFF2-40B4-BE49-F238E27FC236}">
+                <a16:creationId xmlns:a16="http://schemas.microsoft.com/office/drawing/2014/main" id="{839263F9-369E-4A4A-8D36-56646D195CAF}"/>
+              </a:ext>
+            </a:extLst>
+          </p:cNvPr>
+          <p:cNvSpPr txBox="1"/>
+          <p:nvPr/>
+        </p:nvSpPr>
+        <p:spPr>
+          <a:xfrm>
+            <a:off x="8452883" y="4151996"/>
+            <a:ext cx="2990847" cy="461665"/>
+          </a:xfrm>
+          <a:prstGeom prst="rect">
+            <a:avLst/>
+          </a:prstGeom>
+          <a:noFill/>
+        </p:spPr>
+        <p:txBody>
+          <a:bodyPr wrap="square" rtlCol="0">
+            <a:spAutoFit/>
+          </a:bodyPr>
+          <a:lstStyle/>
+          <a:p>
+            <a:r>
+              <a:rPr lang="en-US" altLang="ko-KR" sz="2400" spc="100" dirty="0" err="1">
+                <a:solidFill>
+                  <a:srgbClr val="44546A"/>
+                </a:solidFill>
+                <a:latin typeface="나눔스퀘어 Bold" panose="020B0600000101010101" pitchFamily="50" charset="-127"/>
+                <a:ea typeface="나눔스퀘어 Bold" panose="020B0600000101010101" pitchFamily="50" charset="-127"/>
+              </a:rPr>
+              <a:t>iexplore</a:t>
+            </a:r>
+            <a:r>
+              <a:rPr lang="ko-KR" altLang="en-US" sz="2400" spc="100" dirty="0">
+                <a:solidFill>
+                  <a:srgbClr val="44546A"/>
+                </a:solidFill>
+                <a:latin typeface="나눔스퀘어 Bold" panose="020B0600000101010101" pitchFamily="50" charset="-127"/>
+                <a:ea typeface="나눔스퀘어 Bold" panose="020B0600000101010101" pitchFamily="50" charset="-127"/>
+              </a:rPr>
+              <a:t>에서 동작 </a:t>
+            </a:r>
+            <a:r>
+              <a:rPr lang="en-US" altLang="ko-KR" sz="2400" spc="100" dirty="0">
+                <a:solidFill>
+                  <a:srgbClr val="44546A"/>
+                </a:solidFill>
+                <a:latin typeface="나눔스퀘어 Bold" panose="020B0600000101010101" pitchFamily="50" charset="-127"/>
+                <a:ea typeface="나눔스퀘어 Bold" panose="020B0600000101010101" pitchFamily="50" charset="-127"/>
+              </a:rPr>
+              <a:t>×</a:t>
+            </a:r>
+          </a:p>
+        </p:txBody>
+      </p:sp>
+      <p:pic>
+        <p:nvPicPr>
+          <p:cNvPr id="20" name="Picture 2" descr="Microsoft is finally retiring Internet Explorer in 2022 - The Verge">
+            <a:extLst>
+              <a:ext uri="{FF2B5EF4-FFF2-40B4-BE49-F238E27FC236}">
+                <a16:creationId xmlns:a16="http://schemas.microsoft.com/office/drawing/2014/main" id="{1C2D0781-D9D7-49D7-92B7-77422B3DDCDF}"/>
+              </a:ext>
+            </a:extLst>
+          </p:cNvPr>
+          <p:cNvPicPr>
+            <a:picLocks noChangeAspect="1" noChangeArrowheads="1"/>
+          </p:cNvPicPr>
+          <p:nvPr/>
+        </p:nvPicPr>
+        <p:blipFill>
+          <a:blip r:embed="rId4">
+            <a:extLst>
+              <a:ext uri="{28A0092B-C50C-407E-A947-70E740481C1C}">
+                <a14:useLocalDpi xmlns:a14="http://schemas.microsoft.com/office/drawing/2010/main" val="0"/>
+              </a:ext>
+            </a:extLst>
+          </a:blip>
+          <a:srcRect/>
+          <a:stretch>
+            <a:fillRect/>
+          </a:stretch>
+        </p:blipFill>
+        <p:spPr bwMode="auto">
+          <a:xfrm>
+            <a:off x="8293743" y="4613661"/>
+            <a:ext cx="1547525" cy="1547525"/>
+          </a:xfrm>
+          <a:prstGeom prst="rect">
+            <a:avLst/>
+          </a:prstGeom>
+          <a:noFill/>
+          <a:extLst>
+            <a:ext uri="{909E8E84-426E-40DD-AFC4-6F175D3DCCD1}">
+              <a14:hiddenFill xmlns:a14="http://schemas.microsoft.com/office/drawing/2010/main">
+                <a:solidFill>
+                  <a:srgbClr val="FFFFFF"/>
+                </a:solidFill>
+              </a14:hiddenFill>
+            </a:ext>
+          </a:extLst>
+        </p:spPr>
+      </p:pic>
+      <p:sp>
+        <p:nvSpPr>
+          <p:cNvPr id="18" name="곱하기 기호 17">
+            <a:extLst>
+              <a:ext uri="{FF2B5EF4-FFF2-40B4-BE49-F238E27FC236}">
+                <a16:creationId xmlns:a16="http://schemas.microsoft.com/office/drawing/2014/main" id="{16E12253-8E00-4F93-A360-EFB1CD19B9D4}"/>
+              </a:ext>
+            </a:extLst>
+          </p:cNvPr>
+          <p:cNvSpPr/>
+          <p:nvPr/>
+        </p:nvSpPr>
+        <p:spPr>
+          <a:xfrm>
+            <a:off x="10039479" y="4974786"/>
+            <a:ext cx="818707" cy="818707"/>
+          </a:xfrm>
+          <a:prstGeom prst="mathMultiply">
+            <a:avLst/>
+          </a:prstGeom>
+          <a:solidFill>
+            <a:schemeClr val="accent2"/>
+          </a:solidFill>
+          <a:ln>
+            <a:noFill/>
+          </a:ln>
+        </p:spPr>
+        <p:style>
+          <a:lnRef idx="2">
+            <a:schemeClr val="accent1">
+              <a:shade val="50000"/>
+            </a:schemeClr>
+          </a:lnRef>
+          <a:fillRef idx="1">
+            <a:schemeClr val="accent1"/>
+          </a:fillRef>
+          <a:effectRef idx="0">
+            <a:schemeClr val="accent1"/>
+          </a:effectRef>
+          <a:fontRef idx="minor">
+            <a:schemeClr val="lt1"/>
+          </a:fontRef>
+        </p:style>
+        <p:txBody>
+          <a:bodyPr rtlCol="0" anchor="ctr"/>
+          <a:lstStyle/>
+          <a:p>
+            <a:pPr algn="ctr"/>
+            <a:endParaRPr lang="ko-KR" altLang="en-US"/>
+          </a:p>
+        </p:txBody>
+      </p:sp>
+      <p:cxnSp>
+        <p:nvCxnSpPr>
+          <p:cNvPr id="8" name="직선 연결선 7">
+            <a:extLst>
+              <a:ext uri="{FF2B5EF4-FFF2-40B4-BE49-F238E27FC236}">
+                <a16:creationId xmlns:a16="http://schemas.microsoft.com/office/drawing/2014/main" id="{99755F3D-D70C-C444-2086-8C39E6A51E36}"/>
+              </a:ext>
+            </a:extLst>
+          </p:cNvPr>
+          <p:cNvCxnSpPr/>
+          <p:nvPr/>
+        </p:nvCxnSpPr>
+        <p:spPr>
+          <a:xfrm>
+            <a:off x="1820008" y="4360985"/>
+            <a:ext cx="1696915" cy="0"/>
+          </a:xfrm>
+          <a:prstGeom prst="line">
+            <a:avLst/>
+          </a:prstGeom>
+          <a:ln w="28575">
+            <a:solidFill>
+              <a:srgbClr val="FF0000"/>
+            </a:solidFill>
+          </a:ln>
+        </p:spPr>
+        <p:style>
+          <a:lnRef idx="1">
+            <a:schemeClr val="accent1"/>
+          </a:lnRef>
+          <a:fillRef idx="0">
+            <a:schemeClr val="accent1"/>
+          </a:fillRef>
+          <a:effectRef idx="0">
+            <a:schemeClr val="accent1"/>
+          </a:effectRef>
+          <a:fontRef idx="minor">
+            <a:schemeClr val="tx1"/>
+          </a:fontRef>
+        </p:style>
+      </p:cxnSp>
     </p:spTree>
     <p:extLst>
       <p:ext uri="{BB962C8B-B14F-4D97-AF65-F5344CB8AC3E}">
-        <p14:creationId xmlns:p14="http://schemas.microsoft.com/office/powerpoint/2010/main" val="332052180"/>
+        <p14:creationId xmlns:p14="http://schemas.microsoft.com/office/powerpoint/2010/main" val="1020084646"/>
       </p:ext>
     </p:extLst>
   </p:cSld>

</xml_diff>